<commit_message>
updated doc and final RFinance presentation
</commit_message>
<xml_diff>
--- a/doc/LossJoseph_RFinance_Presentation.pptx
+++ b/doc/LossJoseph_RFinance_Presentation.pptx
@@ -4,6 +4,9 @@
   <p:sldMasterIdLst>
     <p:sldMasterId id="2147483648" r:id="rId1"/>
   </p:sldMasterIdLst>
+  <p:notesMasterIdLst>
+    <p:notesMasterId r:id="rId9"/>
+  </p:notesMasterIdLst>
   <p:sldIdLst>
     <p:sldId id="256" r:id="rId2"/>
     <p:sldId id="257" r:id="rId3"/>
@@ -121,9 +124,661 @@
 <file path=ppt/revisionInfo.xml><?xml version="1.0" encoding="utf-8"?>
 <p1510:revInfo xmlns:a="http://schemas.openxmlformats.org/drawingml/2006/main" xmlns:r="http://schemas.openxmlformats.org/officeDocument/2006/relationships" xmlns:p1510="http://schemas.microsoft.com/office/powerpoint/2015/10/main">
   <p1510:revLst>
-    <p1510:client id="{646E94BB-F877-4F3D-9267-F961441CEC85}" v="1188" dt="2019-05-11T11:42:08.590"/>
+    <p1510:client id="{05FB059D-9E26-4890-8BD8-6528E4FB8E67}" v="693" dt="2019-05-16T10:46:03.350"/>
   </p1510:revLst>
 </p1510:revInfo>
+</file>
+
+<file path=ppt/changesInfos/changesInfo1.xml><?xml version="1.0" encoding="utf-8"?>
+<pc:chgInfo xmlns:a="http://schemas.openxmlformats.org/drawingml/2006/main" xmlns:r="http://schemas.openxmlformats.org/officeDocument/2006/relationships" xmlns:ac="http://schemas.microsoft.com/office/drawing/2013/main/command" xmlns:pc="http://schemas.microsoft.com/office/powerpoint/2013/main/command">
+  <pc:docChgLst>
+    <pc:chgData name="Joseph Loss" userId="5b31bea6-fbb6-46ce-a3c5-a099ce912c71" providerId="ADAL" clId="{646E94BB-F877-4F3D-9267-F961441CEC85}"/>
+    <pc:docChg chg="undo redo custSel modSld">
+      <pc:chgData name="Joseph Loss" userId="5b31bea6-fbb6-46ce-a3c5-a099ce912c71" providerId="ADAL" clId="{646E94BB-F877-4F3D-9267-F961441CEC85}" dt="2019-05-16T10:54:39.702" v="1323" actId="1038"/>
+      <pc:docMkLst>
+        <pc:docMk/>
+      </pc:docMkLst>
+      <pc:sldChg chg="addSp delSp modSp">
+        <pc:chgData name="Joseph Loss" userId="5b31bea6-fbb6-46ce-a3c5-a099ce912c71" providerId="ADAL" clId="{646E94BB-F877-4F3D-9267-F961441CEC85}" dt="2019-05-16T10:36:14.106" v="1189"/>
+        <pc:sldMkLst>
+          <pc:docMk/>
+          <pc:sldMk cId="479890570" sldId="256"/>
+        </pc:sldMkLst>
+        <pc:spChg chg="mod">
+          <ac:chgData name="Joseph Loss" userId="5b31bea6-fbb6-46ce-a3c5-a099ce912c71" providerId="ADAL" clId="{646E94BB-F877-4F3D-9267-F961441CEC85}" dt="2019-05-16T10:36:14.106" v="1189"/>
+          <ac:spMkLst>
+            <pc:docMk/>
+            <pc:sldMk cId="479890570" sldId="256"/>
+            <ac:spMk id="2" creationId="{F98E7724-B0AC-4844-90A1-13CAE397373C}"/>
+          </ac:spMkLst>
+        </pc:spChg>
+        <pc:spChg chg="mod">
+          <ac:chgData name="Joseph Loss" userId="5b31bea6-fbb6-46ce-a3c5-a099ce912c71" providerId="ADAL" clId="{646E94BB-F877-4F3D-9267-F961441CEC85}" dt="2019-05-16T08:46:18.708" v="322" actId="113"/>
+          <ac:spMkLst>
+            <pc:docMk/>
+            <pc:sldMk cId="479890570" sldId="256"/>
+            <ac:spMk id="3" creationId="{3A6E834B-1A40-4EA4-ABF0-9420218EE6A3}"/>
+          </ac:spMkLst>
+        </pc:spChg>
+        <pc:spChg chg="add mod">
+          <ac:chgData name="Joseph Loss" userId="5b31bea6-fbb6-46ce-a3c5-a099ce912c71" providerId="ADAL" clId="{646E94BB-F877-4F3D-9267-F961441CEC85}" dt="2019-05-16T10:09:00.844" v="440" actId="20577"/>
+          <ac:spMkLst>
+            <pc:docMk/>
+            <pc:sldMk cId="479890570" sldId="256"/>
+            <ac:spMk id="4" creationId="{CAAA88D9-0849-4D76-9A01-BE7CD62484A4}"/>
+          </ac:spMkLst>
+        </pc:spChg>
+        <pc:spChg chg="mod">
+          <ac:chgData name="Joseph Loss" userId="5b31bea6-fbb6-46ce-a3c5-a099ce912c71" providerId="ADAL" clId="{646E94BB-F877-4F3D-9267-F961441CEC85}" dt="2019-05-16T08:51:58.794" v="371" actId="255"/>
+          <ac:spMkLst>
+            <pc:docMk/>
+            <pc:sldMk cId="479890570" sldId="256"/>
+            <ac:spMk id="5" creationId="{6D03CAE1-967C-48DD-9277-2A45E3BAE002}"/>
+          </ac:spMkLst>
+        </pc:spChg>
+        <pc:spChg chg="mod">
+          <ac:chgData name="Joseph Loss" userId="5b31bea6-fbb6-46ce-a3c5-a099ce912c71" providerId="ADAL" clId="{646E94BB-F877-4F3D-9267-F961441CEC85}" dt="2019-05-16T08:51:58.794" v="371" actId="255"/>
+          <ac:spMkLst>
+            <pc:docMk/>
+            <pc:sldMk cId="479890570" sldId="256"/>
+            <ac:spMk id="6" creationId="{19E76543-DC17-4D04-ACDC-EF248C9192F8}"/>
+          </ac:spMkLst>
+        </pc:spChg>
+        <pc:spChg chg="add del">
+          <ac:chgData name="Joseph Loss" userId="5b31bea6-fbb6-46ce-a3c5-a099ce912c71" providerId="ADAL" clId="{646E94BB-F877-4F3D-9267-F961441CEC85}" dt="2019-05-16T10:05:11.314" v="378"/>
+          <ac:spMkLst>
+            <pc:docMk/>
+            <pc:sldMk cId="479890570" sldId="256"/>
+            <ac:spMk id="7" creationId="{5EF74325-C9BD-439F-88CB-55895FC4DC04}"/>
+          </ac:spMkLst>
+        </pc:spChg>
+        <pc:picChg chg="del mod">
+          <ac:chgData name="Joseph Loss" userId="5b31bea6-fbb6-46ce-a3c5-a099ce912c71" providerId="ADAL" clId="{646E94BB-F877-4F3D-9267-F961441CEC85}" dt="2019-05-16T10:07:11.623" v="396" actId="478"/>
+          <ac:picMkLst>
+            <pc:docMk/>
+            <pc:sldMk cId="479890570" sldId="256"/>
+            <ac:picMk id="8" creationId="{F623E58A-2608-4D04-B239-E2689DAD825E}"/>
+          </ac:picMkLst>
+        </pc:picChg>
+        <pc:picChg chg="mod">
+          <ac:chgData name="Joseph Loss" userId="5b31bea6-fbb6-46ce-a3c5-a099ce912c71" providerId="ADAL" clId="{646E94BB-F877-4F3D-9267-F961441CEC85}" dt="2019-05-16T10:08:35.452" v="436" actId="1036"/>
+          <ac:picMkLst>
+            <pc:docMk/>
+            <pc:sldMk cId="479890570" sldId="256"/>
+            <ac:picMk id="9" creationId="{61844C60-7D4C-4352-86EF-7018AA7F2D55}"/>
+          </ac:picMkLst>
+        </pc:picChg>
+      </pc:sldChg>
+      <pc:sldChg chg="addSp modSp">
+        <pc:chgData name="Joseph Loss" userId="5b31bea6-fbb6-46ce-a3c5-a099ce912c71" providerId="ADAL" clId="{646E94BB-F877-4F3D-9267-F961441CEC85}" dt="2019-05-16T10:54:39.702" v="1323" actId="1038"/>
+        <pc:sldMkLst>
+          <pc:docMk/>
+          <pc:sldMk cId="3073640471" sldId="257"/>
+        </pc:sldMkLst>
+        <pc:spChg chg="mod">
+          <ac:chgData name="Joseph Loss" userId="5b31bea6-fbb6-46ce-a3c5-a099ce912c71" providerId="ADAL" clId="{646E94BB-F877-4F3D-9267-F961441CEC85}" dt="2019-05-16T10:41:42.913" v="1260" actId="114"/>
+          <ac:spMkLst>
+            <pc:docMk/>
+            <pc:sldMk cId="3073640471" sldId="257"/>
+            <ac:spMk id="2" creationId="{B61AFE25-23F6-43CA-AA26-525D3710A26E}"/>
+          </ac:spMkLst>
+        </pc:spChg>
+        <pc:spChg chg="mod">
+          <ac:chgData name="Joseph Loss" userId="5b31bea6-fbb6-46ce-a3c5-a099ce912c71" providerId="ADAL" clId="{646E94BB-F877-4F3D-9267-F961441CEC85}" dt="2019-05-16T08:51:50.313" v="370" actId="255"/>
+          <ac:spMkLst>
+            <pc:docMk/>
+            <pc:sldMk cId="3073640471" sldId="257"/>
+            <ac:spMk id="3" creationId="{3AF1FC36-7C3B-46BB-8F71-FD2572F5B79F}"/>
+          </ac:spMkLst>
+        </pc:spChg>
+        <pc:spChg chg="mod">
+          <ac:chgData name="Joseph Loss" userId="5b31bea6-fbb6-46ce-a3c5-a099ce912c71" providerId="ADAL" clId="{646E94BB-F877-4F3D-9267-F961441CEC85}" dt="2019-05-16T10:47:37.262" v="1300" actId="115"/>
+          <ac:spMkLst>
+            <pc:docMk/>
+            <pc:sldMk cId="3073640471" sldId="257"/>
+            <ac:spMk id="4" creationId="{CA45D775-B129-46E4-998E-C6DD43F9C2A2}"/>
+          </ac:spMkLst>
+        </pc:spChg>
+        <pc:spChg chg="mod">
+          <ac:chgData name="Joseph Loss" userId="5b31bea6-fbb6-46ce-a3c5-a099ce912c71" providerId="ADAL" clId="{646E94BB-F877-4F3D-9267-F961441CEC85}" dt="2019-05-16T10:53:45.513" v="1305" actId="2085"/>
+          <ac:spMkLst>
+            <pc:docMk/>
+            <pc:sldMk cId="3073640471" sldId="257"/>
+            <ac:spMk id="5" creationId="{88D7A6F8-7E42-4FDB-A361-EFA01B1B33C7}"/>
+          </ac:spMkLst>
+        </pc:spChg>
+        <pc:spChg chg="mod">
+          <ac:chgData name="Joseph Loss" userId="5b31bea6-fbb6-46ce-a3c5-a099ce912c71" providerId="ADAL" clId="{646E94BB-F877-4F3D-9267-F961441CEC85}" dt="2019-05-16T10:54:39.702" v="1323" actId="1038"/>
+          <ac:spMkLst>
+            <pc:docMk/>
+            <pc:sldMk cId="3073640471" sldId="257"/>
+            <ac:spMk id="6" creationId="{D5E5C886-B1DA-4B62-89F6-9A4C18DC36E3}"/>
+          </ac:spMkLst>
+        </pc:spChg>
+        <pc:spChg chg="mod">
+          <ac:chgData name="Joseph Loss" userId="5b31bea6-fbb6-46ce-a3c5-a099ce912c71" providerId="ADAL" clId="{646E94BB-F877-4F3D-9267-F961441CEC85}" dt="2019-05-16T10:54:39.702" v="1323" actId="1038"/>
+          <ac:spMkLst>
+            <pc:docMk/>
+            <pc:sldMk cId="3073640471" sldId="257"/>
+            <ac:spMk id="7" creationId="{A6BB630E-A0CC-45EE-99A9-292DACBAA9AD}"/>
+          </ac:spMkLst>
+        </pc:spChg>
+        <pc:spChg chg="mod">
+          <ac:chgData name="Joseph Loss" userId="5b31bea6-fbb6-46ce-a3c5-a099ce912c71" providerId="ADAL" clId="{646E94BB-F877-4F3D-9267-F961441CEC85}" dt="2019-05-16T08:51:50.313" v="370" actId="255"/>
+          <ac:spMkLst>
+            <pc:docMk/>
+            <pc:sldMk cId="3073640471" sldId="257"/>
+            <ac:spMk id="9" creationId="{F4DAE322-9A34-404D-B401-93AAD3F54AFF}"/>
+          </ac:spMkLst>
+        </pc:spChg>
+        <pc:spChg chg="add mod">
+          <ac:chgData name="Joseph Loss" userId="5b31bea6-fbb6-46ce-a3c5-a099ce912c71" providerId="ADAL" clId="{646E94BB-F877-4F3D-9267-F961441CEC85}" dt="2019-05-16T10:42:14.100" v="1265" actId="403"/>
+          <ac:spMkLst>
+            <pc:docMk/>
+            <pc:sldMk cId="3073640471" sldId="257"/>
+            <ac:spMk id="10" creationId="{632B3007-73C7-4D1F-A5B4-45A180EEF077}"/>
+          </ac:spMkLst>
+        </pc:spChg>
+      </pc:sldChg>
+      <pc:sldChg chg="modSp">
+        <pc:chgData name="Joseph Loss" userId="5b31bea6-fbb6-46ce-a3c5-a099ce912c71" providerId="ADAL" clId="{646E94BB-F877-4F3D-9267-F961441CEC85}" dt="2019-05-16T10:19:41.339" v="717" actId="1038"/>
+        <pc:sldMkLst>
+          <pc:docMk/>
+          <pc:sldMk cId="4145850430" sldId="258"/>
+        </pc:sldMkLst>
+        <pc:spChg chg="mod">
+          <ac:chgData name="Joseph Loss" userId="5b31bea6-fbb6-46ce-a3c5-a099ce912c71" providerId="ADAL" clId="{646E94BB-F877-4F3D-9267-F961441CEC85}" dt="2019-05-16T08:49:35.931" v="361" actId="6549"/>
+          <ac:spMkLst>
+            <pc:docMk/>
+            <pc:sldMk cId="4145850430" sldId="258"/>
+            <ac:spMk id="2" creationId="{31F05B1E-50EE-49B6-A2D4-3734C1688B30}"/>
+          </ac:spMkLst>
+        </pc:spChg>
+        <pc:spChg chg="mod">
+          <ac:chgData name="Joseph Loss" userId="5b31bea6-fbb6-46ce-a3c5-a099ce912c71" providerId="ADAL" clId="{646E94BB-F877-4F3D-9267-F961441CEC85}" dt="2019-05-16T08:51:18.349" v="368" actId="255"/>
+          <ac:spMkLst>
+            <pc:docMk/>
+            <pc:sldMk cId="4145850430" sldId="258"/>
+            <ac:spMk id="3" creationId="{683B5159-9027-4C65-B016-2D13BF29B169}"/>
+          </ac:spMkLst>
+        </pc:spChg>
+        <pc:spChg chg="mod">
+          <ac:chgData name="Joseph Loss" userId="5b31bea6-fbb6-46ce-a3c5-a099ce912c71" providerId="ADAL" clId="{646E94BB-F877-4F3D-9267-F961441CEC85}" dt="2019-05-16T08:51:18.349" v="368" actId="255"/>
+          <ac:spMkLst>
+            <pc:docMk/>
+            <pc:sldMk cId="4145850430" sldId="258"/>
+            <ac:spMk id="4" creationId="{092EA223-64AD-43DE-985F-53C6151D23CF}"/>
+          </ac:spMkLst>
+        </pc:spChg>
+        <pc:picChg chg="mod">
+          <ac:chgData name="Joseph Loss" userId="5b31bea6-fbb6-46ce-a3c5-a099ce912c71" providerId="ADAL" clId="{646E94BB-F877-4F3D-9267-F961441CEC85}" dt="2019-05-16T10:19:41.339" v="717" actId="1038"/>
+          <ac:picMkLst>
+            <pc:docMk/>
+            <pc:sldMk cId="4145850430" sldId="258"/>
+            <ac:picMk id="8" creationId="{20D5A634-D357-478C-9594-31193CD3460F}"/>
+          </ac:picMkLst>
+        </pc:picChg>
+      </pc:sldChg>
+      <pc:sldChg chg="modSp">
+        <pc:chgData name="Joseph Loss" userId="5b31bea6-fbb6-46ce-a3c5-a099ce912c71" providerId="ADAL" clId="{646E94BB-F877-4F3D-9267-F961441CEC85}" dt="2019-05-16T08:50:58.225" v="366" actId="255"/>
+        <pc:sldMkLst>
+          <pc:docMk/>
+          <pc:sldMk cId="3198049024" sldId="260"/>
+        </pc:sldMkLst>
+        <pc:spChg chg="mod">
+          <ac:chgData name="Joseph Loss" userId="5b31bea6-fbb6-46ce-a3c5-a099ce912c71" providerId="ADAL" clId="{646E94BB-F877-4F3D-9267-F961441CEC85}" dt="2019-05-16T08:50:58.225" v="366" actId="255"/>
+          <ac:spMkLst>
+            <pc:docMk/>
+            <pc:sldMk cId="3198049024" sldId="260"/>
+            <ac:spMk id="10" creationId="{E0A7A120-0A9C-48B0-93CE-71352E8A5091}"/>
+          </ac:spMkLst>
+        </pc:spChg>
+        <pc:spChg chg="mod">
+          <ac:chgData name="Joseph Loss" userId="5b31bea6-fbb6-46ce-a3c5-a099ce912c71" providerId="ADAL" clId="{646E94BB-F877-4F3D-9267-F961441CEC85}" dt="2019-05-16T08:50:58.225" v="366" actId="255"/>
+          <ac:spMkLst>
+            <pc:docMk/>
+            <pc:sldMk cId="3198049024" sldId="260"/>
+            <ac:spMk id="11" creationId="{A7D01046-FF4B-4BDD-B92A-5C3EB3D6553E}"/>
+          </ac:spMkLst>
+        </pc:spChg>
+      </pc:sldChg>
+      <pc:sldChg chg="modSp">
+        <pc:chgData name="Joseph Loss" userId="5b31bea6-fbb6-46ce-a3c5-a099ce912c71" providerId="ADAL" clId="{646E94BB-F877-4F3D-9267-F961441CEC85}" dt="2019-05-16T08:50:50.592" v="365" actId="255"/>
+        <pc:sldMkLst>
+          <pc:docMk/>
+          <pc:sldMk cId="267837838" sldId="261"/>
+        </pc:sldMkLst>
+        <pc:spChg chg="mod">
+          <ac:chgData name="Joseph Loss" userId="5b31bea6-fbb6-46ce-a3c5-a099ce912c71" providerId="ADAL" clId="{646E94BB-F877-4F3D-9267-F961441CEC85}" dt="2019-05-16T08:50:50.592" v="365" actId="255"/>
+          <ac:spMkLst>
+            <pc:docMk/>
+            <pc:sldMk cId="267837838" sldId="261"/>
+            <ac:spMk id="4" creationId="{C91F995D-3F52-4A55-B51D-DECB52A1B0BA}"/>
+          </ac:spMkLst>
+        </pc:spChg>
+        <pc:spChg chg="mod">
+          <ac:chgData name="Joseph Loss" userId="5b31bea6-fbb6-46ce-a3c5-a099ce912c71" providerId="ADAL" clId="{646E94BB-F877-4F3D-9267-F961441CEC85}" dt="2019-05-16T08:50:50.592" v="365" actId="255"/>
+          <ac:spMkLst>
+            <pc:docMk/>
+            <pc:sldMk cId="267837838" sldId="261"/>
+            <ac:spMk id="5" creationId="{568B4C74-7F13-40EE-BEA5-3DFD18BE1723}"/>
+          </ac:spMkLst>
+        </pc:spChg>
+      </pc:sldChg>
+      <pc:sldChg chg="modSp">
+        <pc:chgData name="Joseph Loss" userId="5b31bea6-fbb6-46ce-a3c5-a099ce912c71" providerId="ADAL" clId="{646E94BB-F877-4F3D-9267-F961441CEC85}" dt="2019-05-16T10:19:30.514" v="715" actId="14100"/>
+        <pc:sldMkLst>
+          <pc:docMk/>
+          <pc:sldMk cId="1418679565" sldId="262"/>
+        </pc:sldMkLst>
+        <pc:spChg chg="mod">
+          <ac:chgData name="Joseph Loss" userId="5b31bea6-fbb6-46ce-a3c5-a099ce912c71" providerId="ADAL" clId="{646E94BB-F877-4F3D-9267-F961441CEC85}" dt="2019-05-16T08:51:34.613" v="369" actId="255"/>
+          <ac:spMkLst>
+            <pc:docMk/>
+            <pc:sldMk cId="1418679565" sldId="262"/>
+            <ac:spMk id="3" creationId="{379FF2D2-826F-40E3-A3BD-2106C43CA87A}"/>
+          </ac:spMkLst>
+        </pc:spChg>
+        <pc:spChg chg="mod">
+          <ac:chgData name="Joseph Loss" userId="5b31bea6-fbb6-46ce-a3c5-a099ce912c71" providerId="ADAL" clId="{646E94BB-F877-4F3D-9267-F961441CEC85}" dt="2019-05-16T08:51:34.613" v="369" actId="255"/>
+          <ac:spMkLst>
+            <pc:docMk/>
+            <pc:sldMk cId="1418679565" sldId="262"/>
+            <ac:spMk id="4" creationId="{07FF9E7F-50AB-432A-B1E3-49B07486F87B}"/>
+          </ac:spMkLst>
+        </pc:spChg>
+        <pc:picChg chg="mod">
+          <ac:chgData name="Joseph Loss" userId="5b31bea6-fbb6-46ce-a3c5-a099ce912c71" providerId="ADAL" clId="{646E94BB-F877-4F3D-9267-F961441CEC85}" dt="2019-05-16T10:19:30.514" v="715" actId="14100"/>
+          <ac:picMkLst>
+            <pc:docMk/>
+            <pc:sldMk cId="1418679565" sldId="262"/>
+            <ac:picMk id="7" creationId="{92BA781D-8E2A-4767-8F94-87E6F22C7A99}"/>
+          </ac:picMkLst>
+        </pc:picChg>
+      </pc:sldChg>
+      <pc:sldChg chg="addSp modSp">
+        <pc:chgData name="Joseph Loss" userId="5b31bea6-fbb6-46ce-a3c5-a099ce912c71" providerId="ADAL" clId="{646E94BB-F877-4F3D-9267-F961441CEC85}" dt="2019-05-16T10:46:03.350" v="1296" actId="403"/>
+        <pc:sldMkLst>
+          <pc:docMk/>
+          <pc:sldMk cId="2599024257" sldId="263"/>
+        </pc:sldMkLst>
+        <pc:spChg chg="mod">
+          <ac:chgData name="Joseph Loss" userId="5b31bea6-fbb6-46ce-a3c5-a099ce912c71" providerId="ADAL" clId="{646E94BB-F877-4F3D-9267-F961441CEC85}" dt="2019-05-16T08:51:04.285" v="367" actId="255"/>
+          <ac:spMkLst>
+            <pc:docMk/>
+            <pc:sldMk cId="2599024257" sldId="263"/>
+            <ac:spMk id="3" creationId="{D078F7E2-A887-437D-8786-6C516DA8557D}"/>
+          </ac:spMkLst>
+        </pc:spChg>
+        <pc:spChg chg="mod">
+          <ac:chgData name="Joseph Loss" userId="5b31bea6-fbb6-46ce-a3c5-a099ce912c71" providerId="ADAL" clId="{646E94BB-F877-4F3D-9267-F961441CEC85}" dt="2019-05-16T08:51:04.285" v="367" actId="255"/>
+          <ac:spMkLst>
+            <pc:docMk/>
+            <pc:sldMk cId="2599024257" sldId="263"/>
+            <ac:spMk id="4" creationId="{63BA03D7-97B2-4B0C-B729-4B01169883A5}"/>
+          </ac:spMkLst>
+        </pc:spChg>
+        <pc:spChg chg="add mod">
+          <ac:chgData name="Joseph Loss" userId="5b31bea6-fbb6-46ce-a3c5-a099ce912c71" providerId="ADAL" clId="{646E94BB-F877-4F3D-9267-F961441CEC85}" dt="2019-05-16T10:46:03.350" v="1296" actId="403"/>
+          <ac:spMkLst>
+            <pc:docMk/>
+            <pc:sldMk cId="2599024257" sldId="263"/>
+            <ac:spMk id="6" creationId="{E750046E-667C-4A0D-A1DC-DE352C57EA02}"/>
+          </ac:spMkLst>
+        </pc:spChg>
+      </pc:sldChg>
+    </pc:docChg>
+  </pc:docChgLst>
+</pc:chgInfo>
+</file>
+
+<file path=ppt/notesMasters/notesMaster1.xml><?xml version="1.0" encoding="utf-8"?>
+<p:notesMaster xmlns:a="http://schemas.openxmlformats.org/drawingml/2006/main" xmlns:r="http://schemas.openxmlformats.org/officeDocument/2006/relationships" xmlns:p="http://schemas.openxmlformats.org/presentationml/2006/main">
+  <p:cSld>
+    <p:bg>
+      <p:bgRef idx="1001">
+        <a:schemeClr val="bg1"/>
+      </p:bgRef>
+    </p:bg>
+    <p:spTree>
+      <p:nvGrpSpPr>
+        <p:cNvPr id="1" name=""/>
+        <p:cNvGrpSpPr/>
+        <p:nvPr/>
+      </p:nvGrpSpPr>
+      <p:grpSpPr>
+        <a:xfrm>
+          <a:off x="0" y="0"/>
+          <a:ext cx="0" cy="0"/>
+          <a:chOff x="0" y="0"/>
+          <a:chExt cx="0" cy="0"/>
+        </a:xfrm>
+      </p:grpSpPr>
+      <p:sp>
+        <p:nvSpPr>
+          <p:cNvPr id="2" name="Header Placeholder 1"/>
+          <p:cNvSpPr>
+            <a:spLocks noGrp="1"/>
+          </p:cNvSpPr>
+          <p:nvPr>
+            <p:ph type="hdr" sz="quarter"/>
+          </p:nvPr>
+        </p:nvSpPr>
+        <p:spPr>
+          <a:xfrm>
+            <a:off x="0" y="0"/>
+            <a:ext cx="2971800" cy="458788"/>
+          </a:xfrm>
+          <a:prstGeom prst="rect">
+            <a:avLst/>
+          </a:prstGeom>
+        </p:spPr>
+        <p:txBody>
+          <a:bodyPr vert="horz" lIns="91440" tIns="45720" rIns="91440" bIns="45720" rtlCol="0"/>
+          <a:lstStyle>
+            <a:lvl1pPr algn="l">
+              <a:defRPr sz="1200"/>
+            </a:lvl1pPr>
+          </a:lstStyle>
+          <a:p>
+            <a:endParaRPr lang="en-US"/>
+          </a:p>
+        </p:txBody>
+      </p:sp>
+      <p:sp>
+        <p:nvSpPr>
+          <p:cNvPr id="3" name="Date Placeholder 2"/>
+          <p:cNvSpPr>
+            <a:spLocks noGrp="1"/>
+          </p:cNvSpPr>
+          <p:nvPr>
+            <p:ph type="dt" idx="1"/>
+          </p:nvPr>
+        </p:nvSpPr>
+        <p:spPr>
+          <a:xfrm>
+            <a:off x="3884613" y="0"/>
+            <a:ext cx="2971800" cy="458788"/>
+          </a:xfrm>
+          <a:prstGeom prst="rect">
+            <a:avLst/>
+          </a:prstGeom>
+        </p:spPr>
+        <p:txBody>
+          <a:bodyPr vert="horz" lIns="91440" tIns="45720" rIns="91440" bIns="45720" rtlCol="0"/>
+          <a:lstStyle>
+            <a:lvl1pPr algn="r">
+              <a:defRPr sz="1200"/>
+            </a:lvl1pPr>
+          </a:lstStyle>
+          <a:p>
+            <a:fld id="{712E7762-3728-4CA2-BF04-831125DD9062}" type="datetimeFigureOut">
+              <a:rPr lang="en-US" smtClean="0"/>
+              <a:t>5/16/2019</a:t>
+            </a:fld>
+            <a:endParaRPr lang="en-US"/>
+          </a:p>
+        </p:txBody>
+      </p:sp>
+      <p:sp>
+        <p:nvSpPr>
+          <p:cNvPr id="4" name="Slide Image Placeholder 3"/>
+          <p:cNvSpPr>
+            <a:spLocks noGrp="1" noRot="1" noChangeAspect="1"/>
+          </p:cNvSpPr>
+          <p:nvPr>
+            <p:ph type="sldImg" idx="2"/>
+          </p:nvPr>
+        </p:nvSpPr>
+        <p:spPr>
+          <a:xfrm>
+            <a:off x="685800" y="1143000"/>
+            <a:ext cx="5486400" cy="3086100"/>
+          </a:xfrm>
+          <a:prstGeom prst="rect">
+            <a:avLst/>
+          </a:prstGeom>
+          <a:noFill/>
+          <a:ln w="12700">
+            <a:solidFill>
+              <a:prstClr val="black"/>
+            </a:solidFill>
+          </a:ln>
+        </p:spPr>
+        <p:txBody>
+          <a:bodyPr vert="horz" lIns="91440" tIns="45720" rIns="91440" bIns="45720" rtlCol="0" anchor="ctr"/>
+          <a:lstStyle/>
+          <a:p>
+            <a:endParaRPr lang="en-US"/>
+          </a:p>
+        </p:txBody>
+      </p:sp>
+      <p:sp>
+        <p:nvSpPr>
+          <p:cNvPr id="5" name="Notes Placeholder 4"/>
+          <p:cNvSpPr>
+            <a:spLocks noGrp="1"/>
+          </p:cNvSpPr>
+          <p:nvPr>
+            <p:ph type="body" sz="quarter" idx="3"/>
+          </p:nvPr>
+        </p:nvSpPr>
+        <p:spPr>
+          <a:xfrm>
+            <a:off x="685800" y="4400550"/>
+            <a:ext cx="5486400" cy="3600450"/>
+          </a:xfrm>
+          <a:prstGeom prst="rect">
+            <a:avLst/>
+          </a:prstGeom>
+        </p:spPr>
+        <p:txBody>
+          <a:bodyPr vert="horz" lIns="91440" tIns="45720" rIns="91440" bIns="45720" rtlCol="0"/>
+          <a:lstStyle/>
+          <a:p>
+            <a:pPr lvl="0"/>
+            <a:r>
+              <a:rPr lang="en-US"/>
+              <a:t>Click to edit Master text styles</a:t>
+            </a:r>
+          </a:p>
+          <a:p>
+            <a:pPr lvl="1"/>
+            <a:r>
+              <a:rPr lang="en-US"/>
+              <a:t>Second level</a:t>
+            </a:r>
+          </a:p>
+          <a:p>
+            <a:pPr lvl="2"/>
+            <a:r>
+              <a:rPr lang="en-US"/>
+              <a:t>Third level</a:t>
+            </a:r>
+          </a:p>
+          <a:p>
+            <a:pPr lvl="3"/>
+            <a:r>
+              <a:rPr lang="en-US"/>
+              <a:t>Fourth level</a:t>
+            </a:r>
+          </a:p>
+          <a:p>
+            <a:pPr lvl="4"/>
+            <a:r>
+              <a:rPr lang="en-US"/>
+              <a:t>Fifth level</a:t>
+            </a:r>
+          </a:p>
+        </p:txBody>
+      </p:sp>
+      <p:sp>
+        <p:nvSpPr>
+          <p:cNvPr id="6" name="Footer Placeholder 5"/>
+          <p:cNvSpPr>
+            <a:spLocks noGrp="1"/>
+          </p:cNvSpPr>
+          <p:nvPr>
+            <p:ph type="ftr" sz="quarter" idx="4"/>
+          </p:nvPr>
+        </p:nvSpPr>
+        <p:spPr>
+          <a:xfrm>
+            <a:off x="0" y="8685213"/>
+            <a:ext cx="2971800" cy="458787"/>
+          </a:xfrm>
+          <a:prstGeom prst="rect">
+            <a:avLst/>
+          </a:prstGeom>
+        </p:spPr>
+        <p:txBody>
+          <a:bodyPr vert="horz" lIns="91440" tIns="45720" rIns="91440" bIns="45720" rtlCol="0" anchor="b"/>
+          <a:lstStyle>
+            <a:lvl1pPr algn="l">
+              <a:defRPr sz="1200"/>
+            </a:lvl1pPr>
+          </a:lstStyle>
+          <a:p>
+            <a:endParaRPr lang="en-US"/>
+          </a:p>
+        </p:txBody>
+      </p:sp>
+      <p:sp>
+        <p:nvSpPr>
+          <p:cNvPr id="7" name="Slide Number Placeholder 6"/>
+          <p:cNvSpPr>
+            <a:spLocks noGrp="1"/>
+          </p:cNvSpPr>
+          <p:nvPr>
+            <p:ph type="sldNum" sz="quarter" idx="5"/>
+          </p:nvPr>
+        </p:nvSpPr>
+        <p:spPr>
+          <a:xfrm>
+            <a:off x="3884613" y="8685213"/>
+            <a:ext cx="2971800" cy="458787"/>
+          </a:xfrm>
+          <a:prstGeom prst="rect">
+            <a:avLst/>
+          </a:prstGeom>
+        </p:spPr>
+        <p:txBody>
+          <a:bodyPr vert="horz" lIns="91440" tIns="45720" rIns="91440" bIns="45720" rtlCol="0" anchor="b"/>
+          <a:lstStyle>
+            <a:lvl1pPr algn="r">
+              <a:defRPr sz="1200"/>
+            </a:lvl1pPr>
+          </a:lstStyle>
+          <a:p>
+            <a:fld id="{200EA02F-594A-4A12-B33F-FB3E09AD020D}" type="slidenum">
+              <a:rPr lang="en-US" smtClean="0"/>
+              <a:t>‹#›</a:t>
+            </a:fld>
+            <a:endParaRPr lang="en-US"/>
+          </a:p>
+        </p:txBody>
+      </p:sp>
+    </p:spTree>
+    <p:extLst>
+      <p:ext uri="{BB962C8B-B14F-4D97-AF65-F5344CB8AC3E}">
+        <p14:creationId xmlns:p14="http://schemas.microsoft.com/office/powerpoint/2010/main" val="1796774515"/>
+      </p:ext>
+    </p:extLst>
+  </p:cSld>
+  <p:clrMap bg1="lt1" tx1="dk1" bg2="lt2" tx2="dk2" accent1="accent1" accent2="accent2" accent3="accent3" accent4="accent4" accent5="accent5" accent6="accent6" hlink="hlink" folHlink="folHlink"/>
+  <p:notesStyle>
+    <a:lvl1pPr marL="0" algn="l" defTabSz="914400" rtl="0" eaLnBrk="1" latinLnBrk="0" hangingPunct="1">
+      <a:defRPr sz="1200" kern="1200">
+        <a:solidFill>
+          <a:schemeClr val="tx1"/>
+        </a:solidFill>
+        <a:latin typeface="+mn-lt"/>
+        <a:ea typeface="+mn-ea"/>
+        <a:cs typeface="+mn-cs"/>
+      </a:defRPr>
+    </a:lvl1pPr>
+    <a:lvl2pPr marL="457200" algn="l" defTabSz="914400" rtl="0" eaLnBrk="1" latinLnBrk="0" hangingPunct="1">
+      <a:defRPr sz="1200" kern="1200">
+        <a:solidFill>
+          <a:schemeClr val="tx1"/>
+        </a:solidFill>
+        <a:latin typeface="+mn-lt"/>
+        <a:ea typeface="+mn-ea"/>
+        <a:cs typeface="+mn-cs"/>
+      </a:defRPr>
+    </a:lvl2pPr>
+    <a:lvl3pPr marL="914400" algn="l" defTabSz="914400" rtl="0" eaLnBrk="1" latinLnBrk="0" hangingPunct="1">
+      <a:defRPr sz="1200" kern="1200">
+        <a:solidFill>
+          <a:schemeClr val="tx1"/>
+        </a:solidFill>
+        <a:latin typeface="+mn-lt"/>
+        <a:ea typeface="+mn-ea"/>
+        <a:cs typeface="+mn-cs"/>
+      </a:defRPr>
+    </a:lvl3pPr>
+    <a:lvl4pPr marL="1371600" algn="l" defTabSz="914400" rtl="0" eaLnBrk="1" latinLnBrk="0" hangingPunct="1">
+      <a:defRPr sz="1200" kern="1200">
+        <a:solidFill>
+          <a:schemeClr val="tx1"/>
+        </a:solidFill>
+        <a:latin typeface="+mn-lt"/>
+        <a:ea typeface="+mn-ea"/>
+        <a:cs typeface="+mn-cs"/>
+      </a:defRPr>
+    </a:lvl4pPr>
+    <a:lvl5pPr marL="1828800" algn="l" defTabSz="914400" rtl="0" eaLnBrk="1" latinLnBrk="0" hangingPunct="1">
+      <a:defRPr sz="1200" kern="1200">
+        <a:solidFill>
+          <a:schemeClr val="tx1"/>
+        </a:solidFill>
+        <a:latin typeface="+mn-lt"/>
+        <a:ea typeface="+mn-ea"/>
+        <a:cs typeface="+mn-cs"/>
+      </a:defRPr>
+    </a:lvl5pPr>
+    <a:lvl6pPr marL="2286000" algn="l" defTabSz="914400" rtl="0" eaLnBrk="1" latinLnBrk="0" hangingPunct="1">
+      <a:defRPr sz="1200" kern="1200">
+        <a:solidFill>
+          <a:schemeClr val="tx1"/>
+        </a:solidFill>
+        <a:latin typeface="+mn-lt"/>
+        <a:ea typeface="+mn-ea"/>
+        <a:cs typeface="+mn-cs"/>
+      </a:defRPr>
+    </a:lvl6pPr>
+    <a:lvl7pPr marL="2743200" algn="l" defTabSz="914400" rtl="0" eaLnBrk="1" latinLnBrk="0" hangingPunct="1">
+      <a:defRPr sz="1200" kern="1200">
+        <a:solidFill>
+          <a:schemeClr val="tx1"/>
+        </a:solidFill>
+        <a:latin typeface="+mn-lt"/>
+        <a:ea typeface="+mn-ea"/>
+        <a:cs typeface="+mn-cs"/>
+      </a:defRPr>
+    </a:lvl7pPr>
+    <a:lvl8pPr marL="3200400" algn="l" defTabSz="914400" rtl="0" eaLnBrk="1" latinLnBrk="0" hangingPunct="1">
+      <a:defRPr sz="1200" kern="1200">
+        <a:solidFill>
+          <a:schemeClr val="tx1"/>
+        </a:solidFill>
+        <a:latin typeface="+mn-lt"/>
+        <a:ea typeface="+mn-ea"/>
+        <a:cs typeface="+mn-cs"/>
+      </a:defRPr>
+    </a:lvl8pPr>
+    <a:lvl9pPr marL="3657600" algn="l" defTabSz="914400" rtl="0" eaLnBrk="1" latinLnBrk="0" hangingPunct="1">
+      <a:defRPr sz="1200" kern="1200">
+        <a:solidFill>
+          <a:schemeClr val="tx1"/>
+        </a:solidFill>
+        <a:latin typeface="+mn-lt"/>
+        <a:ea typeface="+mn-ea"/>
+        <a:cs typeface="+mn-cs"/>
+      </a:defRPr>
+    </a:lvl9pPr>
+  </p:notesStyle>
+</p:notesMaster>
 </file>
 
 <file path=ppt/slideLayouts/slideLayout1.xml><?xml version="1.0" encoding="utf-8"?>
@@ -350,8 +1005,8 @@
           <a:bodyPr/>
           <a:lstStyle/>
           <a:p>
-            <a:fld id="{96DFF08F-DC6B-4601-B491-B0F83F6DD2DA}" type="datetimeFigureOut">
-              <a:rPr lang="en-US" dirty="0"/>
+            <a:fld id="{59F43141-36B0-40CF-8669-7D0FD0B7374B}" type="datetime1">
+              <a:rPr lang="en-US" smtClean="0"/>
               <a:t>5/16/2019</a:t>
             </a:fld>
             <a:endParaRPr lang="en-US" dirty="0"/>
@@ -373,6 +1028,10 @@
           <a:bodyPr/>
           <a:lstStyle/>
           <a:p>
+            <a:r>
+              <a:rPr lang="en-US"/>
+              <a:t>R/finance 2019 - Joseph Loss </a:t>
+            </a:r>
             <a:endParaRPr lang="en-US" dirty="0"/>
           </a:p>
         </p:txBody>
@@ -553,8 +1212,8 @@
           <a:bodyPr/>
           <a:lstStyle/>
           <a:p>
-            <a:fld id="{96DFF08F-DC6B-4601-B491-B0F83F6DD2DA}" type="datetimeFigureOut">
-              <a:rPr lang="en-US" dirty="0"/>
+            <a:fld id="{801C7C19-1958-4FC4-A02D-AE43942B1B8D}" type="datetime1">
+              <a:rPr lang="en-US" smtClean="0"/>
               <a:t>5/16/2019</a:t>
             </a:fld>
             <a:endParaRPr lang="en-US" dirty="0"/>
@@ -576,6 +1235,10 @@
           <a:bodyPr/>
           <a:lstStyle/>
           <a:p>
+            <a:r>
+              <a:rPr lang="en-US"/>
+              <a:t>R/finance 2019 - Joseph Loss </a:t>
+            </a:r>
             <a:endParaRPr lang="en-US" dirty="0"/>
           </a:p>
         </p:txBody>
@@ -804,8 +1467,8 @@
           <a:bodyPr/>
           <a:lstStyle/>
           <a:p>
-            <a:fld id="{96DFF08F-DC6B-4601-B491-B0F83F6DD2DA}" type="datetimeFigureOut">
-              <a:rPr lang="en-US" dirty="0"/>
+            <a:fld id="{C9B8409A-081B-4640-B507-A77FE37F0937}" type="datetime1">
+              <a:rPr lang="en-US" smtClean="0"/>
               <a:t>5/16/2019</a:t>
             </a:fld>
             <a:endParaRPr lang="en-US" dirty="0"/>
@@ -827,6 +1490,10 @@
           <a:bodyPr/>
           <a:lstStyle/>
           <a:p>
+            <a:r>
+              <a:rPr lang="en-US"/>
+              <a:t>R/finance 2019 - Joseph Loss </a:t>
+            </a:r>
             <a:endParaRPr lang="en-US" dirty="0"/>
           </a:p>
         </p:txBody>
@@ -969,8 +1636,8 @@
           <a:bodyPr/>
           <a:lstStyle/>
           <a:p>
-            <a:fld id="{D62CEF3B-A037-46D0-B02C-1428F07E9383}" type="datetimeFigureOut">
-              <a:rPr lang="en-US" dirty="0"/>
+            <a:fld id="{E882F398-AAD7-4E54-9354-7F4897D0D13C}" type="datetime1">
+              <a:rPr lang="en-US" smtClean="0"/>
               <a:t>5/16/2019</a:t>
             </a:fld>
             <a:endParaRPr lang="en-US" dirty="0"/>
@@ -992,6 +1659,10 @@
           <a:bodyPr/>
           <a:lstStyle/>
           <a:p>
+            <a:r>
+              <a:rPr lang="en-US"/>
+              <a:t>R/finance 2019 - Joseph Loss </a:t>
+            </a:r>
             <a:endParaRPr lang="en-US" dirty="0"/>
           </a:p>
         </p:txBody>
@@ -1307,8 +1978,8 @@
           <a:bodyPr/>
           <a:lstStyle/>
           <a:p>
-            <a:fld id="{96DFF08F-DC6B-4601-B491-B0F83F6DD2DA}" type="datetimeFigureOut">
-              <a:rPr lang="en-US" dirty="0"/>
+            <a:fld id="{96CC9834-610C-48D2-9D5A-800370EC52E6}" type="datetime1">
+              <a:rPr lang="en-US" smtClean="0"/>
               <a:t>5/16/2019</a:t>
             </a:fld>
             <a:endParaRPr lang="en-US" dirty="0"/>
@@ -1330,6 +2001,10 @@
           <a:bodyPr/>
           <a:lstStyle/>
           <a:p>
+            <a:r>
+              <a:rPr lang="en-US"/>
+              <a:t>R/finance 2019 - Joseph Loss </a:t>
+            </a:r>
             <a:endParaRPr lang="en-US" dirty="0"/>
           </a:p>
         </p:txBody>
@@ -1577,8 +2252,8 @@
           <a:bodyPr/>
           <a:lstStyle/>
           <a:p>
-            <a:fld id="{96DFF08F-DC6B-4601-B491-B0F83F6DD2DA}" type="datetimeFigureOut">
-              <a:rPr lang="en-US" dirty="0"/>
+            <a:fld id="{25014CED-E72D-4F5C-8096-2B558EDE56E2}" type="datetime1">
+              <a:rPr lang="en-US" smtClean="0"/>
               <a:t>5/16/2019</a:t>
             </a:fld>
             <a:endParaRPr lang="en-US" dirty="0"/>
@@ -1600,6 +2275,10 @@
           <a:bodyPr/>
           <a:lstStyle/>
           <a:p>
+            <a:r>
+              <a:rPr lang="en-US"/>
+              <a:t>R/finance 2019 - Joseph Loss </a:t>
+            </a:r>
             <a:endParaRPr lang="en-US" dirty="0"/>
           </a:p>
         </p:txBody>
@@ -1951,8 +2630,8 @@
           <a:bodyPr/>
           <a:lstStyle/>
           <a:p>
-            <a:fld id="{96DFF08F-DC6B-4601-B491-B0F83F6DD2DA}" type="datetimeFigureOut">
-              <a:rPr lang="en-US" dirty="0"/>
+            <a:fld id="{98B2A811-FDCB-46F3-A27F-692BFB80C2A0}" type="datetime1">
+              <a:rPr lang="en-US" smtClean="0"/>
               <a:t>5/16/2019</a:t>
             </a:fld>
             <a:endParaRPr lang="en-US" dirty="0"/>
@@ -1974,6 +2653,10 @@
           <a:bodyPr/>
           <a:lstStyle/>
           <a:p>
+            <a:r>
+              <a:rPr lang="en-US"/>
+              <a:t>R/finance 2019 - Joseph Loss </a:t>
+            </a:r>
             <a:endParaRPr lang="en-US" dirty="0"/>
           </a:p>
         </p:txBody>
@@ -2064,8 +2747,8 @@
           <a:bodyPr/>
           <a:lstStyle/>
           <a:p>
-            <a:fld id="{96DFF08F-DC6B-4601-B491-B0F83F6DD2DA}" type="datetimeFigureOut">
-              <a:rPr lang="en-US" dirty="0"/>
+            <a:fld id="{40B1479A-33C6-421F-91F6-9B497D73F85D}" type="datetime1">
+              <a:rPr lang="en-US" smtClean="0"/>
               <a:t>5/16/2019</a:t>
             </a:fld>
             <a:endParaRPr lang="en-US" dirty="0"/>
@@ -2087,6 +2770,10 @@
           <a:bodyPr/>
           <a:lstStyle/>
           <a:p>
+            <a:r>
+              <a:rPr lang="en-US"/>
+              <a:t>R/finance 2019 - Joseph Loss </a:t>
+            </a:r>
             <a:endParaRPr lang="en-US" dirty="0"/>
           </a:p>
         </p:txBody>
@@ -2230,9 +2917,8 @@
           <a:bodyPr/>
           <a:lstStyle/>
           <a:p>
-            <a:fld id="{96DFF08F-DC6B-4601-B491-B0F83F6DD2DA}" type="datetimeFigureOut">
-              <a:rPr lang="en-US" dirty="0"/>
-              <a:pPr/>
+            <a:fld id="{B4EBE95D-672D-41AC-B2D6-C37CB166E60E}" type="datetime1">
+              <a:rPr lang="en-US" smtClean="0"/>
               <a:t>5/16/2019</a:t>
             </a:fld>
             <a:endParaRPr lang="en-US" dirty="0"/>
@@ -2262,6 +2948,10 @@
             </a:lvl1pPr>
           </a:lstStyle>
           <a:p>
+            <a:r>
+              <a:rPr lang="en-US"/>
+              <a:t>R/finance 2019 - Joseph Loss </a:t>
+            </a:r>
             <a:endParaRPr lang="en-US" dirty="0"/>
           </a:p>
         </p:txBody>
@@ -2581,9 +3271,8 @@
             </a:lvl1pPr>
           </a:lstStyle>
           <a:p>
-            <a:fld id="{96DFF08F-DC6B-4601-B491-B0F83F6DD2DA}" type="datetimeFigureOut">
-              <a:rPr lang="en-US" dirty="0"/>
-              <a:pPr/>
+            <a:fld id="{B6B78D39-3C14-4E78-9ADA-E5D66EC7A8E4}" type="datetime1">
+              <a:rPr lang="en-US" smtClean="0"/>
               <a:t>5/16/2019</a:t>
             </a:fld>
             <a:endParaRPr lang="en-US" dirty="0"/>
@@ -2618,6 +3307,10 @@
             </a:lvl1pPr>
           </a:lstStyle>
           <a:p>
+            <a:r>
+              <a:rPr lang="en-US"/>
+              <a:t>R/finance 2019 - Joseph Loss </a:t>
+            </a:r>
             <a:endParaRPr lang="en-US" dirty="0"/>
           </a:p>
         </p:txBody>
@@ -2955,8 +3648,8 @@
           <a:bodyPr/>
           <a:lstStyle/>
           <a:p>
-            <a:fld id="{96DFF08F-DC6B-4601-B491-B0F83F6DD2DA}" type="datetimeFigureOut">
-              <a:rPr lang="en-US" dirty="0"/>
+            <a:fld id="{604CA3DA-61D6-4895-B17A-131D90C1A0D8}" type="datetime1">
+              <a:rPr lang="en-US" smtClean="0"/>
               <a:t>5/16/2019</a:t>
             </a:fld>
             <a:endParaRPr lang="en-US" dirty="0"/>
@@ -2978,6 +3671,10 @@
           <a:bodyPr/>
           <a:lstStyle/>
           <a:p>
+            <a:r>
+              <a:rPr lang="en-US"/>
+              <a:t>R/finance 2019 - Joseph Loss </a:t>
+            </a:r>
             <a:endParaRPr lang="en-US" dirty="0"/>
           </a:p>
         </p:txBody>
@@ -3237,9 +3934,8 @@
             </a:lvl1pPr>
           </a:lstStyle>
           <a:p>
-            <a:fld id="{96DFF08F-DC6B-4601-B491-B0F83F6DD2DA}" type="datetimeFigureOut">
-              <a:rPr lang="en-US" dirty="0"/>
-              <a:pPr/>
+            <a:fld id="{874B0337-D539-4C49-BD44-C70C88A9AADF}" type="datetime1">
+              <a:rPr lang="en-US" smtClean="0"/>
               <a:t>5/16/2019</a:t>
             </a:fld>
             <a:endParaRPr lang="en-US" dirty="0"/>
@@ -3277,6 +3973,10 @@
             </a:lvl1pPr>
           </a:lstStyle>
           <a:p>
+            <a:r>
+              <a:rPr lang="en-US"/>
+              <a:t>R/finance 2019 - Joseph Loss </a:t>
+            </a:r>
             <a:endParaRPr lang="en-US" dirty="0"/>
           </a:p>
         </p:txBody>
@@ -3375,6 +4075,7 @@
     <p:sldLayoutId id="2147483658" r:id="rId10"/>
     <p:sldLayoutId id="2147483659" r:id="rId11"/>
   </p:sldLayoutIdLst>
+  <p:hf hdr="0" dt="0"/>
   <p:txStyles>
     <p:titleStyle>
       <a:lvl1pPr algn="l" defTabSz="914400" rtl="0" eaLnBrk="1" latinLnBrk="0" hangingPunct="1">
@@ -3779,7 +4480,7 @@
         <p:spPr>
           <a:xfrm>
             <a:off x="2738825" y="758952"/>
-            <a:ext cx="8421230" cy="3566160"/>
+            <a:ext cx="8421230" cy="2127683"/>
           </a:xfrm>
         </p:spPr>
         <p:txBody>
@@ -3791,7 +4492,15 @@
             <a:pPr algn="r"/>
             <a:r>
               <a:rPr lang="en-US" sz="7200" dirty="0"/>
-              <a:t>Options Pricing in Discrete Levy Models</a:t>
+              <a:t>Options Pricing in Discrete </a:t>
+            </a:r>
+            <a:r>
+              <a:rPr lang="en-US" sz="7200" dirty="0" err="1"/>
+              <a:t>Lévy</a:t>
+            </a:r>
+            <a:r>
+              <a:rPr lang="en-US" sz="7200" dirty="0"/>
+              <a:t> Models</a:t>
             </a:r>
           </a:p>
         </p:txBody>
@@ -3825,7 +4534,7 @@
           <a:lstStyle/>
           <a:p>
             <a:r>
-              <a:rPr lang="en-US" kern="0" cap="none" spc="0" dirty="0">
+              <a:rPr lang="en-US" b="1" kern="0" cap="none" spc="0" dirty="0">
                 <a:latin typeface="Arial" panose="020B0604020202020204" pitchFamily="34" charset="0"/>
                 <a:cs typeface="Arial" panose="020B0604020202020204" pitchFamily="34" charset="0"/>
               </a:rPr>
@@ -3856,6 +4565,387 @@
           </a:p>
         </p:txBody>
       </p:sp>
+      <p:sp>
+        <p:nvSpPr>
+          <p:cNvPr id="4" name="Subtitle 2">
+            <a:extLst>
+              <a:ext uri="{FF2B5EF4-FFF2-40B4-BE49-F238E27FC236}">
+                <a16:creationId xmlns:a16="http://schemas.microsoft.com/office/drawing/2014/main" id="{CAAA88D9-0849-4D76-9A01-BE7CD62484A4}"/>
+              </a:ext>
+            </a:extLst>
+          </p:cNvPr>
+          <p:cNvSpPr txBox="1">
+            <a:spLocks/>
+          </p:cNvSpPr>
+          <p:nvPr/>
+        </p:nvSpPr>
+        <p:spPr>
+          <a:xfrm>
+            <a:off x="1252451" y="3496232"/>
+            <a:ext cx="10058400" cy="1434353"/>
+          </a:xfrm>
+          <a:prstGeom prst="rect">
+            <a:avLst/>
+          </a:prstGeom>
+        </p:spPr>
+        <p:txBody>
+          <a:bodyPr vert="horz" lIns="91440" tIns="45720" rIns="91440" bIns="45720" rtlCol="0">
+            <a:normAutofit/>
+          </a:bodyPr>
+          <a:lstStyle>
+            <a:lvl1pPr marL="0" indent="0" algn="l" defTabSz="914400" rtl="0" eaLnBrk="1" latinLnBrk="0" hangingPunct="1">
+              <a:lnSpc>
+                <a:spcPct val="90000"/>
+              </a:lnSpc>
+              <a:spcBef>
+                <a:spcPts val="1200"/>
+              </a:spcBef>
+              <a:spcAft>
+                <a:spcPts val="200"/>
+              </a:spcAft>
+              <a:buClr>
+                <a:schemeClr val="accent1"/>
+              </a:buClr>
+              <a:buSzPct val="100000"/>
+              <a:buFont typeface="Calibri" panose="020F0502020204030204" pitchFamily="34" charset="0"/>
+              <a:buNone/>
+              <a:defRPr sz="2400" kern="1200" cap="all" spc="200" baseline="0">
+                <a:solidFill>
+                  <a:schemeClr val="tx2"/>
+                </a:solidFill>
+                <a:latin typeface="+mj-lt"/>
+                <a:ea typeface="+mn-ea"/>
+                <a:cs typeface="+mn-cs"/>
+              </a:defRPr>
+            </a:lvl1pPr>
+            <a:lvl2pPr marL="457200" indent="0" algn="ctr" defTabSz="914400" rtl="0" eaLnBrk="1" latinLnBrk="0" hangingPunct="1">
+              <a:lnSpc>
+                <a:spcPct val="90000"/>
+              </a:lnSpc>
+              <a:spcBef>
+                <a:spcPts val="200"/>
+              </a:spcBef>
+              <a:spcAft>
+                <a:spcPts val="400"/>
+              </a:spcAft>
+              <a:buClr>
+                <a:schemeClr val="accent1"/>
+              </a:buClr>
+              <a:buFont typeface="Calibri" pitchFamily="34" charset="0"/>
+              <a:buNone/>
+              <a:defRPr sz="2400" kern="1200">
+                <a:solidFill>
+                  <a:schemeClr val="tx1">
+                    <a:lumMod val="75000"/>
+                    <a:lumOff val="25000"/>
+                  </a:schemeClr>
+                </a:solidFill>
+                <a:latin typeface="+mn-lt"/>
+                <a:ea typeface="+mn-ea"/>
+                <a:cs typeface="+mn-cs"/>
+              </a:defRPr>
+            </a:lvl2pPr>
+            <a:lvl3pPr marL="914400" indent="0" algn="ctr" defTabSz="914400" rtl="0" eaLnBrk="1" latinLnBrk="0" hangingPunct="1">
+              <a:lnSpc>
+                <a:spcPct val="90000"/>
+              </a:lnSpc>
+              <a:spcBef>
+                <a:spcPts val="200"/>
+              </a:spcBef>
+              <a:spcAft>
+                <a:spcPts val="400"/>
+              </a:spcAft>
+              <a:buClr>
+                <a:schemeClr val="accent1"/>
+              </a:buClr>
+              <a:buFont typeface="Calibri" pitchFamily="34" charset="0"/>
+              <a:buNone/>
+              <a:defRPr sz="2400" kern="1200">
+                <a:solidFill>
+                  <a:schemeClr val="tx1">
+                    <a:lumMod val="75000"/>
+                    <a:lumOff val="25000"/>
+                  </a:schemeClr>
+                </a:solidFill>
+                <a:latin typeface="+mn-lt"/>
+                <a:ea typeface="+mn-ea"/>
+                <a:cs typeface="+mn-cs"/>
+              </a:defRPr>
+            </a:lvl3pPr>
+            <a:lvl4pPr marL="1371600" indent="0" algn="ctr" defTabSz="914400" rtl="0" eaLnBrk="1" latinLnBrk="0" hangingPunct="1">
+              <a:lnSpc>
+                <a:spcPct val="90000"/>
+              </a:lnSpc>
+              <a:spcBef>
+                <a:spcPts val="200"/>
+              </a:spcBef>
+              <a:spcAft>
+                <a:spcPts val="400"/>
+              </a:spcAft>
+              <a:buClr>
+                <a:schemeClr val="accent1"/>
+              </a:buClr>
+              <a:buFont typeface="Calibri" pitchFamily="34" charset="0"/>
+              <a:buNone/>
+              <a:defRPr sz="2000" kern="1200">
+                <a:solidFill>
+                  <a:schemeClr val="tx1">
+                    <a:lumMod val="75000"/>
+                    <a:lumOff val="25000"/>
+                  </a:schemeClr>
+                </a:solidFill>
+                <a:latin typeface="+mn-lt"/>
+                <a:ea typeface="+mn-ea"/>
+                <a:cs typeface="+mn-cs"/>
+              </a:defRPr>
+            </a:lvl4pPr>
+            <a:lvl5pPr marL="1828800" indent="0" algn="ctr" defTabSz="914400" rtl="0" eaLnBrk="1" latinLnBrk="0" hangingPunct="1">
+              <a:lnSpc>
+                <a:spcPct val="90000"/>
+              </a:lnSpc>
+              <a:spcBef>
+                <a:spcPts val="200"/>
+              </a:spcBef>
+              <a:spcAft>
+                <a:spcPts val="400"/>
+              </a:spcAft>
+              <a:buClr>
+                <a:schemeClr val="accent1"/>
+              </a:buClr>
+              <a:buFont typeface="Calibri" pitchFamily="34" charset="0"/>
+              <a:buNone/>
+              <a:defRPr sz="2000" kern="1200">
+                <a:solidFill>
+                  <a:schemeClr val="tx1">
+                    <a:lumMod val="75000"/>
+                    <a:lumOff val="25000"/>
+                  </a:schemeClr>
+                </a:solidFill>
+                <a:latin typeface="+mn-lt"/>
+                <a:ea typeface="+mn-ea"/>
+                <a:cs typeface="+mn-cs"/>
+              </a:defRPr>
+            </a:lvl5pPr>
+            <a:lvl6pPr marL="2286000" indent="0" algn="ctr" defTabSz="914400" rtl="0" eaLnBrk="1" latinLnBrk="0" hangingPunct="1">
+              <a:lnSpc>
+                <a:spcPct val="90000"/>
+              </a:lnSpc>
+              <a:spcBef>
+                <a:spcPts val="200"/>
+              </a:spcBef>
+              <a:spcAft>
+                <a:spcPts val="400"/>
+              </a:spcAft>
+              <a:buClr>
+                <a:schemeClr val="accent1"/>
+              </a:buClr>
+              <a:buFont typeface="Calibri" pitchFamily="34" charset="0"/>
+              <a:buNone/>
+              <a:defRPr sz="2000" kern="1200">
+                <a:solidFill>
+                  <a:schemeClr val="tx1">
+                    <a:lumMod val="75000"/>
+                    <a:lumOff val="25000"/>
+                  </a:schemeClr>
+                </a:solidFill>
+                <a:latin typeface="+mn-lt"/>
+                <a:ea typeface="+mn-ea"/>
+                <a:cs typeface="+mn-cs"/>
+              </a:defRPr>
+            </a:lvl6pPr>
+            <a:lvl7pPr marL="2743200" indent="0" algn="ctr" defTabSz="914400" rtl="0" eaLnBrk="1" latinLnBrk="0" hangingPunct="1">
+              <a:lnSpc>
+                <a:spcPct val="90000"/>
+              </a:lnSpc>
+              <a:spcBef>
+                <a:spcPts val="200"/>
+              </a:spcBef>
+              <a:spcAft>
+                <a:spcPts val="400"/>
+              </a:spcAft>
+              <a:buClr>
+                <a:schemeClr val="accent1"/>
+              </a:buClr>
+              <a:buFont typeface="Calibri" pitchFamily="34" charset="0"/>
+              <a:buNone/>
+              <a:defRPr sz="2000" kern="1200">
+                <a:solidFill>
+                  <a:schemeClr val="tx1">
+                    <a:lumMod val="75000"/>
+                    <a:lumOff val="25000"/>
+                  </a:schemeClr>
+                </a:solidFill>
+                <a:latin typeface="+mn-lt"/>
+                <a:ea typeface="+mn-ea"/>
+                <a:cs typeface="+mn-cs"/>
+              </a:defRPr>
+            </a:lvl7pPr>
+            <a:lvl8pPr marL="3200400" indent="0" algn="ctr" defTabSz="914400" rtl="0" eaLnBrk="1" latinLnBrk="0" hangingPunct="1">
+              <a:lnSpc>
+                <a:spcPct val="90000"/>
+              </a:lnSpc>
+              <a:spcBef>
+                <a:spcPts val="200"/>
+              </a:spcBef>
+              <a:spcAft>
+                <a:spcPts val="400"/>
+              </a:spcAft>
+              <a:buClr>
+                <a:schemeClr val="accent1"/>
+              </a:buClr>
+              <a:buFont typeface="Calibri" pitchFamily="34" charset="0"/>
+              <a:buNone/>
+              <a:defRPr sz="2000" kern="1200">
+                <a:solidFill>
+                  <a:schemeClr val="tx1">
+                    <a:lumMod val="75000"/>
+                    <a:lumOff val="25000"/>
+                  </a:schemeClr>
+                </a:solidFill>
+                <a:latin typeface="+mn-lt"/>
+                <a:ea typeface="+mn-ea"/>
+                <a:cs typeface="+mn-cs"/>
+              </a:defRPr>
+            </a:lvl8pPr>
+            <a:lvl9pPr marL="3657600" indent="0" algn="ctr" defTabSz="914400" rtl="0" eaLnBrk="1" latinLnBrk="0" hangingPunct="1">
+              <a:lnSpc>
+                <a:spcPct val="90000"/>
+              </a:lnSpc>
+              <a:spcBef>
+                <a:spcPts val="200"/>
+              </a:spcBef>
+              <a:spcAft>
+                <a:spcPts val="400"/>
+              </a:spcAft>
+              <a:buClr>
+                <a:schemeClr val="accent1"/>
+              </a:buClr>
+              <a:buFont typeface="Calibri" pitchFamily="34" charset="0"/>
+              <a:buNone/>
+              <a:defRPr sz="2000" kern="1200">
+                <a:solidFill>
+                  <a:schemeClr val="tx1">
+                    <a:lumMod val="75000"/>
+                    <a:lumOff val="25000"/>
+                  </a:schemeClr>
+                </a:solidFill>
+                <a:latin typeface="+mn-lt"/>
+                <a:ea typeface="+mn-ea"/>
+                <a:cs typeface="+mn-cs"/>
+              </a:defRPr>
+            </a:lvl9pPr>
+          </a:lstStyle>
+          <a:p>
+            <a:pPr algn="r"/>
+            <a:r>
+              <a:rPr lang="en-US" sz="2300" kern="0" cap="none" spc="0" dirty="0">
+                <a:latin typeface="Arial" panose="020B0604020202020204" pitchFamily="34" charset="0"/>
+                <a:cs typeface="Arial" panose="020B0604020202020204" pitchFamily="34" charset="0"/>
+              </a:rPr>
+              <a:t>Source Code and Documentation:</a:t>
+            </a:r>
+          </a:p>
+          <a:p>
+            <a:pPr algn="r"/>
+            <a:endParaRPr lang="en-US" sz="2300" cap="none" dirty="0">
+              <a:latin typeface="Arial" panose="020B0604020202020204" pitchFamily="34" charset="0"/>
+              <a:cs typeface="Arial" panose="020B0604020202020204" pitchFamily="34" charset="0"/>
+            </a:endParaRPr>
+          </a:p>
+        </p:txBody>
+      </p:sp>
+      <p:sp>
+        <p:nvSpPr>
+          <p:cNvPr id="5" name="Footer Placeholder 4">
+            <a:extLst>
+              <a:ext uri="{FF2B5EF4-FFF2-40B4-BE49-F238E27FC236}">
+                <a16:creationId xmlns:a16="http://schemas.microsoft.com/office/drawing/2014/main" id="{6D03CAE1-967C-48DD-9277-2A45E3BAE002}"/>
+              </a:ext>
+            </a:extLst>
+          </p:cNvPr>
+          <p:cNvSpPr>
+            <a:spLocks noGrp="1"/>
+          </p:cNvSpPr>
+          <p:nvPr>
+            <p:ph type="ftr" sz="quarter" idx="11"/>
+          </p:nvPr>
+        </p:nvSpPr>
+        <p:spPr>
+          <a:xfrm>
+            <a:off x="3686185" y="6468749"/>
+            <a:ext cx="4822804" cy="365125"/>
+          </a:xfrm>
+        </p:spPr>
+        <p:txBody>
+          <a:bodyPr/>
+          <a:lstStyle/>
+          <a:p>
+            <a:r>
+              <a:rPr lang="en-US" sz="1100" dirty="0"/>
+              <a:t>R/finance 2019 - Joseph Loss </a:t>
+            </a:r>
+          </a:p>
+        </p:txBody>
+      </p:sp>
+      <p:sp>
+        <p:nvSpPr>
+          <p:cNvPr id="6" name="Slide Number Placeholder 5">
+            <a:extLst>
+              <a:ext uri="{FF2B5EF4-FFF2-40B4-BE49-F238E27FC236}">
+                <a16:creationId xmlns:a16="http://schemas.microsoft.com/office/drawing/2014/main" id="{19E76543-DC17-4D04-ACDC-EF248C9192F8}"/>
+              </a:ext>
+            </a:extLst>
+          </p:cNvPr>
+          <p:cNvSpPr>
+            <a:spLocks noGrp="1"/>
+          </p:cNvSpPr>
+          <p:nvPr>
+            <p:ph type="sldNum" sz="quarter" idx="12"/>
+          </p:nvPr>
+        </p:nvSpPr>
+        <p:spPr/>
+        <p:txBody>
+          <a:bodyPr/>
+          <a:lstStyle/>
+          <a:p>
+            <a:fld id="{4FAB73BC-B049-4115-A692-8D63A059BFB8}" type="slidenum">
+              <a:rPr lang="en-US" sz="1100" smtClean="0"/>
+              <a:t>1</a:t>
+            </a:fld>
+            <a:endParaRPr lang="en-US" sz="1100" dirty="0"/>
+          </a:p>
+        </p:txBody>
+      </p:sp>
+      <p:pic>
+        <p:nvPicPr>
+          <p:cNvPr id="9" name="Picture 8">
+            <a:extLst>
+              <a:ext uri="{FF2B5EF4-FFF2-40B4-BE49-F238E27FC236}">
+                <a16:creationId xmlns:a16="http://schemas.microsoft.com/office/drawing/2014/main" id="{61844C60-7D4C-4352-86EF-7018AA7F2D55}"/>
+              </a:ext>
+            </a:extLst>
+          </p:cNvPr>
+          <p:cNvPicPr>
+            <a:picLocks noChangeAspect="1"/>
+          </p:cNvPicPr>
+          <p:nvPr/>
+        </p:nvPicPr>
+        <p:blipFill>
+          <a:blip r:embed="rId2"/>
+          <a:stretch>
+            <a:fillRect/>
+          </a:stretch>
+        </p:blipFill>
+        <p:spPr>
+          <a:xfrm>
+            <a:off x="2877273" y="3780872"/>
+            <a:ext cx="9144793" cy="1743607"/>
+          </a:xfrm>
+          <a:prstGeom prst="rect">
+            <a:avLst/>
+          </a:prstGeom>
+        </p:spPr>
+      </p:pic>
     </p:spTree>
     <p:extLst>
       <p:ext uri="{BB962C8B-B14F-4D97-AF65-F5344CB8AC3E}">
@@ -3918,6 +5008,11 @@
               <a:rPr lang="en-US" sz="4700" dirty="0"/>
               <a:t>Background: European Vanilla Put Options</a:t>
             </a:r>
+            <a:r>
+              <a:rPr lang="en-US" baseline="30000" dirty="0"/>
+              <a:t>†</a:t>
+            </a:r>
+            <a:endParaRPr lang="en-US" sz="4700" dirty="0"/>
           </a:p>
         </p:txBody>
       </p:sp>
@@ -3954,8 +5049,8 @@
           </a:p>
         </p:txBody>
       </p:sp>
-      <mc:AlternateContent xmlns:mc="http://schemas.openxmlformats.org/markup-compatibility/2006" xmlns:a14="http://schemas.microsoft.com/office/drawing/2010/main">
-        <mc:Choice Requires="a14">
+      <mc:AlternateContent xmlns:mc="http://schemas.openxmlformats.org/markup-compatibility/2006">
+        <mc:Choice xmlns:a14="http://schemas.microsoft.com/office/drawing/2010/main" Requires="a14">
           <p:sp>
             <p:nvSpPr>
               <p:cNvPr id="5" name="Content Placeholder 4">
@@ -3975,11 +5070,30 @@
             <p:spPr>
               <a:xfrm>
                 <a:off x="1097280" y="2577717"/>
-                <a:ext cx="4937760" cy="3286760"/>
+                <a:ext cx="4937760" cy="2559059"/>
               </a:xfrm>
+              <a:ln>
+                <a:noFill/>
+              </a:ln>
             </p:spPr>
+            <p:style>
+              <a:lnRef idx="2">
+                <a:schemeClr val="dk1"/>
+              </a:lnRef>
+              <a:fillRef idx="1">
+                <a:schemeClr val="lt1"/>
+              </a:fillRef>
+              <a:effectRef idx="0">
+                <a:schemeClr val="dk1"/>
+              </a:effectRef>
+              <a:fontRef idx="minor">
+                <a:schemeClr val="dk1"/>
+              </a:fontRef>
+            </p:style>
             <p:txBody>
-              <a:bodyPr/>
+              <a:bodyPr>
+                <a:normAutofit fontScale="92500"/>
+              </a:bodyPr>
               <a:lstStyle/>
               <a:p>
                 <a14:m>
@@ -4103,58 +5217,10 @@
                   <a:rPr lang="en-US" dirty="0">
                     <a:cs typeface="Arial" panose="020B0604020202020204" pitchFamily="34" charset="0"/>
                   </a:rPr>
-                  <a:t>NIG process is simulated through a Brownian subordination </a:t>
+                  <a:t>NIG process is simulated through a Brownian      subordination for </a:t>
                 </a:r>
-              </a:p>
-              <a:p>
-                <a:pPr indent="-182880">
-                  <a:buFont typeface="Arial" panose="020B0604020202020204" pitchFamily="34" charset="0"/>
-                  <a:buChar char="•"/>
-                </a:pPr>
                 <a14:m>
                   <m:oMath xmlns:m="http://schemas.openxmlformats.org/officeDocument/2006/math">
-                    <m:sSub>
-                      <m:sSubPr>
-                        <m:ctrlPr>
-                          <a:rPr lang="en-US" b="0" i="1" smtClean="0">
-                            <a:latin typeface="Cambria Math" panose="02040503050406030204" pitchFamily="18" charset="0"/>
-                            <a:cs typeface="Arial" panose="020B0604020202020204" pitchFamily="34" charset="0"/>
-                          </a:rPr>
-                        </m:ctrlPr>
-                      </m:sSubPr>
-                      <m:e>
-                        <m:r>
-                          <a:rPr lang="en-US" b="0" i="1" smtClean="0">
-                            <a:latin typeface="Cambria Math" panose="02040503050406030204" pitchFamily="18" charset="0"/>
-                            <a:cs typeface="Arial" panose="020B0604020202020204" pitchFamily="34" charset="0"/>
-                          </a:rPr>
-                          <m:t>𝑋</m:t>
-                        </m:r>
-                      </m:e>
-                      <m:sub>
-                        <m:r>
-                          <a:rPr lang="en-US" b="0" i="1" smtClean="0">
-                            <a:latin typeface="Cambria Math" panose="02040503050406030204" pitchFamily="18" charset="0"/>
-                            <a:cs typeface="Arial" panose="020B0604020202020204" pitchFamily="34" charset="0"/>
-                          </a:rPr>
-                          <m:t>𝑡</m:t>
-                        </m:r>
-                      </m:sub>
-                    </m:sSub>
-                    <m:r>
-                      <a:rPr lang="en-US" b="0" i="0" smtClean="0">
-                        <a:latin typeface="Cambria Math" panose="02040503050406030204" pitchFamily="18" charset="0"/>
-                        <a:cs typeface="Arial" panose="020B0604020202020204" pitchFamily="34" charset="0"/>
-                      </a:rPr>
-                      <m:t>=</m:t>
-                    </m:r>
-                    <m:r>
-                      <a:rPr lang="en-US" b="0" i="1" smtClean="0">
-                        <a:latin typeface="Cambria Math" panose="02040503050406030204" pitchFamily="18" charset="0"/>
-                        <a:cs typeface="Arial" panose="020B0604020202020204" pitchFamily="34" charset="0"/>
-                      </a:rPr>
-                      <m:t>𝜇</m:t>
-                    </m:r>
                     <m:r>
                       <a:rPr lang="en-US" b="0" i="1" smtClean="0">
                         <a:latin typeface="Cambria Math" panose="02040503050406030204" pitchFamily="18" charset="0"/>
@@ -4167,10 +5233,94 @@
                         <a:latin typeface="Cambria Math" panose="02040503050406030204" pitchFamily="18" charset="0"/>
                         <a:cs typeface="Arial" panose="020B0604020202020204" pitchFamily="34" charset="0"/>
                       </a:rPr>
+                      <m:t>&gt;</m:t>
+                    </m:r>
+                    <m:r>
+                      <a:rPr lang="en-US" b="0" i="1" smtClean="0">
+                        <a:latin typeface="Cambria Math" panose="02040503050406030204" pitchFamily="18" charset="0"/>
+                        <a:cs typeface="Arial" panose="020B0604020202020204" pitchFamily="34" charset="0"/>
+                      </a:rPr>
+                      <m:t>0</m:t>
+                    </m:r>
+                  </m:oMath>
+                </a14:m>
+                <a:r>
+                  <a:rPr lang="en-US" dirty="0">
+                    <a:cs typeface="Arial" panose="020B0604020202020204" pitchFamily="34" charset="0"/>
+                  </a:rPr>
+                  <a:t>: </a:t>
+                </a:r>
+                <a:br>
+                  <a:rPr lang="en-US" dirty="0">
+                    <a:cs typeface="Arial" panose="020B0604020202020204" pitchFamily="34" charset="0"/>
+                  </a:rPr>
+                </a:br>
+                <a:br>
+                  <a:rPr lang="en-US" sz="1100" b="0" i="1" dirty="0">
+                    <a:latin typeface="Cambria Math" panose="02040503050406030204" pitchFamily="18" charset="0"/>
+                    <a:cs typeface="Arial" panose="020B0604020202020204" pitchFamily="34" charset="0"/>
+                  </a:rPr>
+                </a:br>
+                <a14:m>
+                  <m:oMath xmlns:m="http://schemas.openxmlformats.org/officeDocument/2006/math">
+                    <m:sSub>
+                      <m:sSubPr>
+                        <m:ctrlPr>
+                          <a:rPr lang="en-US" sz="2400" b="0" i="1" smtClean="0">
+                            <a:latin typeface="Cambria Math" panose="02040503050406030204" pitchFamily="18" charset="0"/>
+                            <a:cs typeface="Arial" panose="020B0604020202020204" pitchFamily="34" charset="0"/>
+                          </a:rPr>
+                        </m:ctrlPr>
+                      </m:sSubPr>
+                      <m:e>
+                        <m:r>
+                          <a:rPr lang="en-US" sz="2400" b="0" i="1" smtClean="0">
+                            <a:latin typeface="Cambria Math" panose="02040503050406030204" pitchFamily="18" charset="0"/>
+                            <a:cs typeface="Arial" panose="020B0604020202020204" pitchFamily="34" charset="0"/>
+                          </a:rPr>
+                          <m:t>𝑋</m:t>
+                        </m:r>
+                      </m:e>
+                      <m:sub>
+                        <m:r>
+                          <a:rPr lang="en-US" sz="2400" b="0" i="1" smtClean="0">
+                            <a:latin typeface="Cambria Math" panose="02040503050406030204" pitchFamily="18" charset="0"/>
+                            <a:cs typeface="Arial" panose="020B0604020202020204" pitchFamily="34" charset="0"/>
+                          </a:rPr>
+                          <m:t>𝑡</m:t>
+                        </m:r>
+                      </m:sub>
+                    </m:sSub>
+                    <m:r>
+                      <a:rPr lang="en-US" sz="2400" b="0" i="0" smtClean="0">
+                        <a:latin typeface="Cambria Math" panose="02040503050406030204" pitchFamily="18" charset="0"/>
+                        <a:cs typeface="Arial" panose="020B0604020202020204" pitchFamily="34" charset="0"/>
+                      </a:rPr>
+                      <m:t>=</m:t>
+                    </m:r>
+                    <m:r>
+                      <a:rPr lang="en-US" sz="2400" b="0" i="1" smtClean="0">
+                        <a:latin typeface="Cambria Math" panose="02040503050406030204" pitchFamily="18" charset="0"/>
+                        <a:cs typeface="Arial" panose="020B0604020202020204" pitchFamily="34" charset="0"/>
+                      </a:rPr>
+                      <m:t>𝜇</m:t>
+                    </m:r>
+                    <m:r>
+                      <a:rPr lang="en-US" sz="2400" b="0" i="1" smtClean="0">
+                        <a:latin typeface="Cambria Math" panose="02040503050406030204" pitchFamily="18" charset="0"/>
+                        <a:cs typeface="Arial" panose="020B0604020202020204" pitchFamily="34" charset="0"/>
+                      </a:rPr>
+                      <m:t>𝑡</m:t>
+                    </m:r>
+                    <m:r>
+                      <a:rPr lang="en-US" sz="2400" b="0" i="1" smtClean="0">
+                        <a:latin typeface="Cambria Math" panose="02040503050406030204" pitchFamily="18" charset="0"/>
+                        <a:cs typeface="Arial" panose="020B0604020202020204" pitchFamily="34" charset="0"/>
+                      </a:rPr>
                       <m:t>+</m:t>
                     </m:r>
                     <m:r>
-                      <a:rPr lang="en-US" b="0" i="1" smtClean="0">
+                      <a:rPr lang="en-US" sz="2400" b="0" i="1" smtClean="0">
                         <a:latin typeface="Cambria Math" panose="02040503050406030204" pitchFamily="18" charset="0"/>
                         <a:cs typeface="Arial" panose="020B0604020202020204" pitchFamily="34" charset="0"/>
                       </a:rPr>
@@ -4179,7 +5329,7 @@
                     <m:sSub>
                       <m:sSubPr>
                         <m:ctrlPr>
-                          <a:rPr lang="en-US" b="0" i="1" smtClean="0">
+                          <a:rPr lang="en-US" sz="2400" b="0" i="1" smtClean="0">
                             <a:latin typeface="Cambria Math" panose="02040503050406030204" pitchFamily="18" charset="0"/>
                             <a:cs typeface="Arial" panose="020B0604020202020204" pitchFamily="34" charset="0"/>
                           </a:rPr>
@@ -4187,7 +5337,7 @@
                       </m:sSubPr>
                       <m:e>
                         <m:r>
-                          <a:rPr lang="en-US" b="0" i="1" smtClean="0">
+                          <a:rPr lang="en-US" sz="2400" b="0" i="1" smtClean="0">
                             <a:latin typeface="Cambria Math" panose="02040503050406030204" pitchFamily="18" charset="0"/>
                             <a:cs typeface="Arial" panose="020B0604020202020204" pitchFamily="34" charset="0"/>
                           </a:rPr>
@@ -4196,7 +5346,7 @@
                       </m:e>
                       <m:sub>
                         <m:r>
-                          <a:rPr lang="en-US" b="0" i="1" smtClean="0">
+                          <a:rPr lang="en-US" sz="2400" b="0" i="1" smtClean="0">
                             <a:latin typeface="Cambria Math" panose="02040503050406030204" pitchFamily="18" charset="0"/>
                             <a:cs typeface="Arial" panose="020B0604020202020204" pitchFamily="34" charset="0"/>
                           </a:rPr>
@@ -4205,7 +5355,7 @@
                       </m:sub>
                     </m:sSub>
                     <m:r>
-                      <a:rPr lang="en-US" b="0" i="1" smtClean="0">
+                      <a:rPr lang="en-US" sz="2400" b="0" i="1" smtClean="0">
                         <a:latin typeface="Cambria Math" panose="02040503050406030204" pitchFamily="18" charset="0"/>
                         <a:cs typeface="Arial" panose="020B0604020202020204" pitchFamily="34" charset="0"/>
                       </a:rPr>
@@ -4215,7 +5365,7 @@
                       <m:radPr>
                         <m:degHide m:val="on"/>
                         <m:ctrlPr>
-                          <a:rPr lang="en-US" b="0" i="1" smtClean="0">
+                          <a:rPr lang="en-US" sz="2400" b="0" i="1" smtClean="0">
                             <a:latin typeface="Cambria Math" panose="02040503050406030204" pitchFamily="18" charset="0"/>
                             <a:cs typeface="Arial" panose="020B0604020202020204" pitchFamily="34" charset="0"/>
                           </a:rPr>
@@ -4226,7 +5376,7 @@
                         <m:sSub>
                           <m:sSubPr>
                             <m:ctrlPr>
-                              <a:rPr lang="en-US" b="0" i="1" smtClean="0">
+                              <a:rPr lang="en-US" sz="2400" b="0" i="1" smtClean="0">
                                 <a:latin typeface="Cambria Math" panose="02040503050406030204" pitchFamily="18" charset="0"/>
                                 <a:cs typeface="Arial" panose="020B0604020202020204" pitchFamily="34" charset="0"/>
                               </a:rPr>
@@ -4234,7 +5384,7 @@
                           </m:sSubPr>
                           <m:e>
                             <m:r>
-                              <a:rPr lang="en-US" b="0" i="1" smtClean="0">
+                              <a:rPr lang="en-US" sz="2400" b="0" i="1" smtClean="0">
                                 <a:latin typeface="Cambria Math" panose="02040503050406030204" pitchFamily="18" charset="0"/>
                                 <a:cs typeface="Arial" panose="020B0604020202020204" pitchFamily="34" charset="0"/>
                               </a:rPr>
@@ -4243,7 +5393,7 @@
                           </m:e>
                           <m:sub>
                             <m:r>
-                              <a:rPr lang="en-US" b="0" i="1" smtClean="0">
+                              <a:rPr lang="en-US" sz="2400" b="0" i="1" smtClean="0">
                                 <a:latin typeface="Cambria Math" panose="02040503050406030204" pitchFamily="18" charset="0"/>
                                 <a:cs typeface="Arial" panose="020B0604020202020204" pitchFamily="34" charset="0"/>
                               </a:rPr>
@@ -4256,7 +5406,7 @@
                     <m:sSub>
                       <m:sSubPr>
                         <m:ctrlPr>
-                          <a:rPr lang="en-US" b="0" i="1" smtClean="0">
+                          <a:rPr lang="en-US" sz="2400" b="0" i="1" smtClean="0">
                             <a:latin typeface="Cambria Math" panose="02040503050406030204" pitchFamily="18" charset="0"/>
                             <a:cs typeface="Arial" panose="020B0604020202020204" pitchFamily="34" charset="0"/>
                           </a:rPr>
@@ -4264,7 +5414,7 @@
                       </m:sSubPr>
                       <m:e>
                         <m:r>
-                          <a:rPr lang="en-US" b="0" i="1" smtClean="0">
+                          <a:rPr lang="en-US" sz="2400" b="0" i="1" smtClean="0">
                             <a:latin typeface="Cambria Math" panose="02040503050406030204" pitchFamily="18" charset="0"/>
                             <a:cs typeface="Arial" panose="020B0604020202020204" pitchFamily="34" charset="0"/>
                           </a:rPr>
@@ -4273,7 +5423,7 @@
                       </m:e>
                       <m:sub>
                         <m:r>
-                          <a:rPr lang="en-US" b="0" i="1" smtClean="0">
+                          <a:rPr lang="en-US" sz="2400" b="0" i="1" smtClean="0">
                             <a:latin typeface="Cambria Math" panose="02040503050406030204" pitchFamily="18" charset="0"/>
                             <a:cs typeface="Arial" panose="020B0604020202020204" pitchFamily="34" charset="0"/>
                           </a:rPr>
@@ -4282,16 +5432,23 @@
                       </m:sub>
                     </m:sSub>
                     <m:r>
-                      <a:rPr lang="en-US" b="0" i="1" smtClean="0">
+                      <a:rPr lang="en-US" sz="2400" b="0" i="1" smtClean="0">
                         <a:latin typeface="Cambria Math" panose="02040503050406030204" pitchFamily="18" charset="0"/>
                         <a:cs typeface="Arial" panose="020B0604020202020204" pitchFamily="34" charset="0"/>
                       </a:rPr>
-                      <m:t>          </m:t>
+                      <m:t>       </m:t>
+                    </m:r>
+                    <m:r>
+                      <a:rPr lang="en-US" sz="2400" b="0" i="1" smtClean="0">
+                        <a:latin typeface="Cambria Math" panose="02040503050406030204" pitchFamily="18" charset="0"/>
+                        <a:cs typeface="Arial" panose="020B0604020202020204" pitchFamily="34" charset="0"/>
+                      </a:rPr>
+                      <m:t>  </m:t>
                     </m:r>
                     <m:sSub>
                       <m:sSubPr>
                         <m:ctrlPr>
-                          <a:rPr lang="en-US" b="0" i="1" smtClean="0">
+                          <a:rPr lang="en-US" sz="2400" b="0" i="1" smtClean="0">
                             <a:latin typeface="Cambria Math" panose="02040503050406030204" pitchFamily="18" charset="0"/>
                             <a:cs typeface="Arial" panose="020B0604020202020204" pitchFamily="34" charset="0"/>
                           </a:rPr>
@@ -4299,7 +5456,7 @@
                       </m:sSubPr>
                       <m:e>
                         <m:r>
-                          <a:rPr lang="en-US" b="0" i="1" smtClean="0">
+                          <a:rPr lang="en-US" sz="2400" b="0" i="1" smtClean="0">
                             <a:latin typeface="Cambria Math" panose="02040503050406030204" pitchFamily="18" charset="0"/>
                             <a:cs typeface="Arial" panose="020B0604020202020204" pitchFamily="34" charset="0"/>
                           </a:rPr>
@@ -4308,7 +5465,7 @@
                       </m:e>
                       <m:sub>
                         <m:r>
-                          <a:rPr lang="en-US" b="0" i="1" smtClean="0">
+                          <a:rPr lang="en-US" sz="2400" b="0" i="1" smtClean="0">
                             <a:latin typeface="Cambria Math" panose="02040503050406030204" pitchFamily="18" charset="0"/>
                             <a:cs typeface="Arial" panose="020B0604020202020204" pitchFamily="34" charset="0"/>
                           </a:rPr>
@@ -4317,25 +5474,53 @@
                       </m:sub>
                     </m:sSub>
                     <m:r>
-                      <a:rPr lang="en-US" b="0" i="1" smtClean="0">
+                      <a:rPr lang="en-US" sz="2400" b="0" i="1" smtClean="0">
                         <a:latin typeface="Cambria Math" panose="02040503050406030204" pitchFamily="18" charset="0"/>
                         <a:cs typeface="Arial" panose="020B0604020202020204" pitchFamily="34" charset="0"/>
                       </a:rPr>
                       <m:t>~</m:t>
                     </m:r>
                     <m:r>
-                      <a:rPr lang="en-US" b="0" i="1" smtClean="0">
+                      <a:rPr lang="en-US" sz="2400" b="0" i="1" smtClean="0">
                         <a:latin typeface="Cambria Math" panose="02040503050406030204" pitchFamily="18" charset="0"/>
                         <a:cs typeface="Arial" panose="020B0604020202020204" pitchFamily="34" charset="0"/>
                       </a:rPr>
                       <m:t>𝑁</m:t>
                     </m:r>
                     <m:r>
-                      <a:rPr lang="en-US" b="0" i="1" smtClean="0">
+                      <a:rPr lang="en-US" sz="2400" b="0" i="1" smtClean="0">
                         <a:latin typeface="Cambria Math" panose="02040503050406030204" pitchFamily="18" charset="0"/>
                         <a:cs typeface="Arial" panose="020B0604020202020204" pitchFamily="34" charset="0"/>
                       </a:rPr>
-                      <m:t>(0, 1)</m:t>
+                      <m:t>(</m:t>
+                    </m:r>
+                    <m:r>
+                      <a:rPr lang="en-US" sz="2400" b="0" i="1" smtClean="0">
+                        <a:latin typeface="Cambria Math" panose="02040503050406030204" pitchFamily="18" charset="0"/>
+                        <a:cs typeface="Arial" panose="020B0604020202020204" pitchFamily="34" charset="0"/>
+                      </a:rPr>
+                      <m:t>0</m:t>
+                    </m:r>
+                    <m:r>
+                      <a:rPr lang="en-US" sz="2400" b="0" i="1" smtClean="0">
+                        <a:latin typeface="Cambria Math" panose="02040503050406030204" pitchFamily="18" charset="0"/>
+                        <a:cs typeface="Arial" panose="020B0604020202020204" pitchFamily="34" charset="0"/>
+                      </a:rPr>
+                      <m:t>, </m:t>
+                    </m:r>
+                    <m:r>
+                      <a:rPr lang="en-US" sz="2400" b="0" i="1" smtClean="0">
+                        <a:latin typeface="Cambria Math" panose="02040503050406030204" pitchFamily="18" charset="0"/>
+                        <a:cs typeface="Arial" panose="020B0604020202020204" pitchFamily="34" charset="0"/>
+                      </a:rPr>
+                      <m:t>1</m:t>
+                    </m:r>
+                    <m:r>
+                      <a:rPr lang="en-US" sz="2400" b="0" i="1" smtClean="0">
+                        <a:latin typeface="Cambria Math" panose="02040503050406030204" pitchFamily="18" charset="0"/>
+                        <a:cs typeface="Arial" panose="020B0604020202020204" pitchFamily="34" charset="0"/>
+                      </a:rPr>
+                      <m:t>)</m:t>
                     </m:r>
                   </m:oMath>
                 </a14:m>
@@ -4346,7 +5531,7 @@
             </p:txBody>
           </p:sp>
         </mc:Choice>
-        <mc:Fallback xmlns="">
+        <mc:Fallback>
           <p:sp>
             <p:nvSpPr>
               <p:cNvPr id="5" name="Content Placeholder 4">
@@ -4366,14 +5551,17 @@
             <p:spPr>
               <a:xfrm>
                 <a:off x="1097280" y="2577717"/>
-                <a:ext cx="4937760" cy="3286760"/>
+                <a:ext cx="4937760" cy="2559059"/>
               </a:xfrm>
               <a:blipFill>
                 <a:blip r:embed="rId2"/>
                 <a:stretch>
-                  <a:fillRect l="-2963" r="-1605"/>
+                  <a:fillRect l="-3457" t="-3333" r="-2346"/>
                 </a:stretch>
               </a:blipFill>
+              <a:ln>
+                <a:noFill/>
+              </a:ln>
             </p:spPr>
             <p:txBody>
               <a:bodyPr/>
@@ -4406,7 +5594,12 @@
             <p:ph type="body" sz="quarter" idx="3"/>
           </p:nvPr>
         </p:nvSpPr>
-        <p:spPr/>
+        <p:spPr>
+          <a:xfrm>
+            <a:off x="6379272" y="1846052"/>
+            <a:ext cx="4937760" cy="736282"/>
+          </a:xfrm>
+        </p:spPr>
         <p:txBody>
           <a:bodyPr/>
           <a:lstStyle/>
@@ -4418,8 +5611,8 @@
           </a:p>
         </p:txBody>
       </p:sp>
-      <mc:AlternateContent xmlns:mc="http://schemas.openxmlformats.org/markup-compatibility/2006" xmlns:a14="http://schemas.microsoft.com/office/drawing/2010/main">
-        <mc:Choice Requires="a14">
+      <mc:AlternateContent xmlns:mc="http://schemas.openxmlformats.org/markup-compatibility/2006">
+        <mc:Choice xmlns:a14="http://schemas.microsoft.com/office/drawing/2010/main" Requires="a14">
           <p:sp>
             <p:nvSpPr>
               <p:cNvPr id="7" name="Content Placeholder 6">
@@ -4436,9 +5629,33 @@
                 <p:ph sz="quarter" idx="4"/>
               </p:nvPr>
             </p:nvSpPr>
-            <p:spPr/>
+            <p:spPr>
+              <a:xfrm>
+                <a:off x="6379272" y="2582334"/>
+                <a:ext cx="4937760" cy="2554442"/>
+              </a:xfrm>
+              <a:ln>
+                <a:noFill/>
+              </a:ln>
+            </p:spPr>
+            <p:style>
+              <a:lnRef idx="2">
+                <a:schemeClr val="dk1"/>
+              </a:lnRef>
+              <a:fillRef idx="1">
+                <a:schemeClr val="lt1"/>
+              </a:fillRef>
+              <a:effectRef idx="0">
+                <a:schemeClr val="dk1"/>
+              </a:effectRef>
+              <a:fontRef idx="minor">
+                <a:schemeClr val="dk1"/>
+              </a:fontRef>
+            </p:style>
             <p:txBody>
-              <a:bodyPr/>
+              <a:bodyPr>
+                <a:normAutofit fontScale="92500"/>
+              </a:bodyPr>
               <a:lstStyle/>
               <a:p>
                 <a14:m>
@@ -4595,7 +5812,35 @@
                         <a:latin typeface="Cambria Math" panose="02040503050406030204" pitchFamily="18" charset="0"/>
                         <a:cs typeface="Arial" panose="020B0604020202020204" pitchFamily="34" charset="0"/>
                       </a:rPr>
-                      <m:t>(0, 1)</m:t>
+                      <m:t>(</m:t>
+                    </m:r>
+                    <m:r>
+                      <a:rPr lang="en-US" b="0" i="1" smtClean="0">
+                        <a:latin typeface="Cambria Math" panose="02040503050406030204" pitchFamily="18" charset="0"/>
+                        <a:cs typeface="Arial" panose="020B0604020202020204" pitchFamily="34" charset="0"/>
+                      </a:rPr>
+                      <m:t>0</m:t>
+                    </m:r>
+                    <m:r>
+                      <a:rPr lang="en-US" b="0" i="1" smtClean="0">
+                        <a:latin typeface="Cambria Math" panose="02040503050406030204" pitchFamily="18" charset="0"/>
+                        <a:cs typeface="Arial" panose="020B0604020202020204" pitchFamily="34" charset="0"/>
+                      </a:rPr>
+                      <m:t>, </m:t>
+                    </m:r>
+                    <m:r>
+                      <a:rPr lang="en-US" b="0" i="1" smtClean="0">
+                        <a:latin typeface="Cambria Math" panose="02040503050406030204" pitchFamily="18" charset="0"/>
+                        <a:cs typeface="Arial" panose="020B0604020202020204" pitchFamily="34" charset="0"/>
+                      </a:rPr>
+                      <m:t>1</m:t>
+                    </m:r>
+                    <m:r>
+                      <a:rPr lang="en-US" b="0" i="1" smtClean="0">
+                        <a:latin typeface="Cambria Math" panose="02040503050406030204" pitchFamily="18" charset="0"/>
+                        <a:cs typeface="Arial" panose="020B0604020202020204" pitchFamily="34" charset="0"/>
+                      </a:rPr>
+                      <m:t>)</m:t>
                     </m:r>
                   </m:oMath>
                 </a14:m>
@@ -4640,7 +5885,14 @@
                             <a:latin typeface="Cambria Math" panose="02040503050406030204" pitchFamily="18" charset="0"/>
                             <a:cs typeface="Arial" panose="020B0604020202020204" pitchFamily="34" charset="0"/>
                           </a:rPr>
-                          <m:t>−1</m:t>
+                          <m:t>−</m:t>
+                        </m:r>
+                        <m:r>
+                          <a:rPr lang="en-US" b="0" i="1" smtClean="0">
+                            <a:latin typeface="Cambria Math" panose="02040503050406030204" pitchFamily="18" charset="0"/>
+                            <a:cs typeface="Arial" panose="020B0604020202020204" pitchFamily="34" charset="0"/>
+                          </a:rPr>
+                          <m:t>1</m:t>
                         </m:r>
                       </m:sup>
                     </m:sSup>
@@ -4692,14 +5944,14 @@
                       <m:sSub>
                         <m:sSubPr>
                           <m:ctrlPr>
-                            <a:rPr lang="en-US" b="0" i="1" smtClean="0">
+                            <a:rPr lang="en-US" sz="2400" b="0" i="1" smtClean="0">
                               <a:latin typeface="Cambria Math" panose="02040503050406030204" pitchFamily="18" charset="0"/>
                             </a:rPr>
                           </m:ctrlPr>
                         </m:sSubPr>
                         <m:e>
                           <m:r>
-                            <a:rPr lang="en-US" b="0" i="1" smtClean="0">
+                            <a:rPr lang="en-US" sz="2400" b="0" i="1" smtClean="0">
                               <a:latin typeface="Cambria Math" panose="02040503050406030204" pitchFamily="18" charset="0"/>
                             </a:rPr>
                             <m:t>𝑥</m:t>
@@ -4707,7 +5959,7 @@
                         </m:e>
                         <m:sub>
                           <m:r>
-                            <a:rPr lang="en-US" b="0" i="1" smtClean="0">
+                            <a:rPr lang="en-US" sz="2400" b="0" i="1" smtClean="0">
                               <a:latin typeface="Cambria Math" panose="02040503050406030204" pitchFamily="18" charset="0"/>
                             </a:rPr>
                             <m:t>𝑘</m:t>
@@ -4715,7 +5967,7 @@
                         </m:sub>
                       </m:sSub>
                       <m:r>
-                        <a:rPr lang="en-US" b="0" i="1" smtClean="0">
+                        <a:rPr lang="en-US" sz="2400" b="0" i="1" smtClean="0">
                           <a:latin typeface="Cambria Math" panose="02040503050406030204" pitchFamily="18" charset="0"/>
                         </a:rPr>
                         <m:t>+</m:t>
@@ -4723,76 +5975,12 @@
                       <m:f>
                         <m:fPr>
                           <m:ctrlPr>
-                            <a:rPr lang="en-US" b="0" i="1" smtClean="0">
+                            <a:rPr lang="en-US" sz="2400" b="0" i="1" smtClean="0">
                               <a:latin typeface="Cambria Math" panose="02040503050406030204" pitchFamily="18" charset="0"/>
                             </a:rPr>
                           </m:ctrlPr>
                         </m:fPr>
                         <m:num>
-                          <m:sSub>
-                            <m:sSubPr>
-                              <m:ctrlPr>
-                                <a:rPr lang="en-US" b="0" i="1" smtClean="0">
-                                  <a:latin typeface="Cambria Math" panose="02040503050406030204" pitchFamily="18" charset="0"/>
-                                </a:rPr>
-                              </m:ctrlPr>
-                            </m:sSubPr>
-                            <m:e>
-                              <m:r>
-                                <a:rPr lang="en-US" b="0" i="1" smtClean="0">
-                                  <a:latin typeface="Cambria Math" panose="02040503050406030204" pitchFamily="18" charset="0"/>
-                                </a:rPr>
-                                <m:t>𝑥</m:t>
-                              </m:r>
-                            </m:e>
-                            <m:sub>
-                              <m:r>
-                                <a:rPr lang="en-US" b="0" i="1" smtClean="0">
-                                  <a:latin typeface="Cambria Math" panose="02040503050406030204" pitchFamily="18" charset="0"/>
-                                </a:rPr>
-                                <m:t>𝑘</m:t>
-                              </m:r>
-                              <m:r>
-                                <a:rPr lang="en-US" b="0" i="1" smtClean="0">
-                                  <a:latin typeface="Cambria Math" panose="02040503050406030204" pitchFamily="18" charset="0"/>
-                                </a:rPr>
-                                <m:t>+1</m:t>
-                              </m:r>
-                            </m:sub>
-                          </m:sSub>
-                          <m:r>
-                            <a:rPr lang="en-US" b="0" i="1" smtClean="0">
-                              <a:latin typeface="Cambria Math" panose="02040503050406030204" pitchFamily="18" charset="0"/>
-                            </a:rPr>
-                            <m:t>−</m:t>
-                          </m:r>
-                          <m:sSub>
-                            <m:sSubPr>
-                              <m:ctrlPr>
-                                <a:rPr lang="en-US" b="0" i="1" smtClean="0">
-                                  <a:latin typeface="Cambria Math" panose="02040503050406030204" pitchFamily="18" charset="0"/>
-                                </a:rPr>
-                              </m:ctrlPr>
-                            </m:sSubPr>
-                            <m:e>
-                              <m:r>
-                                <a:rPr lang="en-US" b="0" i="1" smtClean="0">
-                                  <a:latin typeface="Cambria Math" panose="02040503050406030204" pitchFamily="18" charset="0"/>
-                                </a:rPr>
-                                <m:t>𝑥</m:t>
-                              </m:r>
-                            </m:e>
-                            <m:sub>
-                              <m:r>
-                                <a:rPr lang="en-US" b="0" i="1" smtClean="0">
-                                  <a:latin typeface="Cambria Math" panose="02040503050406030204" pitchFamily="18" charset="0"/>
-                                </a:rPr>
-                                <m:t>𝑘</m:t>
-                              </m:r>
-                            </m:sub>
-                          </m:sSub>
-                        </m:num>
-                        <m:den>
                           <m:sSub>
                             <m:sSubPr>
                               <m:ctrlPr>
@@ -4802,24 +5990,12 @@
                               </m:ctrlPr>
                             </m:sSubPr>
                             <m:e>
-                              <m:acc>
-                                <m:accPr>
-                                  <m:chr m:val="̂"/>
-                                  <m:ctrlPr>
-                                    <a:rPr lang="en-US" b="0" i="1" smtClean="0">
-                                      <a:latin typeface="Cambria Math" panose="02040503050406030204" pitchFamily="18" charset="0"/>
-                                    </a:rPr>
-                                  </m:ctrlPr>
-                                </m:accPr>
-                                <m:e>
-                                  <m:r>
-                                    <a:rPr lang="en-US" b="0" i="1" smtClean="0">
-                                      <a:latin typeface="Cambria Math" panose="02040503050406030204" pitchFamily="18" charset="0"/>
-                                    </a:rPr>
-                                    <m:t>𝐹</m:t>
-                                  </m:r>
-                                </m:e>
-                              </m:acc>
+                              <m:r>
+                                <a:rPr lang="en-US" sz="2400" b="0" i="1" smtClean="0">
+                                  <a:latin typeface="Cambria Math" panose="02040503050406030204" pitchFamily="18" charset="0"/>
+                                </a:rPr>
+                                <m:t>𝑥</m:t>
+                              </m:r>
                             </m:e>
                             <m:sub>
                               <m:r>
@@ -4832,7 +6008,13 @@
                                 <a:rPr lang="en-US" sz="2400" b="0" i="1" smtClean="0">
                                   <a:latin typeface="Cambria Math" panose="02040503050406030204" pitchFamily="18" charset="0"/>
                                 </a:rPr>
-                                <m:t>+1</m:t>
+                                <m:t>+</m:t>
+                              </m:r>
+                              <m:r>
+                                <a:rPr lang="en-US" sz="2400" b="0" i="1" smtClean="0">
+                                  <a:latin typeface="Cambria Math" panose="02040503050406030204" pitchFamily="18" charset="0"/>
+                                </a:rPr>
+                                <m:t>1</m:t>
                               </m:r>
                             </m:sub>
                           </m:sSub>
@@ -4846,6 +6028,33 @@
                             <m:sSubPr>
                               <m:ctrlPr>
                                 <a:rPr lang="en-US" sz="2400" b="0" i="1" smtClean="0">
+                                  <a:latin typeface="Cambria Math" panose="02040503050406030204" pitchFamily="18" charset="0"/>
+                                </a:rPr>
+                              </m:ctrlPr>
+                            </m:sSubPr>
+                            <m:e>
+                              <m:r>
+                                <a:rPr lang="en-US" sz="2400" b="0" i="1" smtClean="0">
+                                  <a:latin typeface="Cambria Math" panose="02040503050406030204" pitchFamily="18" charset="0"/>
+                                </a:rPr>
+                                <m:t>𝑥</m:t>
+                              </m:r>
+                            </m:e>
+                            <m:sub>
+                              <m:r>
+                                <a:rPr lang="en-US" sz="2400" b="0" i="1" smtClean="0">
+                                  <a:latin typeface="Cambria Math" panose="02040503050406030204" pitchFamily="18" charset="0"/>
+                                </a:rPr>
+                                <m:t>𝑘</m:t>
+                              </m:r>
+                            </m:sub>
+                          </m:sSub>
+                        </m:num>
+                        <m:den>
+                          <m:sSub>
+                            <m:sSubPr>
+                              <m:ctrlPr>
+                                <a:rPr lang="en-US" sz="2800" b="0" i="1" smtClean="0">
                                   <a:latin typeface="Cambria Math" panose="02040503050406030204" pitchFamily="18" charset="0"/>
                                 </a:rPr>
                               </m:ctrlPr>
@@ -4872,7 +6081,62 @@
                             </m:e>
                             <m:sub>
                               <m:r>
-                                <a:rPr lang="en-US" sz="2400" b="0" i="1" smtClean="0">
+                                <a:rPr lang="en-US" sz="2800" b="0" i="1" smtClean="0">
+                                  <a:latin typeface="Cambria Math" panose="02040503050406030204" pitchFamily="18" charset="0"/>
+                                </a:rPr>
+                                <m:t>𝑘</m:t>
+                              </m:r>
+                              <m:r>
+                                <a:rPr lang="en-US" sz="2800" b="0" i="1" smtClean="0">
+                                  <a:latin typeface="Cambria Math" panose="02040503050406030204" pitchFamily="18" charset="0"/>
+                                </a:rPr>
+                                <m:t>+</m:t>
+                              </m:r>
+                              <m:r>
+                                <a:rPr lang="en-US" sz="2800" b="0" i="1" smtClean="0">
+                                  <a:latin typeface="Cambria Math" panose="02040503050406030204" pitchFamily="18" charset="0"/>
+                                </a:rPr>
+                                <m:t>1</m:t>
+                              </m:r>
+                            </m:sub>
+                          </m:sSub>
+                          <m:r>
+                            <a:rPr lang="en-US" sz="2800" b="0" i="1" smtClean="0">
+                              <a:latin typeface="Cambria Math" panose="02040503050406030204" pitchFamily="18" charset="0"/>
+                            </a:rPr>
+                            <m:t>−</m:t>
+                          </m:r>
+                          <m:sSub>
+                            <m:sSubPr>
+                              <m:ctrlPr>
+                                <a:rPr lang="en-US" sz="2800" b="0" i="1" smtClean="0">
+                                  <a:latin typeface="Cambria Math" panose="02040503050406030204" pitchFamily="18" charset="0"/>
+                                </a:rPr>
+                              </m:ctrlPr>
+                            </m:sSubPr>
+                            <m:e>
+                              <m:acc>
+                                <m:accPr>
+                                  <m:chr m:val="̂"/>
+                                  <m:ctrlPr>
+                                    <a:rPr lang="en-US" sz="2800" b="0" i="1" smtClean="0">
+                                      <a:latin typeface="Cambria Math" panose="02040503050406030204" pitchFamily="18" charset="0"/>
+                                    </a:rPr>
+                                  </m:ctrlPr>
+                                </m:accPr>
+                                <m:e>
+                                  <m:r>
+                                    <a:rPr lang="en-US" sz="2800" b="0" i="1" smtClean="0">
+                                      <a:latin typeface="Cambria Math" panose="02040503050406030204" pitchFamily="18" charset="0"/>
+                                    </a:rPr>
+                                    <m:t>𝐹</m:t>
+                                  </m:r>
+                                </m:e>
+                              </m:acc>
+                            </m:e>
+                            <m:sub>
+                              <m:r>
+                                <a:rPr lang="en-US" sz="2800" b="0" i="1" smtClean="0">
                                   <a:latin typeface="Cambria Math" panose="02040503050406030204" pitchFamily="18" charset="0"/>
                                 </a:rPr>
                                 <m:t>𝑘</m:t>
@@ -4882,19 +6146,19 @@
                         </m:den>
                       </m:f>
                       <m:r>
-                        <a:rPr lang="en-US" b="0" i="1" smtClean="0">
+                        <a:rPr lang="en-US" sz="2400" b="0" i="1" smtClean="0">
                           <a:latin typeface="Cambria Math" panose="02040503050406030204" pitchFamily="18" charset="0"/>
                         </a:rPr>
                         <m:t>(</m:t>
                       </m:r>
                       <m:r>
-                        <a:rPr lang="en-US" b="0" i="1" smtClean="0">
+                        <a:rPr lang="en-US" sz="2400" b="0" i="1" smtClean="0">
                           <a:latin typeface="Cambria Math" panose="02040503050406030204" pitchFamily="18" charset="0"/>
                         </a:rPr>
                         <m:t>𝑈</m:t>
                       </m:r>
                       <m:r>
-                        <a:rPr lang="en-US" b="0" i="1" smtClean="0">
+                        <a:rPr lang="en-US" sz="2400" b="0" i="1" smtClean="0">
                           <a:latin typeface="Cambria Math" panose="02040503050406030204" pitchFamily="18" charset="0"/>
                         </a:rPr>
                         <m:t>−</m:t>
@@ -4902,7 +6166,7 @@
                       <m:sSub>
                         <m:sSubPr>
                           <m:ctrlPr>
-                            <a:rPr lang="en-US" b="0" i="1" smtClean="0">
+                            <a:rPr lang="en-US" sz="2400" b="0" i="1" smtClean="0">
                               <a:latin typeface="Cambria Math" panose="02040503050406030204" pitchFamily="18" charset="0"/>
                             </a:rPr>
                           </m:ctrlPr>
@@ -4912,14 +6176,14 @@
                             <m:accPr>
                               <m:chr m:val="̂"/>
                               <m:ctrlPr>
-                                <a:rPr lang="en-US" b="0" i="1" smtClean="0">
+                                <a:rPr lang="en-US" sz="2400" b="0" i="1" smtClean="0">
                                   <a:latin typeface="Cambria Math" panose="02040503050406030204" pitchFamily="18" charset="0"/>
                                 </a:rPr>
                               </m:ctrlPr>
                             </m:accPr>
                             <m:e>
                               <m:r>
-                                <a:rPr lang="en-US" b="0" i="1" smtClean="0">
+                                <a:rPr lang="en-US" sz="2400" b="0" i="1" smtClean="0">
                                   <a:latin typeface="Cambria Math" panose="02040503050406030204" pitchFamily="18" charset="0"/>
                                 </a:rPr>
                                 <m:t>𝐹</m:t>
@@ -4929,7 +6193,7 @@
                         </m:e>
                         <m:sub>
                           <m:r>
-                            <a:rPr lang="en-US" b="0" i="1" smtClean="0">
+                            <a:rPr lang="en-US" sz="2400" b="0" i="1" smtClean="0">
                               <a:latin typeface="Cambria Math" panose="02040503050406030204" pitchFamily="18" charset="0"/>
                             </a:rPr>
                             <m:t>𝑘</m:t>
@@ -4937,7 +6201,7 @@
                         </m:sub>
                       </m:sSub>
                       <m:r>
-                        <a:rPr lang="en-US" b="0" i="1" smtClean="0">
+                        <a:rPr lang="en-US" sz="2400" b="0" i="1" smtClean="0">
                           <a:latin typeface="Cambria Math" panose="02040503050406030204" pitchFamily="18" charset="0"/>
                         </a:rPr>
                         <m:t>)</m:t>
@@ -4950,7 +6214,7 @@
             </p:txBody>
           </p:sp>
         </mc:Choice>
-        <mc:Fallback xmlns="">
+        <mc:Fallback>
           <p:sp>
             <p:nvSpPr>
               <p:cNvPr id="7" name="Content Placeholder 6">
@@ -4968,12 +6232,19 @@
               </p:nvPr>
             </p:nvSpPr>
             <p:spPr>
+              <a:xfrm>
+                <a:off x="6379272" y="2582334"/>
+                <a:ext cx="4937760" cy="2554442"/>
+              </a:xfrm>
               <a:blipFill>
                 <a:blip r:embed="rId3"/>
                 <a:stretch>
-                  <a:fillRect l="-2963"/>
+                  <a:fillRect l="-3457" t="-3341"/>
                 </a:stretch>
               </a:blipFill>
+              <a:ln>
+                <a:noFill/>
+              </a:ln>
             </p:spPr>
             <p:txBody>
               <a:bodyPr/>
@@ -5019,6 +6290,125 @@
           <a:lstStyle/>
           <a:p>
             <a:endParaRPr lang="en-US" dirty="0"/>
+          </a:p>
+        </p:txBody>
+      </p:sp>
+      <p:sp>
+        <p:nvSpPr>
+          <p:cNvPr id="3" name="Footer Placeholder 2">
+            <a:extLst>
+              <a:ext uri="{FF2B5EF4-FFF2-40B4-BE49-F238E27FC236}">
+                <a16:creationId xmlns:a16="http://schemas.microsoft.com/office/drawing/2014/main" id="{3AF1FC36-7C3B-46BB-8F71-FD2572F5B79F}"/>
+              </a:ext>
+            </a:extLst>
+          </p:cNvPr>
+          <p:cNvSpPr>
+            <a:spLocks noGrp="1"/>
+          </p:cNvSpPr>
+          <p:nvPr>
+            <p:ph type="ftr" sz="quarter" idx="11"/>
+          </p:nvPr>
+        </p:nvSpPr>
+        <p:spPr/>
+        <p:txBody>
+          <a:bodyPr/>
+          <a:lstStyle/>
+          <a:p>
+            <a:r>
+              <a:rPr lang="en-US" sz="1100" dirty="0"/>
+              <a:t>R/finance 2019 - Joseph Loss </a:t>
+            </a:r>
+          </a:p>
+        </p:txBody>
+      </p:sp>
+      <p:sp>
+        <p:nvSpPr>
+          <p:cNvPr id="9" name="Slide Number Placeholder 8">
+            <a:extLst>
+              <a:ext uri="{FF2B5EF4-FFF2-40B4-BE49-F238E27FC236}">
+                <a16:creationId xmlns:a16="http://schemas.microsoft.com/office/drawing/2014/main" id="{F4DAE322-9A34-404D-B401-93AAD3F54AFF}"/>
+              </a:ext>
+            </a:extLst>
+          </p:cNvPr>
+          <p:cNvSpPr>
+            <a:spLocks noGrp="1"/>
+          </p:cNvSpPr>
+          <p:nvPr>
+            <p:ph type="sldNum" sz="quarter" idx="12"/>
+          </p:nvPr>
+        </p:nvSpPr>
+        <p:spPr/>
+        <p:txBody>
+          <a:bodyPr/>
+          <a:lstStyle/>
+          <a:p>
+            <a:fld id="{4FAB73BC-B049-4115-A692-8D63A059BFB8}" type="slidenum">
+              <a:rPr lang="en-US" sz="1100" smtClean="0"/>
+              <a:t>2</a:t>
+            </a:fld>
+            <a:endParaRPr lang="en-US" sz="1100" dirty="0"/>
+          </a:p>
+        </p:txBody>
+      </p:sp>
+      <p:sp>
+        <p:nvSpPr>
+          <p:cNvPr id="10" name="TextBox 9">
+            <a:extLst>
+              <a:ext uri="{FF2B5EF4-FFF2-40B4-BE49-F238E27FC236}">
+                <a16:creationId xmlns:a16="http://schemas.microsoft.com/office/drawing/2014/main" id="{632B3007-73C7-4D1F-A5B4-45A180EEF077}"/>
+              </a:ext>
+            </a:extLst>
+          </p:cNvPr>
+          <p:cNvSpPr txBox="1"/>
+          <p:nvPr/>
+        </p:nvSpPr>
+        <p:spPr>
+          <a:xfrm>
+            <a:off x="1097279" y="5797783"/>
+            <a:ext cx="8256494" cy="692497"/>
+          </a:xfrm>
+          <a:prstGeom prst="rect">
+            <a:avLst/>
+          </a:prstGeom>
+          <a:noFill/>
+        </p:spPr>
+        <p:txBody>
+          <a:bodyPr wrap="square" rtlCol="0">
+            <a:spAutoFit/>
+          </a:bodyPr>
+          <a:lstStyle/>
+          <a:p>
+            <a:r>
+              <a:rPr lang="en-US" baseline="30000" dirty="0"/>
+              <a:t>†</a:t>
+            </a:r>
+            <a:r>
+              <a:rPr lang="en-US" sz="1400" i="1" dirty="0"/>
+              <a:t>Liming Feng, et al. “Simulating </a:t>
+            </a:r>
+            <a:r>
+              <a:rPr lang="en-US" sz="1400" i="1" dirty="0" err="1"/>
+              <a:t>Lévy</a:t>
+            </a:r>
+            <a:r>
+              <a:rPr lang="en-US" sz="1400" i="1" dirty="0"/>
+              <a:t> Processes from Their Characteristic Functions and Financial Applications.”</a:t>
+            </a:r>
+            <a:br>
+              <a:rPr lang="en-US" sz="1400" i="1" dirty="0"/>
+            </a:br>
+            <a:r>
+              <a:rPr lang="en-US" sz="1400" i="1" dirty="0"/>
+              <a:t>University of Illinois, 30 July 2011</a:t>
+            </a:r>
+            <a:r>
+              <a:rPr lang="en-US" sz="1100" i="1" dirty="0"/>
+              <a:t> </a:t>
+            </a:r>
+            <a:br>
+              <a:rPr lang="en-US" sz="1100" i="1" dirty="0"/>
+            </a:br>
+            <a:endParaRPr lang="en-US" sz="1100" i="1" dirty="0"/>
           </a:p>
         </p:txBody>
       </p:sp>
@@ -5109,8 +6499,8 @@
         </p:blipFill>
         <p:spPr>
           <a:xfrm>
-            <a:off x="1097280" y="1844561"/>
-            <a:ext cx="8303853" cy="4371512"/>
+            <a:off x="1097281" y="1844561"/>
+            <a:ext cx="8042238" cy="4233786"/>
           </a:xfrm>
           <a:prstGeom prst="rect">
             <a:avLst/>
@@ -5122,6 +6512,63 @@
           </a:ln>
         </p:spPr>
       </p:pic>
+      <p:sp>
+        <p:nvSpPr>
+          <p:cNvPr id="3" name="Footer Placeholder 2">
+            <a:extLst>
+              <a:ext uri="{FF2B5EF4-FFF2-40B4-BE49-F238E27FC236}">
+                <a16:creationId xmlns:a16="http://schemas.microsoft.com/office/drawing/2014/main" id="{379FF2D2-826F-40E3-A3BD-2106C43CA87A}"/>
+              </a:ext>
+            </a:extLst>
+          </p:cNvPr>
+          <p:cNvSpPr>
+            <a:spLocks noGrp="1"/>
+          </p:cNvSpPr>
+          <p:nvPr>
+            <p:ph type="ftr" sz="quarter" idx="11"/>
+          </p:nvPr>
+        </p:nvSpPr>
+        <p:spPr/>
+        <p:txBody>
+          <a:bodyPr/>
+          <a:lstStyle/>
+          <a:p>
+            <a:r>
+              <a:rPr lang="en-US" sz="1100" dirty="0"/>
+              <a:t>R/finance 2019 - Joseph Loss </a:t>
+            </a:r>
+          </a:p>
+        </p:txBody>
+      </p:sp>
+      <p:sp>
+        <p:nvSpPr>
+          <p:cNvPr id="4" name="Slide Number Placeholder 3">
+            <a:extLst>
+              <a:ext uri="{FF2B5EF4-FFF2-40B4-BE49-F238E27FC236}">
+                <a16:creationId xmlns:a16="http://schemas.microsoft.com/office/drawing/2014/main" id="{07FF9E7F-50AB-432A-B1E3-49B07486F87B}"/>
+              </a:ext>
+            </a:extLst>
+          </p:cNvPr>
+          <p:cNvSpPr>
+            <a:spLocks noGrp="1"/>
+          </p:cNvSpPr>
+          <p:nvPr>
+            <p:ph type="sldNum" sz="quarter" idx="12"/>
+          </p:nvPr>
+        </p:nvSpPr>
+        <p:spPr/>
+        <p:txBody>
+          <a:bodyPr/>
+          <a:lstStyle/>
+          <a:p>
+            <a:fld id="{4CE482DC-2269-4F26-9D2A-7E44B1A4CD85}" type="slidenum">
+              <a:rPr lang="en-US" sz="1100" smtClean="0"/>
+              <a:t>3</a:t>
+            </a:fld>
+            <a:endParaRPr lang="en-US" sz="1100" dirty="0"/>
+          </a:p>
+        </p:txBody>
+      </p:sp>
     </p:spTree>
     <p:extLst>
       <p:ext uri="{BB962C8B-B14F-4D97-AF65-F5344CB8AC3E}">
@@ -5175,7 +6622,7 @@
           <a:p>
             <a:r>
               <a:rPr lang="en-US" dirty="0"/>
-              <a:t>NIG Distribution</a:t>
+              <a:t>Normal Inverse Gaussian Distribution</a:t>
             </a:r>
           </a:p>
         </p:txBody>
@@ -5214,6 +6661,63 @@
           </a:ln>
         </p:spPr>
       </p:pic>
+      <p:sp>
+        <p:nvSpPr>
+          <p:cNvPr id="3" name="Footer Placeholder 2">
+            <a:extLst>
+              <a:ext uri="{FF2B5EF4-FFF2-40B4-BE49-F238E27FC236}">
+                <a16:creationId xmlns:a16="http://schemas.microsoft.com/office/drawing/2014/main" id="{683B5159-9027-4C65-B016-2D13BF29B169}"/>
+              </a:ext>
+            </a:extLst>
+          </p:cNvPr>
+          <p:cNvSpPr>
+            <a:spLocks noGrp="1"/>
+          </p:cNvSpPr>
+          <p:nvPr>
+            <p:ph type="ftr" sz="quarter" idx="11"/>
+          </p:nvPr>
+        </p:nvSpPr>
+        <p:spPr/>
+        <p:txBody>
+          <a:bodyPr/>
+          <a:lstStyle/>
+          <a:p>
+            <a:r>
+              <a:rPr lang="en-US" sz="1100" dirty="0"/>
+              <a:t>R/finance 2019 - Joseph Loss </a:t>
+            </a:r>
+          </a:p>
+        </p:txBody>
+      </p:sp>
+      <p:sp>
+        <p:nvSpPr>
+          <p:cNvPr id="4" name="Slide Number Placeholder 3">
+            <a:extLst>
+              <a:ext uri="{FF2B5EF4-FFF2-40B4-BE49-F238E27FC236}">
+                <a16:creationId xmlns:a16="http://schemas.microsoft.com/office/drawing/2014/main" id="{092EA223-64AD-43DE-985F-53C6151D23CF}"/>
+              </a:ext>
+            </a:extLst>
+          </p:cNvPr>
+          <p:cNvSpPr>
+            <a:spLocks noGrp="1"/>
+          </p:cNvSpPr>
+          <p:nvPr>
+            <p:ph type="sldNum" sz="quarter" idx="12"/>
+          </p:nvPr>
+        </p:nvSpPr>
+        <p:spPr/>
+        <p:txBody>
+          <a:bodyPr/>
+          <a:lstStyle/>
+          <a:p>
+            <a:fld id="{4FAB73BC-B049-4115-A692-8D63A059BFB8}" type="slidenum">
+              <a:rPr lang="en-US" sz="1100" smtClean="0"/>
+              <a:t>4</a:t>
+            </a:fld>
+            <a:endParaRPr lang="en-US" sz="1100" dirty="0"/>
+          </a:p>
+        </p:txBody>
+      </p:sp>
     </p:spTree>
     <p:extLst>
       <p:ext uri="{BB962C8B-B14F-4D97-AF65-F5344CB8AC3E}">
@@ -5307,6 +6811,929 @@
           </a:ln>
         </p:spPr>
       </p:pic>
+      <p:sp>
+        <p:nvSpPr>
+          <p:cNvPr id="3" name="Footer Placeholder 2">
+            <a:extLst>
+              <a:ext uri="{FF2B5EF4-FFF2-40B4-BE49-F238E27FC236}">
+                <a16:creationId xmlns:a16="http://schemas.microsoft.com/office/drawing/2014/main" id="{D078F7E2-A887-437D-8786-6C516DA8557D}"/>
+              </a:ext>
+            </a:extLst>
+          </p:cNvPr>
+          <p:cNvSpPr>
+            <a:spLocks noGrp="1"/>
+          </p:cNvSpPr>
+          <p:nvPr>
+            <p:ph type="ftr" sz="quarter" idx="11"/>
+          </p:nvPr>
+        </p:nvSpPr>
+        <p:spPr/>
+        <p:txBody>
+          <a:bodyPr/>
+          <a:lstStyle/>
+          <a:p>
+            <a:r>
+              <a:rPr lang="en-US" sz="1100" dirty="0"/>
+              <a:t>R/finance 2019 - Joseph Loss </a:t>
+            </a:r>
+          </a:p>
+        </p:txBody>
+      </p:sp>
+      <p:sp>
+        <p:nvSpPr>
+          <p:cNvPr id="4" name="Slide Number Placeholder 3">
+            <a:extLst>
+              <a:ext uri="{FF2B5EF4-FFF2-40B4-BE49-F238E27FC236}">
+                <a16:creationId xmlns:a16="http://schemas.microsoft.com/office/drawing/2014/main" id="{63BA03D7-97B2-4B0C-B729-4B01169883A5}"/>
+              </a:ext>
+            </a:extLst>
+          </p:cNvPr>
+          <p:cNvSpPr>
+            <a:spLocks noGrp="1"/>
+          </p:cNvSpPr>
+          <p:nvPr>
+            <p:ph type="sldNum" sz="quarter" idx="12"/>
+          </p:nvPr>
+        </p:nvSpPr>
+        <p:spPr/>
+        <p:txBody>
+          <a:bodyPr/>
+          <a:lstStyle/>
+          <a:p>
+            <a:fld id="{4CE482DC-2269-4F26-9D2A-7E44B1A4CD85}" type="slidenum">
+              <a:rPr lang="en-US" sz="1100" smtClean="0"/>
+              <a:t>5</a:t>
+            </a:fld>
+            <a:endParaRPr lang="en-US" sz="1100" dirty="0"/>
+          </a:p>
+        </p:txBody>
+      </p:sp>
+      <mc:AlternateContent xmlns:mc="http://schemas.openxmlformats.org/markup-compatibility/2006">
+        <mc:Choice xmlns:a14="http://schemas.microsoft.com/office/drawing/2010/main" Requires="a14">
+          <p:sp>
+            <p:nvSpPr>
+              <p:cNvPr id="6" name="Content Placeholder 6">
+                <a:extLst>
+                  <a:ext uri="{FF2B5EF4-FFF2-40B4-BE49-F238E27FC236}">
+                    <a16:creationId xmlns:a16="http://schemas.microsoft.com/office/drawing/2014/main" id="{E750046E-667C-4A0D-A1DC-DE352C57EA02}"/>
+                  </a:ext>
+                </a:extLst>
+              </p:cNvPr>
+              <p:cNvSpPr txBox="1">
+                <a:spLocks/>
+              </p:cNvSpPr>
+              <p:nvPr/>
+            </p:nvSpPr>
+            <p:spPr>
+              <a:xfrm>
+                <a:off x="7750884" y="1846842"/>
+                <a:ext cx="4100457" cy="3286760"/>
+              </a:xfrm>
+              <a:prstGeom prst="rect">
+                <a:avLst/>
+              </a:prstGeom>
+            </p:spPr>
+            <p:txBody>
+              <a:bodyPr>
+                <a:normAutofit fontScale="92500"/>
+              </a:bodyPr>
+              <a:lstStyle>
+                <a:lvl1pPr marL="91440" indent="-91440" algn="l" defTabSz="914400" rtl="0" eaLnBrk="1" latinLnBrk="0" hangingPunct="1">
+                  <a:lnSpc>
+                    <a:spcPct val="90000"/>
+                  </a:lnSpc>
+                  <a:spcBef>
+                    <a:spcPts val="1200"/>
+                  </a:spcBef>
+                  <a:spcAft>
+                    <a:spcPts val="200"/>
+                  </a:spcAft>
+                  <a:buClr>
+                    <a:schemeClr val="accent1"/>
+                  </a:buClr>
+                  <a:buSzPct val="100000"/>
+                  <a:buFont typeface="Calibri" panose="020F0502020204030204" pitchFamily="34" charset="0"/>
+                  <a:buChar char=" "/>
+                  <a:defRPr sz="2000" kern="1200">
+                    <a:solidFill>
+                      <a:schemeClr val="tx1">
+                        <a:lumMod val="75000"/>
+                        <a:lumOff val="25000"/>
+                      </a:schemeClr>
+                    </a:solidFill>
+                    <a:latin typeface="+mn-lt"/>
+                    <a:ea typeface="+mn-ea"/>
+                    <a:cs typeface="+mn-cs"/>
+                  </a:defRPr>
+                </a:lvl1pPr>
+                <a:lvl2pPr marL="384048" indent="-182880" algn="l" defTabSz="914400" rtl="0" eaLnBrk="1" latinLnBrk="0" hangingPunct="1">
+                  <a:lnSpc>
+                    <a:spcPct val="90000"/>
+                  </a:lnSpc>
+                  <a:spcBef>
+                    <a:spcPts val="200"/>
+                  </a:spcBef>
+                  <a:spcAft>
+                    <a:spcPts val="400"/>
+                  </a:spcAft>
+                  <a:buClr>
+                    <a:schemeClr val="accent1"/>
+                  </a:buClr>
+                  <a:buFont typeface="Calibri" pitchFamily="34" charset="0"/>
+                  <a:buChar char="◦"/>
+                  <a:defRPr sz="1800" kern="1200">
+                    <a:solidFill>
+                      <a:schemeClr val="tx1">
+                        <a:lumMod val="75000"/>
+                        <a:lumOff val="25000"/>
+                      </a:schemeClr>
+                    </a:solidFill>
+                    <a:latin typeface="+mn-lt"/>
+                    <a:ea typeface="+mn-ea"/>
+                    <a:cs typeface="+mn-cs"/>
+                  </a:defRPr>
+                </a:lvl2pPr>
+                <a:lvl3pPr marL="566928" indent="-182880" algn="l" defTabSz="914400" rtl="0" eaLnBrk="1" latinLnBrk="0" hangingPunct="1">
+                  <a:lnSpc>
+                    <a:spcPct val="90000"/>
+                  </a:lnSpc>
+                  <a:spcBef>
+                    <a:spcPts val="200"/>
+                  </a:spcBef>
+                  <a:spcAft>
+                    <a:spcPts val="400"/>
+                  </a:spcAft>
+                  <a:buClr>
+                    <a:schemeClr val="accent1"/>
+                  </a:buClr>
+                  <a:buFont typeface="Calibri" pitchFamily="34" charset="0"/>
+                  <a:buChar char="◦"/>
+                  <a:defRPr sz="1400" kern="1200">
+                    <a:solidFill>
+                      <a:schemeClr val="tx1">
+                        <a:lumMod val="75000"/>
+                        <a:lumOff val="25000"/>
+                      </a:schemeClr>
+                    </a:solidFill>
+                    <a:latin typeface="+mn-lt"/>
+                    <a:ea typeface="+mn-ea"/>
+                    <a:cs typeface="+mn-cs"/>
+                  </a:defRPr>
+                </a:lvl3pPr>
+                <a:lvl4pPr marL="749808" indent="-182880" algn="l" defTabSz="914400" rtl="0" eaLnBrk="1" latinLnBrk="0" hangingPunct="1">
+                  <a:lnSpc>
+                    <a:spcPct val="90000"/>
+                  </a:lnSpc>
+                  <a:spcBef>
+                    <a:spcPts val="200"/>
+                  </a:spcBef>
+                  <a:spcAft>
+                    <a:spcPts val="400"/>
+                  </a:spcAft>
+                  <a:buClr>
+                    <a:schemeClr val="accent1"/>
+                  </a:buClr>
+                  <a:buFont typeface="Calibri" pitchFamily="34" charset="0"/>
+                  <a:buChar char="◦"/>
+                  <a:defRPr sz="1400" kern="1200">
+                    <a:solidFill>
+                      <a:schemeClr val="tx1">
+                        <a:lumMod val="75000"/>
+                        <a:lumOff val="25000"/>
+                      </a:schemeClr>
+                    </a:solidFill>
+                    <a:latin typeface="+mn-lt"/>
+                    <a:ea typeface="+mn-ea"/>
+                    <a:cs typeface="+mn-cs"/>
+                  </a:defRPr>
+                </a:lvl4pPr>
+                <a:lvl5pPr marL="932688" indent="-182880" algn="l" defTabSz="914400" rtl="0" eaLnBrk="1" latinLnBrk="0" hangingPunct="1">
+                  <a:lnSpc>
+                    <a:spcPct val="90000"/>
+                  </a:lnSpc>
+                  <a:spcBef>
+                    <a:spcPts val="200"/>
+                  </a:spcBef>
+                  <a:spcAft>
+                    <a:spcPts val="400"/>
+                  </a:spcAft>
+                  <a:buClr>
+                    <a:schemeClr val="accent1"/>
+                  </a:buClr>
+                  <a:buFont typeface="Calibri" pitchFamily="34" charset="0"/>
+                  <a:buChar char="◦"/>
+                  <a:defRPr sz="1400" kern="1200">
+                    <a:solidFill>
+                      <a:schemeClr val="tx1">
+                        <a:lumMod val="75000"/>
+                        <a:lumOff val="25000"/>
+                      </a:schemeClr>
+                    </a:solidFill>
+                    <a:latin typeface="+mn-lt"/>
+                    <a:ea typeface="+mn-ea"/>
+                    <a:cs typeface="+mn-cs"/>
+                  </a:defRPr>
+                </a:lvl5pPr>
+                <a:lvl6pPr marL="1100000" indent="-228600" algn="l" defTabSz="914400" rtl="0" eaLnBrk="1" latinLnBrk="0" hangingPunct="1">
+                  <a:lnSpc>
+                    <a:spcPct val="90000"/>
+                  </a:lnSpc>
+                  <a:spcBef>
+                    <a:spcPts val="200"/>
+                  </a:spcBef>
+                  <a:spcAft>
+                    <a:spcPts val="400"/>
+                  </a:spcAft>
+                  <a:buClr>
+                    <a:schemeClr val="accent1"/>
+                  </a:buClr>
+                  <a:buFont typeface="Calibri" pitchFamily="34" charset="0"/>
+                  <a:buChar char="◦"/>
+                  <a:defRPr sz="1400" kern="1200">
+                    <a:solidFill>
+                      <a:schemeClr val="tx1">
+                        <a:lumMod val="75000"/>
+                        <a:lumOff val="25000"/>
+                      </a:schemeClr>
+                    </a:solidFill>
+                    <a:latin typeface="+mn-lt"/>
+                    <a:ea typeface="+mn-ea"/>
+                    <a:cs typeface="+mn-cs"/>
+                  </a:defRPr>
+                </a:lvl6pPr>
+                <a:lvl7pPr marL="1300000" indent="-228600" algn="l" defTabSz="914400" rtl="0" eaLnBrk="1" latinLnBrk="0" hangingPunct="1">
+                  <a:lnSpc>
+                    <a:spcPct val="90000"/>
+                  </a:lnSpc>
+                  <a:spcBef>
+                    <a:spcPts val="200"/>
+                  </a:spcBef>
+                  <a:spcAft>
+                    <a:spcPts val="400"/>
+                  </a:spcAft>
+                  <a:buClr>
+                    <a:schemeClr val="accent1"/>
+                  </a:buClr>
+                  <a:buFont typeface="Calibri" pitchFamily="34" charset="0"/>
+                  <a:buChar char="◦"/>
+                  <a:defRPr sz="1400" kern="1200">
+                    <a:solidFill>
+                      <a:schemeClr val="tx1">
+                        <a:lumMod val="75000"/>
+                        <a:lumOff val="25000"/>
+                      </a:schemeClr>
+                    </a:solidFill>
+                    <a:latin typeface="+mn-lt"/>
+                    <a:ea typeface="+mn-ea"/>
+                    <a:cs typeface="+mn-cs"/>
+                  </a:defRPr>
+                </a:lvl7pPr>
+                <a:lvl8pPr marL="1500000" indent="-228600" algn="l" defTabSz="914400" rtl="0" eaLnBrk="1" latinLnBrk="0" hangingPunct="1">
+                  <a:lnSpc>
+                    <a:spcPct val="90000"/>
+                  </a:lnSpc>
+                  <a:spcBef>
+                    <a:spcPts val="200"/>
+                  </a:spcBef>
+                  <a:spcAft>
+                    <a:spcPts val="400"/>
+                  </a:spcAft>
+                  <a:buClr>
+                    <a:schemeClr val="accent1"/>
+                  </a:buClr>
+                  <a:buFont typeface="Calibri" pitchFamily="34" charset="0"/>
+                  <a:buChar char="◦"/>
+                  <a:defRPr sz="1400" kern="1200">
+                    <a:solidFill>
+                      <a:schemeClr val="tx1">
+                        <a:lumMod val="75000"/>
+                        <a:lumOff val="25000"/>
+                      </a:schemeClr>
+                    </a:solidFill>
+                    <a:latin typeface="+mn-lt"/>
+                    <a:ea typeface="+mn-ea"/>
+                    <a:cs typeface="+mn-cs"/>
+                  </a:defRPr>
+                </a:lvl8pPr>
+                <a:lvl9pPr marL="1700000" indent="-228600" algn="l" defTabSz="914400" rtl="0" eaLnBrk="1" latinLnBrk="0" hangingPunct="1">
+                  <a:lnSpc>
+                    <a:spcPct val="90000"/>
+                  </a:lnSpc>
+                  <a:spcBef>
+                    <a:spcPts val="200"/>
+                  </a:spcBef>
+                  <a:spcAft>
+                    <a:spcPts val="400"/>
+                  </a:spcAft>
+                  <a:buClr>
+                    <a:schemeClr val="accent1"/>
+                  </a:buClr>
+                  <a:buFont typeface="Calibri" pitchFamily="34" charset="0"/>
+                  <a:buChar char="◦"/>
+                  <a:defRPr sz="1400" kern="1200">
+                    <a:solidFill>
+                      <a:schemeClr val="tx1">
+                        <a:lumMod val="75000"/>
+                        <a:lumOff val="25000"/>
+                      </a:schemeClr>
+                    </a:solidFill>
+                    <a:latin typeface="+mn-lt"/>
+                    <a:ea typeface="+mn-ea"/>
+                    <a:cs typeface="+mn-cs"/>
+                  </a:defRPr>
+                </a:lvl9pPr>
+              </a:lstStyle>
+              <a:p>
+                <a:pPr indent="-182880">
+                  <a:buFont typeface="Arial" panose="020B0604020202020204" pitchFamily="34" charset="0"/>
+                  <a:buChar char="•"/>
+                </a:pPr>
+                <a:r>
+                  <a:rPr lang="en-US" sz="1700" dirty="0">
+                    <a:cs typeface="Arial" panose="020B0604020202020204" pitchFamily="34" charset="0"/>
+                  </a:rPr>
+                  <a:t>Simulating from the distribution of</a:t>
+                </a:r>
+                <a14:m>
+                  <m:oMath xmlns:m="http://schemas.openxmlformats.org/officeDocument/2006/math">
+                    <m:r>
+                      <a:rPr lang="en-US" sz="1700" b="0" i="0" smtClean="0">
+                        <a:latin typeface="Cambria Math" panose="02040503050406030204" pitchFamily="18" charset="0"/>
+                      </a:rPr>
+                      <m:t> </m:t>
+                    </m:r>
+                    <m:acc>
+                      <m:accPr>
+                        <m:chr m:val="̂"/>
+                        <m:ctrlPr>
+                          <a:rPr lang="en-US" sz="1700" b="0" i="1" smtClean="0">
+                            <a:latin typeface="Cambria Math" panose="02040503050406030204" pitchFamily="18" charset="0"/>
+                          </a:rPr>
+                        </m:ctrlPr>
+                      </m:accPr>
+                      <m:e>
+                        <m:r>
+                          <a:rPr lang="en-US" sz="1700" b="0" i="1" smtClean="0">
+                            <a:latin typeface="Cambria Math" panose="02040503050406030204" pitchFamily="18" charset="0"/>
+                          </a:rPr>
+                          <m:t>𝐹</m:t>
+                        </m:r>
+                      </m:e>
+                    </m:acc>
+                    <m:d>
+                      <m:dPr>
+                        <m:ctrlPr>
+                          <a:rPr lang="en-US" sz="1700" i="1" smtClean="0">
+                            <a:latin typeface="Cambria Math" panose="02040503050406030204" pitchFamily="18" charset="0"/>
+                          </a:rPr>
+                        </m:ctrlPr>
+                      </m:dPr>
+                      <m:e>
+                        <m:r>
+                          <a:rPr lang="en-US" sz="1700" i="1" smtClean="0">
+                            <a:latin typeface="Cambria Math" panose="02040503050406030204" pitchFamily="18" charset="0"/>
+                          </a:rPr>
+                          <m:t>𝑥</m:t>
+                        </m:r>
+                      </m:e>
+                    </m:d>
+                  </m:oMath>
+                </a14:m>
+                <a:r>
+                  <a:rPr lang="en-US" sz="1700" dirty="0">
+                    <a:latin typeface="Cambria Math" panose="02040503050406030204" pitchFamily="18" charset="0"/>
+                  </a:rPr>
+                  <a:t>:</a:t>
+                </a:r>
+              </a:p>
+              <a:p>
+                <a:pPr marL="0" indent="0">
+                  <a:buNone/>
+                </a:pPr>
+                <a:endParaRPr lang="en-US" sz="300" i="1" dirty="0">
+                  <a:latin typeface="Cambria Math" panose="02040503050406030204" pitchFamily="18" charset="0"/>
+                </a:endParaRPr>
+              </a:p>
+              <a:p>
+                <a:pPr marL="0" indent="0">
+                  <a:buNone/>
+                </a:pPr>
+                <a14:m>
+                  <m:oMathPara xmlns:m="http://schemas.openxmlformats.org/officeDocument/2006/math">
+                    <m:oMathParaPr>
+                      <m:jc m:val="center"/>
+                    </m:oMathParaPr>
+                    <m:oMath xmlns:m="http://schemas.openxmlformats.org/officeDocument/2006/math">
+                      <m:d>
+                        <m:dPr>
+                          <m:begChr m:val="{"/>
+                          <m:endChr m:val=""/>
+                          <m:ctrlPr>
+                            <a:rPr lang="en-US" sz="1600" i="1" smtClean="0">
+                              <a:latin typeface="Cambria Math" panose="02040503050406030204" pitchFamily="18" charset="0"/>
+                            </a:rPr>
+                          </m:ctrlPr>
+                        </m:dPr>
+                        <m:e>
+                          <m:eqArr>
+                            <m:eqArrPr>
+                              <m:ctrlPr>
+                                <a:rPr lang="en-US" sz="1600" i="1" smtClean="0">
+                                  <a:latin typeface="Cambria Math" panose="02040503050406030204" pitchFamily="18" charset="0"/>
+                                </a:rPr>
+                              </m:ctrlPr>
+                            </m:eqArrPr>
+                            <m:e>
+                              <m:r>
+                                <a:rPr lang="en-US" sz="1600" b="0" i="1" smtClean="0">
+                                  <a:latin typeface="Cambria Math" panose="02040503050406030204" pitchFamily="18" charset="0"/>
+                                </a:rPr>
+                                <m:t>0</m:t>
+                              </m:r>
+                              <m:r>
+                                <a:rPr lang="en-US" sz="1600" b="0" i="1" smtClean="0">
+                                  <a:latin typeface="Cambria Math" panose="02040503050406030204" pitchFamily="18" charset="0"/>
+                                </a:rPr>
+                                <m:t>,  </m:t>
+                              </m:r>
+                              <m:r>
+                                <a:rPr lang="en-US" sz="1600" b="0" i="1" smtClean="0">
+                                  <a:latin typeface="Cambria Math" panose="02040503050406030204" pitchFamily="18" charset="0"/>
+                                </a:rPr>
+                                <m:t>                                                                </m:t>
+                              </m:r>
+                              <m:r>
+                                <a:rPr lang="en-US" sz="1600" i="1" smtClean="0">
+                                  <a:latin typeface="Cambria Math" panose="02040503050406030204" pitchFamily="18" charset="0"/>
+                                </a:rPr>
+                                <m:t>𝑥</m:t>
+                              </m:r>
+                              <m:r>
+                                <a:rPr lang="en-US" sz="1600" i="1" smtClean="0">
+                                  <a:latin typeface="Cambria Math" panose="02040503050406030204" pitchFamily="18" charset="0"/>
+                                </a:rPr>
+                                <m:t>&lt;</m:t>
+                              </m:r>
+                              <m:sSub>
+                                <m:sSubPr>
+                                  <m:ctrlPr>
+                                    <a:rPr lang="en-US" sz="1600" b="0" i="1" smtClean="0">
+                                      <a:latin typeface="Cambria Math" panose="02040503050406030204" pitchFamily="18" charset="0"/>
+                                    </a:rPr>
+                                  </m:ctrlPr>
+                                </m:sSubPr>
+                                <m:e>
+                                  <m:r>
+                                    <a:rPr lang="en-US" sz="1600" b="0" i="1" smtClean="0">
+                                      <a:latin typeface="Cambria Math" panose="02040503050406030204" pitchFamily="18" charset="0"/>
+                                    </a:rPr>
+                                    <m:t>𝑥</m:t>
+                                  </m:r>
+                                </m:e>
+                                <m:sub>
+                                  <m:r>
+                                    <a:rPr lang="en-US" sz="1600" b="0" i="1" smtClean="0">
+                                      <a:latin typeface="Cambria Math" panose="02040503050406030204" pitchFamily="18" charset="0"/>
+                                    </a:rPr>
+                                    <m:t>0</m:t>
+                                  </m:r>
+                                </m:sub>
+                              </m:sSub>
+                            </m:e>
+                            <m:e>
+                              <m:r>
+                                <a:rPr lang="en-US" sz="1600" i="1" smtClean="0">
+                                  <a:latin typeface="Cambria Math" panose="02040503050406030204" pitchFamily="18" charset="0"/>
+                                </a:rPr>
+                                <m:t>&amp;</m:t>
+                              </m:r>
+                              <m:sSub>
+                                <m:sSubPr>
+                                  <m:ctrlPr>
+                                    <a:rPr lang="en-US" sz="1600" b="0" i="1" smtClean="0">
+                                      <a:latin typeface="Cambria Math" panose="02040503050406030204" pitchFamily="18" charset="0"/>
+                                    </a:rPr>
+                                  </m:ctrlPr>
+                                </m:sSubPr>
+                                <m:e>
+                                  <m:acc>
+                                    <m:accPr>
+                                      <m:chr m:val="̂"/>
+                                      <m:ctrlPr>
+                                        <a:rPr lang="en-US" sz="1600" b="0" i="1" smtClean="0">
+                                          <a:latin typeface="Cambria Math" panose="02040503050406030204" pitchFamily="18" charset="0"/>
+                                        </a:rPr>
+                                      </m:ctrlPr>
+                                    </m:accPr>
+                                    <m:e>
+                                      <m:r>
+                                        <a:rPr lang="en-US" sz="1600" b="0" i="1" smtClean="0">
+                                          <a:latin typeface="Cambria Math" panose="02040503050406030204" pitchFamily="18" charset="0"/>
+                                        </a:rPr>
+                                        <m:t>𝐹</m:t>
+                                      </m:r>
+                                    </m:e>
+                                  </m:acc>
+                                </m:e>
+                                <m:sub>
+                                  <m:r>
+                                    <a:rPr lang="en-US" sz="1600" b="0" i="1" smtClean="0">
+                                      <a:latin typeface="Cambria Math" panose="02040503050406030204" pitchFamily="18" charset="0"/>
+                                    </a:rPr>
+                                    <m:t>𝑘</m:t>
+                                  </m:r>
+                                  <m:r>
+                                    <a:rPr lang="en-US" sz="1600" b="0" i="1" smtClean="0">
+                                      <a:latin typeface="Cambria Math" panose="02040503050406030204" pitchFamily="18" charset="0"/>
+                                    </a:rPr>
+                                    <m:t>−</m:t>
+                                  </m:r>
+                                  <m:r>
+                                    <a:rPr lang="en-US" sz="1600" b="0" i="1" smtClean="0">
+                                      <a:latin typeface="Cambria Math" panose="02040503050406030204" pitchFamily="18" charset="0"/>
+                                    </a:rPr>
+                                    <m:t>1</m:t>
+                                  </m:r>
+                                </m:sub>
+                              </m:sSub>
+                              <m:r>
+                                <a:rPr lang="en-US" sz="1600" b="0" i="1" smtClean="0">
+                                  <a:latin typeface="Cambria Math" panose="02040503050406030204" pitchFamily="18" charset="0"/>
+                                </a:rPr>
+                                <m:t>+</m:t>
+                              </m:r>
+                              <m:f>
+                                <m:fPr>
+                                  <m:ctrlPr>
+                                    <a:rPr lang="en-US" sz="1600" b="0" i="1" smtClean="0">
+                                      <a:latin typeface="Cambria Math" panose="02040503050406030204" pitchFamily="18" charset="0"/>
+                                    </a:rPr>
+                                  </m:ctrlPr>
+                                </m:fPr>
+                                <m:num>
+                                  <m:sSub>
+                                    <m:sSubPr>
+                                      <m:ctrlPr>
+                                        <a:rPr lang="en-US" sz="1600" b="0" i="1" smtClean="0">
+                                          <a:latin typeface="Cambria Math" panose="02040503050406030204" pitchFamily="18" charset="0"/>
+                                        </a:rPr>
+                                      </m:ctrlPr>
+                                    </m:sSubPr>
+                                    <m:e>
+                                      <m:acc>
+                                        <m:accPr>
+                                          <m:chr m:val="̂"/>
+                                          <m:ctrlPr>
+                                            <a:rPr lang="en-US" sz="1600" b="0" i="1" smtClean="0">
+                                              <a:latin typeface="Cambria Math" panose="02040503050406030204" pitchFamily="18" charset="0"/>
+                                            </a:rPr>
+                                          </m:ctrlPr>
+                                        </m:accPr>
+                                        <m:e>
+                                          <m:r>
+                                            <a:rPr lang="en-US" sz="1600" b="0" i="1" smtClean="0">
+                                              <a:latin typeface="Cambria Math" panose="02040503050406030204" pitchFamily="18" charset="0"/>
+                                            </a:rPr>
+                                            <m:t>𝐹</m:t>
+                                          </m:r>
+                                        </m:e>
+                                      </m:acc>
+                                    </m:e>
+                                    <m:sub>
+                                      <m:r>
+                                        <a:rPr lang="en-US" sz="1600" b="0" i="1" smtClean="0">
+                                          <a:latin typeface="Cambria Math" panose="02040503050406030204" pitchFamily="18" charset="0"/>
+                                        </a:rPr>
+                                        <m:t>𝑘</m:t>
+                                      </m:r>
+                                    </m:sub>
+                                  </m:sSub>
+                                  <m:r>
+                                    <a:rPr lang="en-US" sz="1600" i="1">
+                                      <a:latin typeface="Cambria Math" panose="02040503050406030204" pitchFamily="18" charset="0"/>
+                                    </a:rPr>
+                                    <m:t>−</m:t>
+                                  </m:r>
+                                  <m:sSub>
+                                    <m:sSubPr>
+                                      <m:ctrlPr>
+                                        <a:rPr lang="en-US" sz="1600" i="1">
+                                          <a:latin typeface="Cambria Math" panose="02040503050406030204" pitchFamily="18" charset="0"/>
+                                        </a:rPr>
+                                      </m:ctrlPr>
+                                    </m:sSubPr>
+                                    <m:e>
+                                      <m:acc>
+                                        <m:accPr>
+                                          <m:chr m:val="̂"/>
+                                          <m:ctrlPr>
+                                            <a:rPr lang="en-US" sz="1600" i="1">
+                                              <a:latin typeface="Cambria Math" panose="02040503050406030204" pitchFamily="18" charset="0"/>
+                                            </a:rPr>
+                                          </m:ctrlPr>
+                                        </m:accPr>
+                                        <m:e>
+                                          <m:r>
+                                            <a:rPr lang="en-US" sz="1600" i="1">
+                                              <a:latin typeface="Cambria Math" panose="02040503050406030204" pitchFamily="18" charset="0"/>
+                                            </a:rPr>
+                                            <m:t>𝐹</m:t>
+                                          </m:r>
+                                        </m:e>
+                                      </m:acc>
+                                    </m:e>
+                                    <m:sub>
+                                      <m:r>
+                                        <a:rPr lang="en-US" sz="1600" i="1">
+                                          <a:latin typeface="Cambria Math" panose="02040503050406030204" pitchFamily="18" charset="0"/>
+                                        </a:rPr>
+                                        <m:t>𝑘</m:t>
+                                      </m:r>
+                                      <m:r>
+                                        <a:rPr lang="en-US" sz="1600" i="1">
+                                          <a:latin typeface="Cambria Math" panose="02040503050406030204" pitchFamily="18" charset="0"/>
+                                        </a:rPr>
+                                        <m:t>−</m:t>
+                                      </m:r>
+                                      <m:r>
+                                        <a:rPr lang="en-US" sz="1600" i="1">
+                                          <a:latin typeface="Cambria Math" panose="02040503050406030204" pitchFamily="18" charset="0"/>
+                                        </a:rPr>
+                                        <m:t>1</m:t>
+                                      </m:r>
+                                    </m:sub>
+                                  </m:sSub>
+                                </m:num>
+                                <m:den>
+                                  <m:r>
+                                    <a:rPr lang="en-US" sz="1600" b="0" i="1" smtClean="0">
+                                      <a:latin typeface="Cambria Math" panose="02040503050406030204" pitchFamily="18" charset="0"/>
+                                    </a:rPr>
+                                    <m:t>𝜂</m:t>
+                                  </m:r>
+                                </m:den>
+                              </m:f>
+                              <m:d>
+                                <m:dPr>
+                                  <m:ctrlPr>
+                                    <a:rPr lang="en-US" sz="1600" b="0" i="1" smtClean="0">
+                                      <a:latin typeface="Cambria Math" panose="02040503050406030204" pitchFamily="18" charset="0"/>
+                                    </a:rPr>
+                                  </m:ctrlPr>
+                                </m:dPr>
+                                <m:e>
+                                  <m:r>
+                                    <a:rPr lang="en-US" sz="1600" b="0" i="1" smtClean="0">
+                                      <a:latin typeface="Cambria Math" panose="02040503050406030204" pitchFamily="18" charset="0"/>
+                                    </a:rPr>
+                                    <m:t>𝑥</m:t>
+                                  </m:r>
+                                  <m:r>
+                                    <a:rPr lang="en-US" sz="1600" b="0" i="1" smtClean="0">
+                                      <a:latin typeface="Cambria Math" panose="02040503050406030204" pitchFamily="18" charset="0"/>
+                                    </a:rPr>
+                                    <m:t>−</m:t>
+                                  </m:r>
+                                  <m:sSub>
+                                    <m:sSubPr>
+                                      <m:ctrlPr>
+                                        <a:rPr lang="en-US" sz="1600" b="0" i="1" smtClean="0">
+                                          <a:latin typeface="Cambria Math" panose="02040503050406030204" pitchFamily="18" charset="0"/>
+                                        </a:rPr>
+                                      </m:ctrlPr>
+                                    </m:sSubPr>
+                                    <m:e>
+                                      <m:r>
+                                        <a:rPr lang="en-US" sz="1600" b="0" i="1" smtClean="0">
+                                          <a:latin typeface="Cambria Math" panose="02040503050406030204" pitchFamily="18" charset="0"/>
+                                        </a:rPr>
+                                        <m:t>𝑥</m:t>
+                                      </m:r>
+                                    </m:e>
+                                    <m:sub>
+                                      <m:r>
+                                        <a:rPr lang="en-US" sz="1600" b="0" i="1" smtClean="0">
+                                          <a:latin typeface="Cambria Math" panose="02040503050406030204" pitchFamily="18" charset="0"/>
+                                        </a:rPr>
+                                        <m:t>𝑘</m:t>
+                                      </m:r>
+                                      <m:r>
+                                        <a:rPr lang="en-US" sz="1600" b="0" i="1" smtClean="0">
+                                          <a:latin typeface="Cambria Math" panose="02040503050406030204" pitchFamily="18" charset="0"/>
+                                        </a:rPr>
+                                        <m:t>−</m:t>
+                                      </m:r>
+                                      <m:r>
+                                        <a:rPr lang="en-US" sz="1600" b="0" i="1" smtClean="0">
+                                          <a:latin typeface="Cambria Math" panose="02040503050406030204" pitchFamily="18" charset="0"/>
+                                        </a:rPr>
+                                        <m:t>1</m:t>
+                                      </m:r>
+                                    </m:sub>
+                                  </m:sSub>
+                                </m:e>
+                              </m:d>
+                              <m:r>
+                                <a:rPr lang="en-US" sz="1600" b="0" i="1" smtClean="0">
+                                  <a:latin typeface="Cambria Math" panose="02040503050406030204" pitchFamily="18" charset="0"/>
+                                </a:rPr>
+                                <m:t>,  </m:t>
+                              </m:r>
+                              <m:sSub>
+                                <m:sSubPr>
+                                  <m:ctrlPr>
+                                    <a:rPr lang="en-US" sz="1600" b="0" i="1" smtClean="0">
+                                      <a:latin typeface="Cambria Math" panose="02040503050406030204" pitchFamily="18" charset="0"/>
+                                    </a:rPr>
+                                  </m:ctrlPr>
+                                </m:sSubPr>
+                                <m:e>
+                                  <m:r>
+                                    <a:rPr lang="en-US" sz="1600" i="1" smtClean="0">
+                                      <a:latin typeface="Cambria Math" panose="02040503050406030204" pitchFamily="18" charset="0"/>
+                                    </a:rPr>
+                                    <m:t>𝑥</m:t>
+                                  </m:r>
+                                </m:e>
+                                <m:sub>
+                                  <m:r>
+                                    <a:rPr lang="en-US" sz="1600" b="0" i="1" smtClean="0">
+                                      <a:latin typeface="Cambria Math" panose="02040503050406030204" pitchFamily="18" charset="0"/>
+                                    </a:rPr>
+                                    <m:t>𝑘</m:t>
+                                  </m:r>
+                                  <m:r>
+                                    <a:rPr lang="en-US" sz="1600" b="0" i="1" smtClean="0">
+                                      <a:latin typeface="Cambria Math" panose="02040503050406030204" pitchFamily="18" charset="0"/>
+                                    </a:rPr>
+                                    <m:t>−</m:t>
+                                  </m:r>
+                                  <m:r>
+                                    <a:rPr lang="en-US" sz="1600" b="0" i="1" smtClean="0">
+                                      <a:latin typeface="Cambria Math" panose="02040503050406030204" pitchFamily="18" charset="0"/>
+                                    </a:rPr>
+                                    <m:t>1</m:t>
+                                  </m:r>
+                                </m:sub>
+                              </m:sSub>
+                              <m:r>
+                                <a:rPr lang="en-US" sz="1600" b="0" i="1" smtClean="0">
+                                  <a:latin typeface="Cambria Math" panose="02040503050406030204" pitchFamily="18" charset="0"/>
+                                </a:rPr>
+                                <m:t>&lt;</m:t>
+                              </m:r>
+                              <m:r>
+                                <a:rPr lang="en-US" sz="1600" b="0" i="1" smtClean="0">
+                                  <a:latin typeface="Cambria Math" panose="02040503050406030204" pitchFamily="18" charset="0"/>
+                                </a:rPr>
+                                <m:t>𝑥</m:t>
+                              </m:r>
+                              <m:r>
+                                <a:rPr lang="en-US" sz="1600" b="0" i="1" smtClean="0">
+                                  <a:latin typeface="Cambria Math" panose="02040503050406030204" pitchFamily="18" charset="0"/>
+                                </a:rPr>
+                                <m:t>&lt;</m:t>
+                              </m:r>
+                              <m:sSub>
+                                <m:sSubPr>
+                                  <m:ctrlPr>
+                                    <a:rPr lang="en-US" sz="1600" b="0" i="1" smtClean="0">
+                                      <a:latin typeface="Cambria Math" panose="02040503050406030204" pitchFamily="18" charset="0"/>
+                                    </a:rPr>
+                                  </m:ctrlPr>
+                                </m:sSubPr>
+                                <m:e>
+                                  <m:r>
+                                    <a:rPr lang="en-US" sz="1600" b="0" i="1" smtClean="0">
+                                      <a:latin typeface="Cambria Math" panose="02040503050406030204" pitchFamily="18" charset="0"/>
+                                    </a:rPr>
+                                    <m:t>𝑥</m:t>
+                                  </m:r>
+                                </m:e>
+                                <m:sub>
+                                  <m:r>
+                                    <a:rPr lang="en-US" sz="1600" b="0" i="1" smtClean="0">
+                                      <a:latin typeface="Cambria Math" panose="02040503050406030204" pitchFamily="18" charset="0"/>
+                                    </a:rPr>
+                                    <m:t>𝑘</m:t>
+                                  </m:r>
+                                </m:sub>
+                              </m:sSub>
+                            </m:e>
+                            <m:e>
+                              <m:r>
+                                <a:rPr lang="en-US" sz="1600" b="0" i="1" smtClean="0">
+                                  <a:latin typeface="Cambria Math" panose="02040503050406030204" pitchFamily="18" charset="0"/>
+                                </a:rPr>
+                                <m:t>1</m:t>
+                              </m:r>
+                              <m:r>
+                                <a:rPr lang="en-US" sz="1600" b="0" i="1" smtClean="0">
+                                  <a:latin typeface="Cambria Math" panose="02040503050406030204" pitchFamily="18" charset="0"/>
+                                </a:rPr>
+                                <m:t>,                                                                  </m:t>
+                              </m:r>
+                              <m:r>
+                                <a:rPr lang="en-US" sz="1600" b="0" i="1" smtClean="0">
+                                  <a:latin typeface="Cambria Math" panose="02040503050406030204" pitchFamily="18" charset="0"/>
+                                </a:rPr>
+                                <m:t>𝑥</m:t>
+                              </m:r>
+                              <m:r>
+                                <a:rPr lang="en-US" sz="1600" b="0" i="1" smtClean="0">
+                                  <a:latin typeface="Cambria Math" panose="02040503050406030204" pitchFamily="18" charset="0"/>
+                                </a:rPr>
+                                <m:t>≥</m:t>
+                              </m:r>
+                              <m:sSub>
+                                <m:sSubPr>
+                                  <m:ctrlPr>
+                                    <a:rPr lang="en-US" sz="1600" b="0" i="1" smtClean="0">
+                                      <a:latin typeface="Cambria Math" panose="02040503050406030204" pitchFamily="18" charset="0"/>
+                                    </a:rPr>
+                                  </m:ctrlPr>
+                                </m:sSubPr>
+                                <m:e>
+                                  <m:r>
+                                    <a:rPr lang="en-US" sz="1600" b="0" i="1" smtClean="0">
+                                      <a:latin typeface="Cambria Math" panose="02040503050406030204" pitchFamily="18" charset="0"/>
+                                    </a:rPr>
+                                    <m:t>𝑥</m:t>
+                                  </m:r>
+                                </m:e>
+                                <m:sub>
+                                  <m:r>
+                                    <a:rPr lang="en-US" sz="1600" b="0" i="1" smtClean="0">
+                                      <a:latin typeface="Cambria Math" panose="02040503050406030204" pitchFamily="18" charset="0"/>
+                                    </a:rPr>
+                                    <m:t>𝐾</m:t>
+                                  </m:r>
+                                </m:sub>
+                              </m:sSub>
+                            </m:e>
+                          </m:eqArr>
+                        </m:e>
+                      </m:d>
+                    </m:oMath>
+                  </m:oMathPara>
+                </a14:m>
+                <a:endParaRPr lang="en-US" sz="1400" dirty="0"/>
+              </a:p>
+              <a:p>
+                <a:pPr marL="0" indent="0">
+                  <a:buFont typeface="Calibri" panose="020F0502020204030204" pitchFamily="34" charset="0"/>
+                  <a:buNone/>
+                </a:pPr>
+                <a:endParaRPr lang="en-US" sz="1400" dirty="0"/>
+              </a:p>
+            </p:txBody>
+          </p:sp>
+        </mc:Choice>
+        <mc:Fallback>
+          <p:sp>
+            <p:nvSpPr>
+              <p:cNvPr id="6" name="Content Placeholder 6">
+                <a:extLst>
+                  <a:ext uri="{FF2B5EF4-FFF2-40B4-BE49-F238E27FC236}">
+                    <a16:creationId xmlns:a16="http://schemas.microsoft.com/office/drawing/2014/main" id="{E750046E-667C-4A0D-A1DC-DE352C57EA02}"/>
+                  </a:ext>
+                </a:extLst>
+              </p:cNvPr>
+              <p:cNvSpPr txBox="1">
+                <a:spLocks noRot="1" noChangeAspect="1" noMove="1" noResize="1" noEditPoints="1" noAdjustHandles="1" noChangeArrowheads="1" noChangeShapeType="1" noTextEdit="1"/>
+              </p:cNvSpPr>
+              <p:nvPr/>
+            </p:nvSpPr>
+            <p:spPr>
+              <a:xfrm>
+                <a:off x="7750884" y="1846842"/>
+                <a:ext cx="4100457" cy="3286760"/>
+              </a:xfrm>
+              <a:prstGeom prst="rect">
+                <a:avLst/>
+              </a:prstGeom>
+              <a:blipFill>
+                <a:blip r:embed="rId3"/>
+                <a:stretch>
+                  <a:fillRect l="-594" t="-1484" r="-297"/>
+                </a:stretch>
+              </a:blipFill>
+            </p:spPr>
+            <p:txBody>
+              <a:bodyPr/>
+              <a:lstStyle/>
+              <a:p>
+                <a:r>
+                  <a:rPr lang="en-US">
+                    <a:noFill/>
+                  </a:rPr>
+                  <a:t> </a:t>
+                </a:r>
+              </a:p>
+            </p:txBody>
+          </p:sp>
+        </mc:Fallback>
+      </mc:AlternateContent>
     </p:spTree>
     <p:extLst>
       <p:ext uri="{BB962C8B-B14F-4D97-AF65-F5344CB8AC3E}">
@@ -5427,6 +7854,63 @@
           </a:prstGeom>
         </p:spPr>
       </p:pic>
+      <p:sp>
+        <p:nvSpPr>
+          <p:cNvPr id="10" name="Footer Placeholder 9">
+            <a:extLst>
+              <a:ext uri="{FF2B5EF4-FFF2-40B4-BE49-F238E27FC236}">
+                <a16:creationId xmlns:a16="http://schemas.microsoft.com/office/drawing/2014/main" id="{E0A7A120-0A9C-48B0-93CE-71352E8A5091}"/>
+              </a:ext>
+            </a:extLst>
+          </p:cNvPr>
+          <p:cNvSpPr>
+            <a:spLocks noGrp="1"/>
+          </p:cNvSpPr>
+          <p:nvPr>
+            <p:ph type="ftr" sz="quarter" idx="11"/>
+          </p:nvPr>
+        </p:nvSpPr>
+        <p:spPr/>
+        <p:txBody>
+          <a:bodyPr/>
+          <a:lstStyle/>
+          <a:p>
+            <a:r>
+              <a:rPr lang="en-US" sz="1100" dirty="0"/>
+              <a:t>R/finance 2019 - Joseph Loss </a:t>
+            </a:r>
+          </a:p>
+        </p:txBody>
+      </p:sp>
+      <p:sp>
+        <p:nvSpPr>
+          <p:cNvPr id="11" name="Slide Number Placeholder 10">
+            <a:extLst>
+              <a:ext uri="{FF2B5EF4-FFF2-40B4-BE49-F238E27FC236}">
+                <a16:creationId xmlns:a16="http://schemas.microsoft.com/office/drawing/2014/main" id="{A7D01046-FF4B-4BDD-B92A-5C3EB3D6553E}"/>
+              </a:ext>
+            </a:extLst>
+          </p:cNvPr>
+          <p:cNvSpPr>
+            <a:spLocks noGrp="1"/>
+          </p:cNvSpPr>
+          <p:nvPr>
+            <p:ph type="sldNum" sz="quarter" idx="12"/>
+          </p:nvPr>
+        </p:nvSpPr>
+        <p:spPr/>
+        <p:txBody>
+          <a:bodyPr/>
+          <a:lstStyle/>
+          <a:p>
+            <a:fld id="{4FAB73BC-B049-4115-A692-8D63A059BFB8}" type="slidenum">
+              <a:rPr lang="en-US" sz="1100" smtClean="0"/>
+              <a:t>6</a:t>
+            </a:fld>
+            <a:endParaRPr lang="en-US" sz="1100" dirty="0"/>
+          </a:p>
+        </p:txBody>
+      </p:sp>
     </p:spTree>
     <p:extLst>
       <p:ext uri="{BB962C8B-B14F-4D97-AF65-F5344CB8AC3E}">
@@ -6280,6 +8764,63 @@
               </a:rPr>
               <a:t>BS Finance</a:t>
             </a:r>
+          </a:p>
+        </p:txBody>
+      </p:sp>
+      <p:sp>
+        <p:nvSpPr>
+          <p:cNvPr id="4" name="Footer Placeholder 3">
+            <a:extLst>
+              <a:ext uri="{FF2B5EF4-FFF2-40B4-BE49-F238E27FC236}">
+                <a16:creationId xmlns:a16="http://schemas.microsoft.com/office/drawing/2014/main" id="{C91F995D-3F52-4A55-B51D-DECB52A1B0BA}"/>
+              </a:ext>
+            </a:extLst>
+          </p:cNvPr>
+          <p:cNvSpPr>
+            <a:spLocks noGrp="1"/>
+          </p:cNvSpPr>
+          <p:nvPr>
+            <p:ph type="ftr" sz="quarter" idx="11"/>
+          </p:nvPr>
+        </p:nvSpPr>
+        <p:spPr/>
+        <p:txBody>
+          <a:bodyPr/>
+          <a:lstStyle/>
+          <a:p>
+            <a:r>
+              <a:rPr lang="en-US" sz="1100" dirty="0"/>
+              <a:t>R/finance 2019 - Joseph Loss </a:t>
+            </a:r>
+          </a:p>
+        </p:txBody>
+      </p:sp>
+      <p:sp>
+        <p:nvSpPr>
+          <p:cNvPr id="5" name="Slide Number Placeholder 4">
+            <a:extLst>
+              <a:ext uri="{FF2B5EF4-FFF2-40B4-BE49-F238E27FC236}">
+                <a16:creationId xmlns:a16="http://schemas.microsoft.com/office/drawing/2014/main" id="{568B4C74-7F13-40EE-BEA5-3DFD18BE1723}"/>
+              </a:ext>
+            </a:extLst>
+          </p:cNvPr>
+          <p:cNvSpPr>
+            <a:spLocks noGrp="1"/>
+          </p:cNvSpPr>
+          <p:nvPr>
+            <p:ph type="sldNum" sz="quarter" idx="12"/>
+          </p:nvPr>
+        </p:nvSpPr>
+        <p:spPr/>
+        <p:txBody>
+          <a:bodyPr/>
+          <a:lstStyle/>
+          <a:p>
+            <a:fld id="{4CE482DC-2269-4F26-9D2A-7E44B1A4CD85}" type="slidenum">
+              <a:rPr lang="en-US" sz="1100" smtClean="0"/>
+              <a:t>7</a:t>
+            </a:fld>
+            <a:endParaRPr lang="en-US" sz="1100" dirty="0"/>
           </a:p>
         </p:txBody>
       </p:sp>
@@ -6577,4 +9118,299 @@
     </a:ext>
   </a:extLst>
 </a:theme>
+</file>
+
+<file path=ppt/theme/theme2.xml><?xml version="1.0" encoding="utf-8"?>
+<a:theme xmlns:a="http://schemas.openxmlformats.org/drawingml/2006/main" name="Office Theme">
+  <a:themeElements>
+    <a:clrScheme name="Office">
+      <a:dk1>
+        <a:sysClr val="windowText" lastClr="000000"/>
+      </a:dk1>
+      <a:lt1>
+        <a:sysClr val="window" lastClr="FFFFFF"/>
+      </a:lt1>
+      <a:dk2>
+        <a:srgbClr val="44546A"/>
+      </a:dk2>
+      <a:lt2>
+        <a:srgbClr val="E7E6E6"/>
+      </a:lt2>
+      <a:accent1>
+        <a:srgbClr val="4472C4"/>
+      </a:accent1>
+      <a:accent2>
+        <a:srgbClr val="ED7D31"/>
+      </a:accent2>
+      <a:accent3>
+        <a:srgbClr val="A5A5A5"/>
+      </a:accent3>
+      <a:accent4>
+        <a:srgbClr val="FFC000"/>
+      </a:accent4>
+      <a:accent5>
+        <a:srgbClr val="5B9BD5"/>
+      </a:accent5>
+      <a:accent6>
+        <a:srgbClr val="70AD47"/>
+      </a:accent6>
+      <a:hlink>
+        <a:srgbClr val="0563C1"/>
+      </a:hlink>
+      <a:folHlink>
+        <a:srgbClr val="954F72"/>
+      </a:folHlink>
+    </a:clrScheme>
+    <a:fontScheme name="Office">
+      <a:majorFont>
+        <a:latin typeface="Calibri Light" panose="020F0302020204030204"/>
+        <a:ea typeface=""/>
+        <a:cs typeface=""/>
+        <a:font script="Jpan" typeface="游ゴシック Light"/>
+        <a:font script="Hang" typeface="맑은 고딕"/>
+        <a:font script="Hans" typeface="等线 Light"/>
+        <a:font script="Hant" typeface="新細明體"/>
+        <a:font script="Arab" typeface="Times New Roman"/>
+        <a:font script="Hebr" typeface="Times New Roman"/>
+        <a:font script="Thai" typeface="Angsana New"/>
+        <a:font script="Ethi" typeface="Nyala"/>
+        <a:font script="Beng" typeface="Vrinda"/>
+        <a:font script="Gujr" typeface="Shruti"/>
+        <a:font script="Khmr" typeface="MoolBoran"/>
+        <a:font script="Knda" typeface="Tunga"/>
+        <a:font script="Guru" typeface="Raavi"/>
+        <a:font script="Cans" typeface="Euphemia"/>
+        <a:font script="Cher" typeface="Plantagenet Cherokee"/>
+        <a:font script="Yiii" typeface="Microsoft Yi Baiti"/>
+        <a:font script="Tibt" typeface="Microsoft Himalaya"/>
+        <a:font script="Thaa" typeface="MV Boli"/>
+        <a:font script="Deva" typeface="Mangal"/>
+        <a:font script="Telu" typeface="Gautami"/>
+        <a:font script="Taml" typeface="Latha"/>
+        <a:font script="Syrc" typeface="Estrangelo Edessa"/>
+        <a:font script="Orya" typeface="Kalinga"/>
+        <a:font script="Mlym" typeface="Kartika"/>
+        <a:font script="Laoo" typeface="DokChampa"/>
+        <a:font script="Sinh" typeface="Iskoola Pota"/>
+        <a:font script="Mong" typeface="Mongolian Baiti"/>
+        <a:font script="Viet" typeface="Times New Roman"/>
+        <a:font script="Uigh" typeface="Microsoft Uighur"/>
+        <a:font script="Geor" typeface="Sylfaen"/>
+        <a:font script="Armn" typeface="Arial"/>
+        <a:font script="Bugi" typeface="Leelawadee UI"/>
+        <a:font script="Bopo" typeface="Microsoft JhengHei"/>
+        <a:font script="Java" typeface="Javanese Text"/>
+        <a:font script="Lisu" typeface="Segoe UI"/>
+        <a:font script="Mymr" typeface="Myanmar Text"/>
+        <a:font script="Nkoo" typeface="Ebrima"/>
+        <a:font script="Olck" typeface="Nirmala UI"/>
+        <a:font script="Osma" typeface="Ebrima"/>
+        <a:font script="Phag" typeface="Phagspa"/>
+        <a:font script="Syrn" typeface="Estrangelo Edessa"/>
+        <a:font script="Syrj" typeface="Estrangelo Edessa"/>
+        <a:font script="Syre" typeface="Estrangelo Edessa"/>
+        <a:font script="Sora" typeface="Nirmala UI"/>
+        <a:font script="Tale" typeface="Microsoft Tai Le"/>
+        <a:font script="Talu" typeface="Microsoft New Tai Lue"/>
+        <a:font script="Tfng" typeface="Ebrima"/>
+      </a:majorFont>
+      <a:minorFont>
+        <a:latin typeface="Calibri" panose="020F0502020204030204"/>
+        <a:ea typeface=""/>
+        <a:cs typeface=""/>
+        <a:font script="Jpan" typeface="游ゴシック"/>
+        <a:font script="Hang" typeface="맑은 고딕"/>
+        <a:font script="Hans" typeface="等线"/>
+        <a:font script="Hant" typeface="新細明體"/>
+        <a:font script="Arab" typeface="Arial"/>
+        <a:font script="Hebr" typeface="Arial"/>
+        <a:font script="Thai" typeface="Cordia New"/>
+        <a:font script="Ethi" typeface="Nyala"/>
+        <a:font script="Beng" typeface="Vrinda"/>
+        <a:font script="Gujr" typeface="Shruti"/>
+        <a:font script="Khmr" typeface="DaunPenh"/>
+        <a:font script="Knda" typeface="Tunga"/>
+        <a:font script="Guru" typeface="Raavi"/>
+        <a:font script="Cans" typeface="Euphemia"/>
+        <a:font script="Cher" typeface="Plantagenet Cherokee"/>
+        <a:font script="Yiii" typeface="Microsoft Yi Baiti"/>
+        <a:font script="Tibt" typeface="Microsoft Himalaya"/>
+        <a:font script="Thaa" typeface="MV Boli"/>
+        <a:font script="Deva" typeface="Mangal"/>
+        <a:font script="Telu" typeface="Gautami"/>
+        <a:font script="Taml" typeface="Latha"/>
+        <a:font script="Syrc" typeface="Estrangelo Edessa"/>
+        <a:font script="Orya" typeface="Kalinga"/>
+        <a:font script="Mlym" typeface="Kartika"/>
+        <a:font script="Laoo" typeface="DokChampa"/>
+        <a:font script="Sinh" typeface="Iskoola Pota"/>
+        <a:font script="Mong" typeface="Mongolian Baiti"/>
+        <a:font script="Viet" typeface="Arial"/>
+        <a:font script="Uigh" typeface="Microsoft Uighur"/>
+        <a:font script="Geor" typeface="Sylfaen"/>
+        <a:font script="Armn" typeface="Arial"/>
+        <a:font script="Bugi" typeface="Leelawadee UI"/>
+        <a:font script="Bopo" typeface="Microsoft JhengHei"/>
+        <a:font script="Java" typeface="Javanese Text"/>
+        <a:font script="Lisu" typeface="Segoe UI"/>
+        <a:font script="Mymr" typeface="Myanmar Text"/>
+        <a:font script="Nkoo" typeface="Ebrima"/>
+        <a:font script="Olck" typeface="Nirmala UI"/>
+        <a:font script="Osma" typeface="Ebrima"/>
+        <a:font script="Phag" typeface="Phagspa"/>
+        <a:font script="Syrn" typeface="Estrangelo Edessa"/>
+        <a:font script="Syrj" typeface="Estrangelo Edessa"/>
+        <a:font script="Syre" typeface="Estrangelo Edessa"/>
+        <a:font script="Sora" typeface="Nirmala UI"/>
+        <a:font script="Tale" typeface="Microsoft Tai Le"/>
+        <a:font script="Talu" typeface="Microsoft New Tai Lue"/>
+        <a:font script="Tfng" typeface="Ebrima"/>
+      </a:minorFont>
+    </a:fontScheme>
+    <a:fmtScheme name="Office">
+      <a:fillStyleLst>
+        <a:solidFill>
+          <a:schemeClr val="phClr"/>
+        </a:solidFill>
+        <a:gradFill rotWithShape="1">
+          <a:gsLst>
+            <a:gs pos="0">
+              <a:schemeClr val="phClr">
+                <a:lumMod val="110000"/>
+                <a:satMod val="105000"/>
+                <a:tint val="67000"/>
+              </a:schemeClr>
+            </a:gs>
+            <a:gs pos="50000">
+              <a:schemeClr val="phClr">
+                <a:lumMod val="105000"/>
+                <a:satMod val="103000"/>
+                <a:tint val="73000"/>
+              </a:schemeClr>
+            </a:gs>
+            <a:gs pos="100000">
+              <a:schemeClr val="phClr">
+                <a:lumMod val="105000"/>
+                <a:satMod val="109000"/>
+                <a:tint val="81000"/>
+              </a:schemeClr>
+            </a:gs>
+          </a:gsLst>
+          <a:lin ang="5400000" scaled="0"/>
+        </a:gradFill>
+        <a:gradFill rotWithShape="1">
+          <a:gsLst>
+            <a:gs pos="0">
+              <a:schemeClr val="phClr">
+                <a:satMod val="103000"/>
+                <a:lumMod val="102000"/>
+                <a:tint val="94000"/>
+              </a:schemeClr>
+            </a:gs>
+            <a:gs pos="50000">
+              <a:schemeClr val="phClr">
+                <a:satMod val="110000"/>
+                <a:lumMod val="100000"/>
+                <a:shade val="100000"/>
+              </a:schemeClr>
+            </a:gs>
+            <a:gs pos="100000">
+              <a:schemeClr val="phClr">
+                <a:lumMod val="99000"/>
+                <a:satMod val="120000"/>
+                <a:shade val="78000"/>
+              </a:schemeClr>
+            </a:gs>
+          </a:gsLst>
+          <a:lin ang="5400000" scaled="0"/>
+        </a:gradFill>
+      </a:fillStyleLst>
+      <a:lnStyleLst>
+        <a:ln w="6350" cap="flat" cmpd="sng" algn="ctr">
+          <a:solidFill>
+            <a:schemeClr val="phClr"/>
+          </a:solidFill>
+          <a:prstDash val="solid"/>
+          <a:miter lim="800000"/>
+        </a:ln>
+        <a:ln w="12700" cap="flat" cmpd="sng" algn="ctr">
+          <a:solidFill>
+            <a:schemeClr val="phClr"/>
+          </a:solidFill>
+          <a:prstDash val="solid"/>
+          <a:miter lim="800000"/>
+        </a:ln>
+        <a:ln w="19050" cap="flat" cmpd="sng" algn="ctr">
+          <a:solidFill>
+            <a:schemeClr val="phClr"/>
+          </a:solidFill>
+          <a:prstDash val="solid"/>
+          <a:miter lim="800000"/>
+        </a:ln>
+      </a:lnStyleLst>
+      <a:effectStyleLst>
+        <a:effectStyle>
+          <a:effectLst/>
+        </a:effectStyle>
+        <a:effectStyle>
+          <a:effectLst/>
+        </a:effectStyle>
+        <a:effectStyle>
+          <a:effectLst>
+            <a:outerShdw blurRad="57150" dist="19050" dir="5400000" algn="ctr" rotWithShape="0">
+              <a:srgbClr val="000000">
+                <a:alpha val="63000"/>
+              </a:srgbClr>
+            </a:outerShdw>
+          </a:effectLst>
+        </a:effectStyle>
+      </a:effectStyleLst>
+      <a:bgFillStyleLst>
+        <a:solidFill>
+          <a:schemeClr val="phClr"/>
+        </a:solidFill>
+        <a:solidFill>
+          <a:schemeClr val="phClr">
+            <a:tint val="95000"/>
+            <a:satMod val="170000"/>
+          </a:schemeClr>
+        </a:solidFill>
+        <a:gradFill rotWithShape="1">
+          <a:gsLst>
+            <a:gs pos="0">
+              <a:schemeClr val="phClr">
+                <a:tint val="93000"/>
+                <a:satMod val="150000"/>
+                <a:shade val="98000"/>
+                <a:lumMod val="102000"/>
+              </a:schemeClr>
+            </a:gs>
+            <a:gs pos="50000">
+              <a:schemeClr val="phClr">
+                <a:tint val="98000"/>
+                <a:satMod val="130000"/>
+                <a:shade val="90000"/>
+                <a:lumMod val="103000"/>
+              </a:schemeClr>
+            </a:gs>
+            <a:gs pos="100000">
+              <a:schemeClr val="phClr">
+                <a:shade val="63000"/>
+                <a:satMod val="120000"/>
+              </a:schemeClr>
+            </a:gs>
+          </a:gsLst>
+          <a:lin ang="5400000" scaled="0"/>
+        </a:gradFill>
+      </a:bgFillStyleLst>
+    </a:fmtScheme>
+  </a:themeElements>
+  <a:objectDefaults/>
+  <a:extraClrSchemeLst/>
+  <a:extLst>
+    <a:ext uri="{05A4C25C-085E-4340-85A3-A5531E510DB2}">
+      <thm15:themeFamily xmlns:thm15="http://schemas.microsoft.com/office/thememl/2012/main" name="Office Theme" id="{62F939B6-93AF-4DB8-9C6B-D6C7DFDC589F}" vid="{4A3C46E8-61CC-4603-A589-7422A47A8E4A}"/>
+    </a:ext>
+  </a:extLst>
+</a:theme>
 </file>
</xml_diff>

<commit_message>
updated with final source code and ppt slides for R conference
</commit_message>
<xml_diff>
--- a/doc/LossJoseph_RFinance_Presentation.pptx
+++ b/doc/LossJoseph_RFinance_Presentation.pptx
@@ -124,13 +124,106 @@
 <file path=ppt/revisionInfo.xml><?xml version="1.0" encoding="utf-8"?>
 <p1510:revInfo xmlns:a="http://schemas.openxmlformats.org/drawingml/2006/main" xmlns:r="http://schemas.openxmlformats.org/officeDocument/2006/relationships" xmlns:p1510="http://schemas.microsoft.com/office/powerpoint/2015/10/main">
   <p1510:revLst>
-    <p1510:client id="{05FB059D-9E26-4890-8BD8-6528E4FB8E67}" v="693" dt="2019-05-16T10:46:03.350"/>
+    <p1510:client id="{05FB059D-9E26-4890-8BD8-6528E4FB8E67}" v="694" dt="2019-05-17T18:47:35.135"/>
   </p1510:revLst>
 </p1510:revInfo>
 </file>
 
 <file path=ppt/changesInfos/changesInfo1.xml><?xml version="1.0" encoding="utf-8"?>
 <pc:chgInfo xmlns:a="http://schemas.openxmlformats.org/drawingml/2006/main" xmlns:r="http://schemas.openxmlformats.org/officeDocument/2006/relationships" xmlns:ac="http://schemas.microsoft.com/office/drawing/2013/main/command" xmlns:pc="http://schemas.microsoft.com/office/powerpoint/2013/main/command">
+  <pc:docChgLst>
+    <pc:chgData name="Joseph Loss" userId="5b31bea6-fbb6-46ce-a3c5-a099ce912c71" providerId="ADAL" clId="{05FB059D-9E26-4890-8BD8-6528E4FB8E67}"/>
+    <pc:docChg chg="undo custSel modSld">
+      <pc:chgData name="Joseph Loss" userId="5b31bea6-fbb6-46ce-a3c5-a099ce912c71" providerId="ADAL" clId="{05FB059D-9E26-4890-8BD8-6528E4FB8E67}" dt="2019-05-17T18:51:01.387" v="67" actId="208"/>
+      <pc:docMkLst>
+        <pc:docMk/>
+      </pc:docMkLst>
+      <pc:sldChg chg="addSp delSp modSp">
+        <pc:chgData name="Joseph Loss" userId="5b31bea6-fbb6-46ce-a3c5-a099ce912c71" providerId="ADAL" clId="{05FB059D-9E26-4890-8BD8-6528E4FB8E67}" dt="2019-05-17T18:50:30.982" v="62" actId="1036"/>
+        <pc:sldMkLst>
+          <pc:docMk/>
+          <pc:sldMk cId="4145850430" sldId="258"/>
+        </pc:sldMkLst>
+        <pc:spChg chg="add del mod">
+          <ac:chgData name="Joseph Loss" userId="5b31bea6-fbb6-46ce-a3c5-a099ce912c71" providerId="ADAL" clId="{05FB059D-9E26-4890-8BD8-6528E4FB8E67}" dt="2019-05-17T18:48:20.937" v="10" actId="478"/>
+          <ac:spMkLst>
+            <pc:docMk/>
+            <pc:sldMk cId="4145850430" sldId="258"/>
+            <ac:spMk id="9" creationId="{D7D16749-BA94-4040-9C75-7BBE7098F044}"/>
+          </ac:spMkLst>
+        </pc:spChg>
+        <pc:picChg chg="add mod">
+          <ac:chgData name="Joseph Loss" userId="5b31bea6-fbb6-46ce-a3c5-a099ce912c71" providerId="ADAL" clId="{05FB059D-9E26-4890-8BD8-6528E4FB8E67}" dt="2019-05-17T18:50:30.982" v="62" actId="1036"/>
+          <ac:picMkLst>
+            <pc:docMk/>
+            <pc:sldMk cId="4145850430" sldId="258"/>
+            <ac:picMk id="6" creationId="{272E73E3-C8B6-4600-BEEA-8D468236470D}"/>
+          </ac:picMkLst>
+        </pc:picChg>
+        <pc:picChg chg="del">
+          <ac:chgData name="Joseph Loss" userId="5b31bea6-fbb6-46ce-a3c5-a099ce912c71" providerId="ADAL" clId="{05FB059D-9E26-4890-8BD8-6528E4FB8E67}" dt="2019-05-17T18:48:14.611" v="9" actId="478"/>
+          <ac:picMkLst>
+            <pc:docMk/>
+            <pc:sldMk cId="4145850430" sldId="258"/>
+            <ac:picMk id="8" creationId="{20D5A634-D357-478C-9594-31193CD3460F}"/>
+          </ac:picMkLst>
+        </pc:picChg>
+      </pc:sldChg>
+      <pc:sldChg chg="modSp">
+        <pc:chgData name="Joseph Loss" userId="5b31bea6-fbb6-46ce-a3c5-a099ce912c71" providerId="ADAL" clId="{05FB059D-9E26-4890-8BD8-6528E4FB8E67}" dt="2019-05-17T18:51:01.387" v="67" actId="208"/>
+        <pc:sldMkLst>
+          <pc:docMk/>
+          <pc:sldMk cId="3198049024" sldId="260"/>
+        </pc:sldMkLst>
+        <pc:picChg chg="mod">
+          <ac:chgData name="Joseph Loss" userId="5b31bea6-fbb6-46ce-a3c5-a099ce912c71" providerId="ADAL" clId="{05FB059D-9E26-4890-8BD8-6528E4FB8E67}" dt="2019-05-17T18:50:48.500" v="66" actId="1036"/>
+          <ac:picMkLst>
+            <pc:docMk/>
+            <pc:sldMk cId="3198049024" sldId="260"/>
+            <ac:picMk id="6" creationId="{CBD7A32C-F305-48CC-919C-E06F4974342C}"/>
+          </ac:picMkLst>
+        </pc:picChg>
+        <pc:picChg chg="mod">
+          <ac:chgData name="Joseph Loss" userId="5b31bea6-fbb6-46ce-a3c5-a099ce912c71" providerId="ADAL" clId="{05FB059D-9E26-4890-8BD8-6528E4FB8E67}" dt="2019-05-17T18:51:01.387" v="67" actId="208"/>
+          <ac:picMkLst>
+            <pc:docMk/>
+            <pc:sldMk cId="3198049024" sldId="260"/>
+            <ac:picMk id="9" creationId="{3069EB63-AD66-48C5-A745-6D514850C9E1}"/>
+          </ac:picMkLst>
+        </pc:picChg>
+      </pc:sldChg>
+      <pc:sldChg chg="modSp">
+        <pc:chgData name="Joseph Loss" userId="5b31bea6-fbb6-46ce-a3c5-a099ce912c71" providerId="ADAL" clId="{05FB059D-9E26-4890-8BD8-6528E4FB8E67}" dt="2019-05-17T18:50:05.895" v="52" actId="1036"/>
+        <pc:sldMkLst>
+          <pc:docMk/>
+          <pc:sldMk cId="1418679565" sldId="262"/>
+        </pc:sldMkLst>
+        <pc:picChg chg="mod">
+          <ac:chgData name="Joseph Loss" userId="5b31bea6-fbb6-46ce-a3c5-a099ce912c71" providerId="ADAL" clId="{05FB059D-9E26-4890-8BD8-6528E4FB8E67}" dt="2019-05-17T18:50:05.895" v="52" actId="1036"/>
+          <ac:picMkLst>
+            <pc:docMk/>
+            <pc:sldMk cId="1418679565" sldId="262"/>
+            <ac:picMk id="7" creationId="{92BA781D-8E2A-4767-8F94-87E6F22C7A99}"/>
+          </ac:picMkLst>
+        </pc:picChg>
+      </pc:sldChg>
+      <pc:sldChg chg="modSp">
+        <pc:chgData name="Joseph Loss" userId="5b31bea6-fbb6-46ce-a3c5-a099ce912c71" providerId="ADAL" clId="{05FB059D-9E26-4890-8BD8-6528E4FB8E67}" dt="2019-05-17T18:50:41.021" v="64" actId="1035"/>
+        <pc:sldMkLst>
+          <pc:docMk/>
+          <pc:sldMk cId="2599024257" sldId="263"/>
+        </pc:sldMkLst>
+        <pc:picChg chg="mod">
+          <ac:chgData name="Joseph Loss" userId="5b31bea6-fbb6-46ce-a3c5-a099ce912c71" providerId="ADAL" clId="{05FB059D-9E26-4890-8BD8-6528E4FB8E67}" dt="2019-05-17T18:50:41.021" v="64" actId="1035"/>
+          <ac:picMkLst>
+            <pc:docMk/>
+            <pc:sldMk cId="2599024257" sldId="263"/>
+            <ac:picMk id="8" creationId="{3EF231DE-180C-42FA-8CA0-1D7ED42576B5}"/>
+          </ac:picMkLst>
+        </pc:picChg>
+      </pc:sldChg>
+    </pc:docChg>
+  </pc:docChgLst>
   <pc:docChgLst>
     <pc:chgData name="Joseph Loss" userId="5b31bea6-fbb6-46ce-a3c5-a099ce912c71" providerId="ADAL" clId="{646E94BB-F877-4F3D-9267-F961441CEC85}"/>
     <pc:docChg chg="undo redo custSel modSld">
@@ -514,7 +607,7 @@
           <a:p>
             <a:fld id="{712E7762-3728-4CA2-BF04-831125DD9062}" type="datetimeFigureOut">
               <a:rPr lang="en-US" smtClean="0"/>
-              <a:t>5/16/2019</a:t>
+              <a:t>5/17/2019</a:t>
             </a:fld>
             <a:endParaRPr lang="en-US"/>
           </a:p>
@@ -781,6 +874,90 @@
 </p:notesMaster>
 </file>
 
+<file path=ppt/notesSlides/notesSlide1.xml><?xml version="1.0" encoding="utf-8"?>
+<p:notes xmlns:a="http://schemas.openxmlformats.org/drawingml/2006/main" xmlns:r="http://schemas.openxmlformats.org/officeDocument/2006/relationships" xmlns:p="http://schemas.openxmlformats.org/presentationml/2006/main">
+  <p:cSld>
+    <p:spTree>
+      <p:nvGrpSpPr>
+        <p:cNvPr id="1" name=""/>
+        <p:cNvGrpSpPr/>
+        <p:nvPr/>
+      </p:nvGrpSpPr>
+      <p:grpSpPr>
+        <a:xfrm>
+          <a:off x="0" y="0"/>
+          <a:ext cx="0" cy="0"/>
+          <a:chOff x="0" y="0"/>
+          <a:chExt cx="0" cy="0"/>
+        </a:xfrm>
+      </p:grpSpPr>
+      <p:sp>
+        <p:nvSpPr>
+          <p:cNvPr id="2" name="Slide Image Placeholder 1"/>
+          <p:cNvSpPr>
+            <a:spLocks noGrp="1" noRot="1" noChangeAspect="1"/>
+          </p:cNvSpPr>
+          <p:nvPr>
+            <p:ph type="sldImg"/>
+          </p:nvPr>
+        </p:nvSpPr>
+        <p:spPr/>
+      </p:sp>
+      <p:sp>
+        <p:nvSpPr>
+          <p:cNvPr id="3" name="Notes Placeholder 2"/>
+          <p:cNvSpPr>
+            <a:spLocks noGrp="1"/>
+          </p:cNvSpPr>
+          <p:nvPr>
+            <p:ph type="body" idx="1"/>
+          </p:nvPr>
+        </p:nvSpPr>
+        <p:spPr/>
+        <p:txBody>
+          <a:bodyPr/>
+          <a:lstStyle/>
+          <a:p>
+            <a:endParaRPr lang="en-US" dirty="0"/>
+          </a:p>
+        </p:txBody>
+      </p:sp>
+      <p:sp>
+        <p:nvSpPr>
+          <p:cNvPr id="4" name="Slide Number Placeholder 3"/>
+          <p:cNvSpPr>
+            <a:spLocks noGrp="1"/>
+          </p:cNvSpPr>
+          <p:nvPr>
+            <p:ph type="sldNum" sz="quarter" idx="5"/>
+          </p:nvPr>
+        </p:nvSpPr>
+        <p:spPr/>
+        <p:txBody>
+          <a:bodyPr/>
+          <a:lstStyle/>
+          <a:p>
+            <a:fld id="{200EA02F-594A-4A12-B33F-FB3E09AD020D}" type="slidenum">
+              <a:rPr lang="en-US" smtClean="0"/>
+              <a:t>1</a:t>
+            </a:fld>
+            <a:endParaRPr lang="en-US"/>
+          </a:p>
+        </p:txBody>
+      </p:sp>
+    </p:spTree>
+    <p:extLst>
+      <p:ext uri="{BB962C8B-B14F-4D97-AF65-F5344CB8AC3E}">
+        <p14:creationId xmlns:p14="http://schemas.microsoft.com/office/powerpoint/2010/main" val="3076863373"/>
+      </p:ext>
+    </p:extLst>
+  </p:cSld>
+  <p:clrMapOvr>
+    <a:masterClrMapping/>
+  </p:clrMapOvr>
+</p:notes>
+</file>
+
 <file path=ppt/slideLayouts/slideLayout1.xml><?xml version="1.0" encoding="utf-8"?>
 <p:sldLayout xmlns:a="http://schemas.openxmlformats.org/drawingml/2006/main" xmlns:r="http://schemas.openxmlformats.org/officeDocument/2006/relationships" xmlns:p="http://schemas.openxmlformats.org/presentationml/2006/main" showMasterSp="0" type="title" preserve="1">
   <p:cSld name="Title Slide">
@@ -1007,7 +1184,7 @@
           <a:p>
             <a:fld id="{59F43141-36B0-40CF-8669-7D0FD0B7374B}" type="datetime1">
               <a:rPr lang="en-US" smtClean="0"/>
-              <a:t>5/16/2019</a:t>
+              <a:t>5/17/2019</a:t>
             </a:fld>
             <a:endParaRPr lang="en-US" dirty="0"/>
           </a:p>
@@ -1214,7 +1391,7 @@
           <a:p>
             <a:fld id="{801C7C19-1958-4FC4-A02D-AE43942B1B8D}" type="datetime1">
               <a:rPr lang="en-US" smtClean="0"/>
-              <a:t>5/16/2019</a:t>
+              <a:t>5/17/2019</a:t>
             </a:fld>
             <a:endParaRPr lang="en-US" dirty="0"/>
           </a:p>
@@ -1469,7 +1646,7 @@
           <a:p>
             <a:fld id="{C9B8409A-081B-4640-B507-A77FE37F0937}" type="datetime1">
               <a:rPr lang="en-US" smtClean="0"/>
-              <a:t>5/16/2019</a:t>
+              <a:t>5/17/2019</a:t>
             </a:fld>
             <a:endParaRPr lang="en-US" dirty="0"/>
           </a:p>
@@ -1638,7 +1815,7 @@
           <a:p>
             <a:fld id="{E882F398-AAD7-4E54-9354-7F4897D0D13C}" type="datetime1">
               <a:rPr lang="en-US" smtClean="0"/>
-              <a:t>5/16/2019</a:t>
+              <a:t>5/17/2019</a:t>
             </a:fld>
             <a:endParaRPr lang="en-US" dirty="0"/>
           </a:p>
@@ -1980,7 +2157,7 @@
           <a:p>
             <a:fld id="{96CC9834-610C-48D2-9D5A-800370EC52E6}" type="datetime1">
               <a:rPr lang="en-US" smtClean="0"/>
-              <a:t>5/16/2019</a:t>
+              <a:t>5/17/2019</a:t>
             </a:fld>
             <a:endParaRPr lang="en-US" dirty="0"/>
           </a:p>
@@ -2254,7 +2431,7 @@
           <a:p>
             <a:fld id="{25014CED-E72D-4F5C-8096-2B558EDE56E2}" type="datetime1">
               <a:rPr lang="en-US" smtClean="0"/>
-              <a:t>5/16/2019</a:t>
+              <a:t>5/17/2019</a:t>
             </a:fld>
             <a:endParaRPr lang="en-US" dirty="0"/>
           </a:p>
@@ -2632,7 +2809,7 @@
           <a:p>
             <a:fld id="{98B2A811-FDCB-46F3-A27F-692BFB80C2A0}" type="datetime1">
               <a:rPr lang="en-US" smtClean="0"/>
-              <a:t>5/16/2019</a:t>
+              <a:t>5/17/2019</a:t>
             </a:fld>
             <a:endParaRPr lang="en-US" dirty="0"/>
           </a:p>
@@ -2749,7 +2926,7 @@
           <a:p>
             <a:fld id="{40B1479A-33C6-421F-91F6-9B497D73F85D}" type="datetime1">
               <a:rPr lang="en-US" smtClean="0"/>
-              <a:t>5/16/2019</a:t>
+              <a:t>5/17/2019</a:t>
             </a:fld>
             <a:endParaRPr lang="en-US" dirty="0"/>
           </a:p>
@@ -2919,7 +3096,7 @@
           <a:p>
             <a:fld id="{B4EBE95D-672D-41AC-B2D6-C37CB166E60E}" type="datetime1">
               <a:rPr lang="en-US" smtClean="0"/>
-              <a:t>5/16/2019</a:t>
+              <a:t>5/17/2019</a:t>
             </a:fld>
             <a:endParaRPr lang="en-US" dirty="0"/>
           </a:p>
@@ -3273,7 +3450,7 @@
           <a:p>
             <a:fld id="{B6B78D39-3C14-4E78-9ADA-E5D66EC7A8E4}" type="datetime1">
               <a:rPr lang="en-US" smtClean="0"/>
-              <a:t>5/16/2019</a:t>
+              <a:t>5/17/2019</a:t>
             </a:fld>
             <a:endParaRPr lang="en-US" dirty="0"/>
           </a:p>
@@ -3650,7 +3827,7 @@
           <a:p>
             <a:fld id="{604CA3DA-61D6-4895-B17A-131D90C1A0D8}" type="datetime1">
               <a:rPr lang="en-US" smtClean="0"/>
-              <a:t>5/16/2019</a:t>
+              <a:t>5/17/2019</a:t>
             </a:fld>
             <a:endParaRPr lang="en-US" dirty="0"/>
           </a:p>
@@ -3936,7 +4113,7 @@
           <a:p>
             <a:fld id="{874B0337-D539-4C49-BD44-C70C88A9AADF}" type="datetime1">
               <a:rPr lang="en-US" smtClean="0"/>
-              <a:t>5/16/2019</a:t>
+              <a:t>5/17/2019</a:t>
             </a:fld>
             <a:endParaRPr lang="en-US" dirty="0"/>
           </a:p>
@@ -4931,7 +5108,7 @@
           <p:nvPr/>
         </p:nvPicPr>
         <p:blipFill>
-          <a:blip r:embed="rId2"/>
+          <a:blip r:embed="rId3"/>
           <a:stretch>
             <a:fillRect/>
           </a:stretch>
@@ -5049,8 +5226,8 @@
           </a:p>
         </p:txBody>
       </p:sp>
-      <mc:AlternateContent xmlns:mc="http://schemas.openxmlformats.org/markup-compatibility/2006">
-        <mc:Choice xmlns:a14="http://schemas.microsoft.com/office/drawing/2010/main" Requires="a14">
+      <mc:AlternateContent xmlns:mc="http://schemas.openxmlformats.org/markup-compatibility/2006" xmlns:a14="http://schemas.microsoft.com/office/drawing/2010/main">
+        <mc:Choice Requires="a14">
           <p:sp>
             <p:nvSpPr>
               <p:cNvPr id="5" name="Content Placeholder 4">
@@ -5436,14 +5613,7 @@
                         <a:latin typeface="Cambria Math" panose="02040503050406030204" pitchFamily="18" charset="0"/>
                         <a:cs typeface="Arial" panose="020B0604020202020204" pitchFamily="34" charset="0"/>
                       </a:rPr>
-                      <m:t>       </m:t>
-                    </m:r>
-                    <m:r>
-                      <a:rPr lang="en-US" sz="2400" b="0" i="1" smtClean="0">
-                        <a:latin typeface="Cambria Math" panose="02040503050406030204" pitchFamily="18" charset="0"/>
-                        <a:cs typeface="Arial" panose="020B0604020202020204" pitchFamily="34" charset="0"/>
-                      </a:rPr>
-                      <m:t>  </m:t>
+                      <m:t>         </m:t>
                     </m:r>
                     <m:sSub>
                       <m:sSubPr>
@@ -5531,7 +5701,7 @@
             </p:txBody>
           </p:sp>
         </mc:Choice>
-        <mc:Fallback>
+        <mc:Fallback xmlns="">
           <p:sp>
             <p:nvSpPr>
               <p:cNvPr id="5" name="Content Placeholder 4">
@@ -5611,8 +5781,8 @@
           </a:p>
         </p:txBody>
       </p:sp>
-      <mc:AlternateContent xmlns:mc="http://schemas.openxmlformats.org/markup-compatibility/2006">
-        <mc:Choice xmlns:a14="http://schemas.microsoft.com/office/drawing/2010/main" Requires="a14">
+      <mc:AlternateContent xmlns:mc="http://schemas.openxmlformats.org/markup-compatibility/2006" xmlns:a14="http://schemas.microsoft.com/office/drawing/2010/main">
+        <mc:Choice Requires="a14">
           <p:sp>
             <p:nvSpPr>
               <p:cNvPr id="7" name="Content Placeholder 6">
@@ -6214,7 +6384,7 @@
             </p:txBody>
           </p:sp>
         </mc:Choice>
-        <mc:Fallback>
+        <mc:Fallback xmlns="">
           <p:sp>
             <p:nvSpPr>
               <p:cNvPr id="7" name="Content Placeholder 6">
@@ -6499,7 +6669,7 @@
         </p:blipFill>
         <p:spPr>
           <a:xfrm>
-            <a:off x="1097281" y="1844561"/>
+            <a:off x="1097281" y="1891211"/>
             <a:ext cx="8042238" cy="4233786"/>
           </a:xfrm>
           <a:prstGeom prst="rect">
@@ -6627,21 +6797,76 @@
           </a:p>
         </p:txBody>
       </p:sp>
+      <p:sp>
+        <p:nvSpPr>
+          <p:cNvPr id="3" name="Footer Placeholder 2">
+            <a:extLst>
+              <a:ext uri="{FF2B5EF4-FFF2-40B4-BE49-F238E27FC236}">
+                <a16:creationId xmlns:a16="http://schemas.microsoft.com/office/drawing/2014/main" id="{683B5159-9027-4C65-B016-2D13BF29B169}"/>
+              </a:ext>
+            </a:extLst>
+          </p:cNvPr>
+          <p:cNvSpPr>
+            <a:spLocks noGrp="1"/>
+          </p:cNvSpPr>
+          <p:nvPr>
+            <p:ph type="ftr" sz="quarter" idx="11"/>
+          </p:nvPr>
+        </p:nvSpPr>
+        <p:spPr/>
+        <p:txBody>
+          <a:bodyPr/>
+          <a:lstStyle/>
+          <a:p>
+            <a:r>
+              <a:rPr lang="en-US" sz="1100" dirty="0"/>
+              <a:t>R/finance 2019 - Joseph Loss </a:t>
+            </a:r>
+          </a:p>
+        </p:txBody>
+      </p:sp>
+      <p:sp>
+        <p:nvSpPr>
+          <p:cNvPr id="4" name="Slide Number Placeholder 3">
+            <a:extLst>
+              <a:ext uri="{FF2B5EF4-FFF2-40B4-BE49-F238E27FC236}">
+                <a16:creationId xmlns:a16="http://schemas.microsoft.com/office/drawing/2014/main" id="{092EA223-64AD-43DE-985F-53C6151D23CF}"/>
+              </a:ext>
+            </a:extLst>
+          </p:cNvPr>
+          <p:cNvSpPr>
+            <a:spLocks noGrp="1"/>
+          </p:cNvSpPr>
+          <p:nvPr>
+            <p:ph type="sldNum" sz="quarter" idx="12"/>
+          </p:nvPr>
+        </p:nvSpPr>
+        <p:spPr/>
+        <p:txBody>
+          <a:bodyPr/>
+          <a:lstStyle/>
+          <a:p>
+            <a:fld id="{4FAB73BC-B049-4115-A692-8D63A059BFB8}" type="slidenum">
+              <a:rPr lang="en-US" sz="1100" smtClean="0"/>
+              <a:t>4</a:t>
+            </a:fld>
+            <a:endParaRPr lang="en-US" sz="1100" dirty="0"/>
+          </a:p>
+        </p:txBody>
+      </p:sp>
       <p:pic>
         <p:nvPicPr>
-          <p:cNvPr id="8" name="Content Placeholder 7" descr="A picture containing boat, water&#10;&#10;Description automatically generated">
+          <p:cNvPr id="6" name="Picture 5" descr="A screenshot of a computer&#10;&#10;Description automatically generated">
             <a:extLst>
               <a:ext uri="{FF2B5EF4-FFF2-40B4-BE49-F238E27FC236}">
-                <a16:creationId xmlns:a16="http://schemas.microsoft.com/office/drawing/2014/main" id="{20D5A634-D357-478C-9594-31193CD3460F}"/>
+                <a16:creationId xmlns:a16="http://schemas.microsoft.com/office/drawing/2014/main" id="{272E73E3-C8B6-4600-BEEA-8D468236470D}"/>
               </a:ext>
             </a:extLst>
           </p:cNvPr>
           <p:cNvPicPr>
-            <a:picLocks noGrp="1" noChangeAspect="1"/>
+            <a:picLocks noChangeAspect="1"/>
           </p:cNvPicPr>
-          <p:nvPr>
-            <p:ph sz="half" idx="2"/>
-          </p:nvPr>
+          <p:nvPr/>
         </p:nvPicPr>
         <p:blipFill>
           <a:blip r:embed="rId2"/>
@@ -6651,9 +6876,12 @@
         </p:blipFill>
         <p:spPr>
           <a:xfrm>
-            <a:off x="1097279" y="1850352"/>
-            <a:ext cx="10058400" cy="4310302"/>
+            <a:off x="1097279" y="1885060"/>
+            <a:ext cx="10058400" cy="4156915"/>
           </a:xfrm>
+          <a:prstGeom prst="rect">
+            <a:avLst/>
+          </a:prstGeom>
           <a:ln>
             <a:solidFill>
               <a:schemeClr val="tx1"/>
@@ -6661,63 +6889,6 @@
           </a:ln>
         </p:spPr>
       </p:pic>
-      <p:sp>
-        <p:nvSpPr>
-          <p:cNvPr id="3" name="Footer Placeholder 2">
-            <a:extLst>
-              <a:ext uri="{FF2B5EF4-FFF2-40B4-BE49-F238E27FC236}">
-                <a16:creationId xmlns:a16="http://schemas.microsoft.com/office/drawing/2014/main" id="{683B5159-9027-4C65-B016-2D13BF29B169}"/>
-              </a:ext>
-            </a:extLst>
-          </p:cNvPr>
-          <p:cNvSpPr>
-            <a:spLocks noGrp="1"/>
-          </p:cNvSpPr>
-          <p:nvPr>
-            <p:ph type="ftr" sz="quarter" idx="11"/>
-          </p:nvPr>
-        </p:nvSpPr>
-        <p:spPr/>
-        <p:txBody>
-          <a:bodyPr/>
-          <a:lstStyle/>
-          <a:p>
-            <a:r>
-              <a:rPr lang="en-US" sz="1100" dirty="0"/>
-              <a:t>R/finance 2019 - Joseph Loss </a:t>
-            </a:r>
-          </a:p>
-        </p:txBody>
-      </p:sp>
-      <p:sp>
-        <p:nvSpPr>
-          <p:cNvPr id="4" name="Slide Number Placeholder 3">
-            <a:extLst>
-              <a:ext uri="{FF2B5EF4-FFF2-40B4-BE49-F238E27FC236}">
-                <a16:creationId xmlns:a16="http://schemas.microsoft.com/office/drawing/2014/main" id="{092EA223-64AD-43DE-985F-53C6151D23CF}"/>
-              </a:ext>
-            </a:extLst>
-          </p:cNvPr>
-          <p:cNvSpPr>
-            <a:spLocks noGrp="1"/>
-          </p:cNvSpPr>
-          <p:nvPr>
-            <p:ph type="sldNum" sz="quarter" idx="12"/>
-          </p:nvPr>
-        </p:nvSpPr>
-        <p:spPr/>
-        <p:txBody>
-          <a:bodyPr/>
-          <a:lstStyle/>
-          <a:p>
-            <a:fld id="{4FAB73BC-B049-4115-A692-8D63A059BFB8}" type="slidenum">
-              <a:rPr lang="en-US" sz="1100" smtClean="0"/>
-              <a:t>4</a:t>
-            </a:fld>
-            <a:endParaRPr lang="en-US" sz="1100" dirty="0"/>
-          </a:p>
-        </p:txBody>
-      </p:sp>
     </p:spTree>
     <p:extLst>
       <p:ext uri="{BB962C8B-B14F-4D97-AF65-F5344CB8AC3E}">
@@ -6798,7 +6969,7 @@
         </p:blipFill>
         <p:spPr>
           <a:xfrm>
-            <a:off x="1097280" y="1842360"/>
+            <a:off x="1097280" y="1875015"/>
             <a:ext cx="6568415" cy="4099614"/>
           </a:xfrm>
           <a:prstGeom prst="rect">
@@ -6868,8 +7039,8 @@
           </a:p>
         </p:txBody>
       </p:sp>
-      <mc:AlternateContent xmlns:mc="http://schemas.openxmlformats.org/markup-compatibility/2006">
-        <mc:Choice xmlns:a14="http://schemas.microsoft.com/office/drawing/2010/main" Requires="a14">
+      <mc:AlternateContent xmlns:mc="http://schemas.openxmlformats.org/markup-compatibility/2006" xmlns:a14="http://schemas.microsoft.com/office/drawing/2010/main">
+        <mc:Choice Requires="a14">
           <p:sp>
             <p:nvSpPr>
               <p:cNvPr id="6" name="Content Placeholder 6">
@@ -7248,19 +7419,7 @@
                                 <a:rPr lang="en-US" sz="1600" b="0" i="1" smtClean="0">
                                   <a:latin typeface="Cambria Math" panose="02040503050406030204" pitchFamily="18" charset="0"/>
                                 </a:rPr>
-                                <m:t>0</m:t>
-                              </m:r>
-                              <m:r>
-                                <a:rPr lang="en-US" sz="1600" b="0" i="1" smtClean="0">
-                                  <a:latin typeface="Cambria Math" panose="02040503050406030204" pitchFamily="18" charset="0"/>
-                                </a:rPr>
-                                <m:t>,  </m:t>
-                              </m:r>
-                              <m:r>
-                                <a:rPr lang="en-US" sz="1600" b="0" i="1" smtClean="0">
-                                  <a:latin typeface="Cambria Math" panose="02040503050406030204" pitchFamily="18" charset="0"/>
-                                </a:rPr>
-                                <m:t>                                                                </m:t>
+                                <m:t>0,                                                                  </m:t>
                               </m:r>
                               <m:r>
                                 <a:rPr lang="en-US" sz="1600" i="1" smtClean="0">
@@ -7346,13 +7505,7 @@
                                     <a:rPr lang="en-US" sz="1600" b="0" i="1" smtClean="0">
                                       <a:latin typeface="Cambria Math" panose="02040503050406030204" pitchFamily="18" charset="0"/>
                                     </a:rPr>
-                                    <m:t>−</m:t>
-                                  </m:r>
-                                  <m:r>
-                                    <a:rPr lang="en-US" sz="1600" b="0" i="1" smtClean="0">
-                                      <a:latin typeface="Cambria Math" panose="02040503050406030204" pitchFamily="18" charset="0"/>
-                                    </a:rPr>
-                                    <m:t>1</m:t>
+                                    <m:t>−1</m:t>
                                   </m:r>
                                 </m:sub>
                               </m:sSub>
@@ -7453,13 +7606,7 @@
                                         <a:rPr lang="en-US" sz="1600" i="1">
                                           <a:latin typeface="Cambria Math" panose="02040503050406030204" pitchFamily="18" charset="0"/>
                                         </a:rPr>
-                                        <m:t>−</m:t>
-                                      </m:r>
-                                      <m:r>
-                                        <a:rPr lang="en-US" sz="1600" i="1">
-                                          <a:latin typeface="Cambria Math" panose="02040503050406030204" pitchFamily="18" charset="0"/>
-                                        </a:rPr>
-                                        <m:t>1</m:t>
+                                        <m:t>−1</m:t>
                                       </m:r>
                                     </m:sub>
                                   </m:sSub>
@@ -7521,13 +7668,7 @@
                                         <a:rPr lang="en-US" sz="1600" b="0" i="1" smtClean="0">
                                           <a:latin typeface="Cambria Math" panose="02040503050406030204" pitchFamily="18" charset="0"/>
                                         </a:rPr>
-                                        <m:t>−</m:t>
-                                      </m:r>
-                                      <m:r>
-                                        <a:rPr lang="en-US" sz="1600" b="0" i="1" smtClean="0">
-                                          <a:latin typeface="Cambria Math" panose="02040503050406030204" pitchFamily="18" charset="0"/>
-                                        </a:rPr>
-                                        <m:t>1</m:t>
+                                        <m:t>−1</m:t>
                                       </m:r>
                                     </m:sub>
                                   </m:sSub>
@@ -7566,13 +7707,7 @@
                                     <a:rPr lang="en-US" sz="1600" b="0" i="1" smtClean="0">
                                       <a:latin typeface="Cambria Math" panose="02040503050406030204" pitchFamily="18" charset="0"/>
                                     </a:rPr>
-                                    <m:t>−</m:t>
-                                  </m:r>
-                                  <m:r>
-                                    <a:rPr lang="en-US" sz="1600" b="0" i="1" smtClean="0">
-                                      <a:latin typeface="Cambria Math" panose="02040503050406030204" pitchFamily="18" charset="0"/>
-                                    </a:rPr>
-                                    <m:t>1</m:t>
+                                    <m:t>−1</m:t>
                                   </m:r>
                                 </m:sub>
                               </m:sSub>
@@ -7625,13 +7760,7 @@
                                 <a:rPr lang="en-US" sz="1600" b="0" i="1" smtClean="0">
                                   <a:latin typeface="Cambria Math" panose="02040503050406030204" pitchFamily="18" charset="0"/>
                                 </a:rPr>
-                                <m:t>1</m:t>
-                              </m:r>
-                              <m:r>
-                                <a:rPr lang="en-US" sz="1600" b="0" i="1" smtClean="0">
-                                  <a:latin typeface="Cambria Math" panose="02040503050406030204" pitchFamily="18" charset="0"/>
-                                </a:rPr>
-                                <m:t>,                                                                  </m:t>
+                                <m:t>1,                                                                  </m:t>
                               </m:r>
                               <m:r>
                                 <a:rPr lang="en-US" sz="1600" b="0" i="1" smtClean="0">
@@ -7689,7 +7818,7 @@
             </p:txBody>
           </p:sp>
         </mc:Choice>
-        <mc:Fallback>
+        <mc:Fallback xmlns="">
           <p:sp>
             <p:nvSpPr>
               <p:cNvPr id="6" name="Content Placeholder 6">
@@ -7816,7 +7945,7 @@
         </p:blipFill>
         <p:spPr>
           <a:xfrm>
-            <a:off x="1097280" y="1845735"/>
+            <a:off x="1097280" y="1855065"/>
             <a:ext cx="3865810" cy="1910845"/>
           </a:xfrm>
           <a:prstGeom prst="rect">
@@ -7846,12 +7975,17 @@
         </p:blipFill>
         <p:spPr>
           <a:xfrm>
-            <a:off x="5187810" y="1845735"/>
+            <a:off x="5187810" y="1855065"/>
             <a:ext cx="6561837" cy="3942289"/>
           </a:xfrm>
           <a:prstGeom prst="rect">
             <a:avLst/>
           </a:prstGeom>
+          <a:ln>
+            <a:solidFill>
+              <a:schemeClr val="tx1"/>
+            </a:solidFill>
+          </a:ln>
         </p:spPr>
       </p:pic>
       <p:sp>

</xml_diff>

<commit_message>
remove deprecated files, updated .gitignore
</commit_message>
<xml_diff>
--- a/doc/LossJoseph_RFinance_Presentation.pptx
+++ b/doc/LossJoseph_RFinance_Presentation.pptx
@@ -211,7 +211,7 @@
           <a:p>
             <a:fld id="{712E7762-3728-4CA2-BF04-831125DD9062}" type="datetimeFigureOut">
               <a:rPr lang="en-US" smtClean="0"/>
-              <a:t>5/29/2019</a:t>
+              <a:t>7/28/2019</a:t>
             </a:fld>
             <a:endParaRPr lang="en-US"/>
           </a:p>
@@ -872,7 +872,7 @@
           <a:p>
             <a:fld id="{59F43141-36B0-40CF-8669-7D0FD0B7374B}" type="datetime1">
               <a:rPr lang="en-US" smtClean="0"/>
-              <a:t>5/29/2019</a:t>
+              <a:t>7/28/2019</a:t>
             </a:fld>
             <a:endParaRPr lang="en-US" dirty="0"/>
           </a:p>
@@ -1079,7 +1079,7 @@
           <a:p>
             <a:fld id="{801C7C19-1958-4FC4-A02D-AE43942B1B8D}" type="datetime1">
               <a:rPr lang="en-US" smtClean="0"/>
-              <a:t>5/29/2019</a:t>
+              <a:t>7/28/2019</a:t>
             </a:fld>
             <a:endParaRPr lang="en-US" dirty="0"/>
           </a:p>
@@ -1334,7 +1334,7 @@
           <a:p>
             <a:fld id="{C9B8409A-081B-4640-B507-A77FE37F0937}" type="datetime1">
               <a:rPr lang="en-US" smtClean="0"/>
-              <a:t>5/29/2019</a:t>
+              <a:t>7/28/2019</a:t>
             </a:fld>
             <a:endParaRPr lang="en-US" dirty="0"/>
           </a:p>
@@ -1503,7 +1503,7 @@
           <a:p>
             <a:fld id="{E882F398-AAD7-4E54-9354-7F4897D0D13C}" type="datetime1">
               <a:rPr lang="en-US" smtClean="0"/>
-              <a:t>5/29/2019</a:t>
+              <a:t>7/28/2019</a:t>
             </a:fld>
             <a:endParaRPr lang="en-US" dirty="0"/>
           </a:p>
@@ -1845,7 +1845,7 @@
           <a:p>
             <a:fld id="{96CC9834-610C-48D2-9D5A-800370EC52E6}" type="datetime1">
               <a:rPr lang="en-US" smtClean="0"/>
-              <a:t>5/29/2019</a:t>
+              <a:t>7/28/2019</a:t>
             </a:fld>
             <a:endParaRPr lang="en-US" dirty="0"/>
           </a:p>
@@ -2119,7 +2119,7 @@
           <a:p>
             <a:fld id="{25014CED-E72D-4F5C-8096-2B558EDE56E2}" type="datetime1">
               <a:rPr lang="en-US" smtClean="0"/>
-              <a:t>5/29/2019</a:t>
+              <a:t>7/28/2019</a:t>
             </a:fld>
             <a:endParaRPr lang="en-US" dirty="0"/>
           </a:p>
@@ -2497,7 +2497,7 @@
           <a:p>
             <a:fld id="{98B2A811-FDCB-46F3-A27F-692BFB80C2A0}" type="datetime1">
               <a:rPr lang="en-US" smtClean="0"/>
-              <a:t>5/29/2019</a:t>
+              <a:t>7/28/2019</a:t>
             </a:fld>
             <a:endParaRPr lang="en-US" dirty="0"/>
           </a:p>
@@ -2614,7 +2614,7 @@
           <a:p>
             <a:fld id="{40B1479A-33C6-421F-91F6-9B497D73F85D}" type="datetime1">
               <a:rPr lang="en-US" smtClean="0"/>
-              <a:t>5/29/2019</a:t>
+              <a:t>7/28/2019</a:t>
             </a:fld>
             <a:endParaRPr lang="en-US" dirty="0"/>
           </a:p>
@@ -2784,7 +2784,7 @@
           <a:p>
             <a:fld id="{B4EBE95D-672D-41AC-B2D6-C37CB166E60E}" type="datetime1">
               <a:rPr lang="en-US" smtClean="0"/>
-              <a:t>5/29/2019</a:t>
+              <a:t>7/28/2019</a:t>
             </a:fld>
             <a:endParaRPr lang="en-US" dirty="0"/>
           </a:p>
@@ -3138,7 +3138,7 @@
           <a:p>
             <a:fld id="{B6B78D39-3C14-4E78-9ADA-E5D66EC7A8E4}" type="datetime1">
               <a:rPr lang="en-US" smtClean="0"/>
-              <a:t>5/29/2019</a:t>
+              <a:t>7/28/2019</a:t>
             </a:fld>
             <a:endParaRPr lang="en-US" dirty="0"/>
           </a:p>
@@ -3515,7 +3515,7 @@
           <a:p>
             <a:fld id="{604CA3DA-61D6-4895-B17A-131D90C1A0D8}" type="datetime1">
               <a:rPr lang="en-US" smtClean="0"/>
-              <a:t>5/29/2019</a:t>
+              <a:t>7/28/2019</a:t>
             </a:fld>
             <a:endParaRPr lang="en-US" dirty="0"/>
           </a:p>
@@ -3801,7 +3801,7 @@
           <a:p>
             <a:fld id="{874B0337-D539-4C49-BD44-C70C88A9AADF}" type="datetime1">
               <a:rPr lang="en-US" smtClean="0"/>
-              <a:t>5/29/2019</a:t>
+              <a:t>7/28/2019</a:t>
             </a:fld>
             <a:endParaRPr lang="en-US" dirty="0"/>
           </a:p>

</xml_diff>